<commit_message>
deleted old generated sheet
</commit_message>
<xml_diff>
--- a/Reliability Reports/Battery FIAMM - Riyadh - 20250210.pptx
+++ b/Reliability Reports/Battery FIAMM - Riyadh - 20250210.pptx
@@ -667,6 +667,867 @@
             <pc:docMk/>
             <pc:sldMk cId="332661816" sldId="732"/>
             <ac:picMk id="4" creationId="{7821BD56-E129-9D35-AA4C-B0B37AC4A2C1}"/>
+          </ac:picMkLst>
+        </pc:picChg>
+      </pc:sldChg>
+    </pc:docChg>
+  </pc:docChgLst>
+  <pc:docChgLst>
+    <pc:chgData name="OLIVEIRA Caio" userId="56a7264e-9c39-4238-9707-ce8f921f56b1" providerId="ADAL" clId="{AFDDA80C-A534-4E36-919F-69419C73824D}"/>
+    <pc:docChg chg="undo custSel addSld delSld modSld modSection">
+      <pc:chgData name="OLIVEIRA Caio" userId="56a7264e-9c39-4238-9707-ce8f921f56b1" providerId="ADAL" clId="{AFDDA80C-A534-4E36-919F-69419C73824D}" dt="2024-08-03T15:42:36.380" v="50" actId="1037"/>
+      <pc:docMkLst>
+        <pc:docMk/>
+      </pc:docMkLst>
+      <pc:sldChg chg="modSp mod">
+        <pc:chgData name="OLIVEIRA Caio" userId="56a7264e-9c39-4238-9707-ce8f921f56b1" providerId="ADAL" clId="{AFDDA80C-A534-4E36-919F-69419C73824D}" dt="2024-08-03T14:13:13.839" v="12" actId="20577"/>
+        <pc:sldMkLst>
+          <pc:docMk/>
+          <pc:sldMk cId="3900553097" sldId="348"/>
+        </pc:sldMkLst>
+        <pc:spChg chg="mod">
+          <ac:chgData name="OLIVEIRA Caio" userId="56a7264e-9c39-4238-9707-ce8f921f56b1" providerId="ADAL" clId="{AFDDA80C-A534-4E36-919F-69419C73824D}" dt="2024-08-03T14:13:13.839" v="12" actId="20577"/>
+          <ac:spMkLst>
+            <pc:docMk/>
+            <pc:sldMk cId="3900553097" sldId="348"/>
+            <ac:spMk id="3" creationId="{00000000-0000-0000-0000-000000000000}"/>
+          </ac:spMkLst>
+        </pc:spChg>
+      </pc:sldChg>
+      <pc:sldChg chg="addSp delSp modSp mod">
+        <pc:chgData name="OLIVEIRA Caio" userId="56a7264e-9c39-4238-9707-ce8f921f56b1" providerId="ADAL" clId="{AFDDA80C-A534-4E36-919F-69419C73824D}" dt="2024-08-03T14:33:25.954" v="15" actId="1076"/>
+        <pc:sldMkLst>
+          <pc:docMk/>
+          <pc:sldMk cId="4168217179" sldId="721"/>
+        </pc:sldMkLst>
+        <pc:picChg chg="add mod">
+          <ac:chgData name="OLIVEIRA Caio" userId="56a7264e-9c39-4238-9707-ce8f921f56b1" providerId="ADAL" clId="{AFDDA80C-A534-4E36-919F-69419C73824D}" dt="2024-08-03T14:33:25.954" v="15" actId="1076"/>
+          <ac:picMkLst>
+            <pc:docMk/>
+            <pc:sldMk cId="4168217179" sldId="721"/>
+            <ac:picMk id="2" creationId="{5B0D6675-5AB9-D081-FD96-FF1229A5C039}"/>
+          </ac:picMkLst>
+        </pc:picChg>
+        <pc:picChg chg="del">
+          <ac:chgData name="OLIVEIRA Caio" userId="56a7264e-9c39-4238-9707-ce8f921f56b1" providerId="ADAL" clId="{AFDDA80C-A534-4E36-919F-69419C73824D}" dt="2024-08-03T14:33:21.357" v="13" actId="478"/>
+          <ac:picMkLst>
+            <pc:docMk/>
+            <pc:sldMk cId="4168217179" sldId="721"/>
+            <ac:picMk id="8" creationId="{55EE02AB-8B1F-98A9-D7C2-C441E321E719}"/>
+          </ac:picMkLst>
+        </pc:picChg>
+      </pc:sldChg>
+      <pc:sldChg chg="addSp delSp modSp mod">
+        <pc:chgData name="OLIVEIRA Caio" userId="56a7264e-9c39-4238-9707-ce8f921f56b1" providerId="ADAL" clId="{AFDDA80C-A534-4E36-919F-69419C73824D}" dt="2024-08-03T14:34:28.891" v="18" actId="1076"/>
+        <pc:sldMkLst>
+          <pc:docMk/>
+          <pc:sldMk cId="3159271183" sldId="722"/>
+        </pc:sldMkLst>
+        <pc:picChg chg="add mod">
+          <ac:chgData name="OLIVEIRA Caio" userId="56a7264e-9c39-4238-9707-ce8f921f56b1" providerId="ADAL" clId="{AFDDA80C-A534-4E36-919F-69419C73824D}" dt="2024-08-03T14:34:28.891" v="18" actId="1076"/>
+          <ac:picMkLst>
+            <pc:docMk/>
+            <pc:sldMk cId="3159271183" sldId="722"/>
+            <ac:picMk id="3" creationId="{DCC81DFA-4ED0-1972-20B3-447D149C70FD}"/>
+          </ac:picMkLst>
+        </pc:picChg>
+        <pc:picChg chg="del">
+          <ac:chgData name="OLIVEIRA Caio" userId="56a7264e-9c39-4238-9707-ce8f921f56b1" providerId="ADAL" clId="{AFDDA80C-A534-4E36-919F-69419C73824D}" dt="2024-08-03T14:34:24.729" v="16" actId="478"/>
+          <ac:picMkLst>
+            <pc:docMk/>
+            <pc:sldMk cId="3159271183" sldId="722"/>
+            <ac:picMk id="6" creationId="{602B49BC-183C-4571-D007-FE1DC0F70F14}"/>
+          </ac:picMkLst>
+        </pc:picChg>
+      </pc:sldChg>
+      <pc:sldChg chg="addSp delSp modSp mod">
+        <pc:chgData name="OLIVEIRA Caio" userId="56a7264e-9c39-4238-9707-ce8f921f56b1" providerId="ADAL" clId="{AFDDA80C-A534-4E36-919F-69419C73824D}" dt="2024-08-03T15:42:36.380" v="50" actId="1037"/>
+        <pc:sldMkLst>
+          <pc:docMk/>
+          <pc:sldMk cId="2325547052" sldId="723"/>
+        </pc:sldMkLst>
+        <pc:picChg chg="del">
+          <ac:chgData name="OLIVEIRA Caio" userId="56a7264e-9c39-4238-9707-ce8f921f56b1" providerId="ADAL" clId="{AFDDA80C-A534-4E36-919F-69419C73824D}" dt="2024-08-03T14:34:42.796" v="19" actId="478"/>
+          <ac:picMkLst>
+            <pc:docMk/>
+            <pc:sldMk cId="2325547052" sldId="723"/>
+            <ac:picMk id="5" creationId="{2B673CBB-B257-5C4A-01D2-FA642B66DE48}"/>
+          </ac:picMkLst>
+        </pc:picChg>
+        <pc:picChg chg="add mod">
+          <ac:chgData name="OLIVEIRA Caio" userId="56a7264e-9c39-4238-9707-ce8f921f56b1" providerId="ADAL" clId="{AFDDA80C-A534-4E36-919F-69419C73824D}" dt="2024-08-03T15:42:36.380" v="50" actId="1037"/>
+          <ac:picMkLst>
+            <pc:docMk/>
+            <pc:sldMk cId="2325547052" sldId="723"/>
+            <ac:picMk id="6" creationId="{108247D3-C171-260E-CC10-B45F21B5DEFE}"/>
+          </ac:picMkLst>
+        </pc:picChg>
+      </pc:sldChg>
+      <pc:sldChg chg="addSp delSp modSp mod">
+        <pc:chgData name="OLIVEIRA Caio" userId="56a7264e-9c39-4238-9707-ce8f921f56b1" providerId="ADAL" clId="{AFDDA80C-A534-4E36-919F-69419C73824D}" dt="2024-08-03T14:35:01.838" v="24" actId="1076"/>
+        <pc:sldMkLst>
+          <pc:docMk/>
+          <pc:sldMk cId="1595295665" sldId="724"/>
+        </pc:sldMkLst>
+        <pc:picChg chg="del">
+          <ac:chgData name="OLIVEIRA Caio" userId="56a7264e-9c39-4238-9707-ce8f921f56b1" providerId="ADAL" clId="{AFDDA80C-A534-4E36-919F-69419C73824D}" dt="2024-08-03T14:34:56.610" v="22" actId="478"/>
+          <ac:picMkLst>
+            <pc:docMk/>
+            <pc:sldMk cId="1595295665" sldId="724"/>
+            <ac:picMk id="2" creationId="{5BDDDF0C-0933-69FC-6C47-D88164D87FFC}"/>
+          </ac:picMkLst>
+        </pc:picChg>
+        <pc:picChg chg="add mod">
+          <ac:chgData name="OLIVEIRA Caio" userId="56a7264e-9c39-4238-9707-ce8f921f56b1" providerId="ADAL" clId="{AFDDA80C-A534-4E36-919F-69419C73824D}" dt="2024-08-03T14:35:01.838" v="24" actId="1076"/>
+          <ac:picMkLst>
+            <pc:docMk/>
+            <pc:sldMk cId="1595295665" sldId="724"/>
+            <ac:picMk id="4" creationId="{A44A079F-8CB5-B259-0A3B-133DA50F2416}"/>
+          </ac:picMkLst>
+        </pc:picChg>
+      </pc:sldChg>
+      <pc:sldChg chg="addSp delSp modSp mod">
+        <pc:chgData name="OLIVEIRA Caio" userId="56a7264e-9c39-4238-9707-ce8f921f56b1" providerId="ADAL" clId="{AFDDA80C-A534-4E36-919F-69419C73824D}" dt="2024-08-03T14:35:18.157" v="27" actId="1076"/>
+        <pc:sldMkLst>
+          <pc:docMk/>
+          <pc:sldMk cId="2074372884" sldId="725"/>
+        </pc:sldMkLst>
+        <pc:picChg chg="add mod">
+          <ac:chgData name="OLIVEIRA Caio" userId="56a7264e-9c39-4238-9707-ce8f921f56b1" providerId="ADAL" clId="{AFDDA80C-A534-4E36-919F-69419C73824D}" dt="2024-08-03T14:35:18.157" v="27" actId="1076"/>
+          <ac:picMkLst>
+            <pc:docMk/>
+            <pc:sldMk cId="2074372884" sldId="725"/>
+            <ac:picMk id="4" creationId="{364CDF07-F954-8977-B55E-1820D6A70DE2}"/>
+          </ac:picMkLst>
+        </pc:picChg>
+        <pc:picChg chg="del">
+          <ac:chgData name="OLIVEIRA Caio" userId="56a7264e-9c39-4238-9707-ce8f921f56b1" providerId="ADAL" clId="{AFDDA80C-A534-4E36-919F-69419C73824D}" dt="2024-08-03T14:35:14.069" v="25" actId="478"/>
+          <ac:picMkLst>
+            <pc:docMk/>
+            <pc:sldMk cId="2074372884" sldId="725"/>
+            <ac:picMk id="14" creationId="{A2920D15-7274-3E75-C69C-96DCAF0CAD09}"/>
+          </ac:picMkLst>
+        </pc:picChg>
+      </pc:sldChg>
+      <pc:sldChg chg="addSp delSp modSp mod">
+        <pc:chgData name="OLIVEIRA Caio" userId="56a7264e-9c39-4238-9707-ce8f921f56b1" providerId="ADAL" clId="{AFDDA80C-A534-4E36-919F-69419C73824D}" dt="2024-08-03T14:35:37.799" v="30" actId="1076"/>
+        <pc:sldMkLst>
+          <pc:docMk/>
+          <pc:sldMk cId="4174650935" sldId="726"/>
+        </pc:sldMkLst>
+        <pc:picChg chg="add mod">
+          <ac:chgData name="OLIVEIRA Caio" userId="56a7264e-9c39-4238-9707-ce8f921f56b1" providerId="ADAL" clId="{AFDDA80C-A534-4E36-919F-69419C73824D}" dt="2024-08-03T14:35:37.799" v="30" actId="1076"/>
+          <ac:picMkLst>
+            <pc:docMk/>
+            <pc:sldMk cId="4174650935" sldId="726"/>
+            <ac:picMk id="4" creationId="{88463834-5AE7-4332-AF2B-2B5B1599B8B8}"/>
+          </ac:picMkLst>
+        </pc:picChg>
+        <pc:picChg chg="del">
+          <ac:chgData name="OLIVEIRA Caio" userId="56a7264e-9c39-4238-9707-ce8f921f56b1" providerId="ADAL" clId="{AFDDA80C-A534-4E36-919F-69419C73824D}" dt="2024-08-03T14:35:32.295" v="28" actId="478"/>
+          <ac:picMkLst>
+            <pc:docMk/>
+            <pc:sldMk cId="4174650935" sldId="726"/>
+            <ac:picMk id="9" creationId="{B6ECA4BD-7584-0457-F3B9-B5D2DE999237}"/>
+          </ac:picMkLst>
+        </pc:picChg>
+      </pc:sldChg>
+      <pc:sldChg chg="addSp delSp modSp mod">
+        <pc:chgData name="OLIVEIRA Caio" userId="56a7264e-9c39-4238-9707-ce8f921f56b1" providerId="ADAL" clId="{AFDDA80C-A534-4E36-919F-69419C73824D}" dt="2024-08-03T14:35:51.344" v="33" actId="1076"/>
+        <pc:sldMkLst>
+          <pc:docMk/>
+          <pc:sldMk cId="874457255" sldId="727"/>
+        </pc:sldMkLst>
+        <pc:picChg chg="add mod">
+          <ac:chgData name="OLIVEIRA Caio" userId="56a7264e-9c39-4238-9707-ce8f921f56b1" providerId="ADAL" clId="{AFDDA80C-A534-4E36-919F-69419C73824D}" dt="2024-08-03T14:35:51.344" v="33" actId="1076"/>
+          <ac:picMkLst>
+            <pc:docMk/>
+            <pc:sldMk cId="874457255" sldId="727"/>
+            <ac:picMk id="3" creationId="{05EC3CA8-CB37-3DCA-6162-23B8B753D888}"/>
+          </ac:picMkLst>
+        </pc:picChg>
+        <pc:picChg chg="del">
+          <ac:chgData name="OLIVEIRA Caio" userId="56a7264e-9c39-4238-9707-ce8f921f56b1" providerId="ADAL" clId="{AFDDA80C-A534-4E36-919F-69419C73824D}" dt="2024-08-03T14:35:48.022" v="31" actId="478"/>
+          <ac:picMkLst>
+            <pc:docMk/>
+            <pc:sldMk cId="874457255" sldId="727"/>
+            <ac:picMk id="8" creationId="{93B7D33F-01B7-16FE-8470-6B4D8DC4E58D}"/>
+          </ac:picMkLst>
+        </pc:picChg>
+      </pc:sldChg>
+      <pc:sldChg chg="addSp delSp modSp mod">
+        <pc:chgData name="OLIVEIRA Caio" userId="56a7264e-9c39-4238-9707-ce8f921f56b1" providerId="ADAL" clId="{AFDDA80C-A534-4E36-919F-69419C73824D}" dt="2024-08-03T14:36:11.157" v="36" actId="1076"/>
+        <pc:sldMkLst>
+          <pc:docMk/>
+          <pc:sldMk cId="3078111408" sldId="728"/>
+        </pc:sldMkLst>
+        <pc:picChg chg="add mod">
+          <ac:chgData name="OLIVEIRA Caio" userId="56a7264e-9c39-4238-9707-ce8f921f56b1" providerId="ADAL" clId="{AFDDA80C-A534-4E36-919F-69419C73824D}" dt="2024-08-03T14:36:11.157" v="36" actId="1076"/>
+          <ac:picMkLst>
+            <pc:docMk/>
+            <pc:sldMk cId="3078111408" sldId="728"/>
+            <ac:picMk id="4" creationId="{9846C87E-3C4A-2FE1-E97E-688503B403D0}"/>
+          </ac:picMkLst>
+        </pc:picChg>
+        <pc:picChg chg="del">
+          <ac:chgData name="OLIVEIRA Caio" userId="56a7264e-9c39-4238-9707-ce8f921f56b1" providerId="ADAL" clId="{AFDDA80C-A534-4E36-919F-69419C73824D}" dt="2024-08-03T14:36:08.024" v="34" actId="478"/>
+          <ac:picMkLst>
+            <pc:docMk/>
+            <pc:sldMk cId="3078111408" sldId="728"/>
+            <ac:picMk id="8" creationId="{4777F19C-7B6E-04BA-8068-98C98E06FCFE}"/>
+          </ac:picMkLst>
+        </pc:picChg>
+      </pc:sldChg>
+      <pc:sldChg chg="addSp delSp modSp mod">
+        <pc:chgData name="OLIVEIRA Caio" userId="56a7264e-9c39-4238-9707-ce8f921f56b1" providerId="ADAL" clId="{AFDDA80C-A534-4E36-919F-69419C73824D}" dt="2024-08-03T14:37:10.526" v="39" actId="1076"/>
+        <pc:sldMkLst>
+          <pc:docMk/>
+          <pc:sldMk cId="2002950431" sldId="730"/>
+        </pc:sldMkLst>
+        <pc:picChg chg="add mod">
+          <ac:chgData name="OLIVEIRA Caio" userId="56a7264e-9c39-4238-9707-ce8f921f56b1" providerId="ADAL" clId="{AFDDA80C-A534-4E36-919F-69419C73824D}" dt="2024-08-03T14:37:10.526" v="39" actId="1076"/>
+          <ac:picMkLst>
+            <pc:docMk/>
+            <pc:sldMk cId="2002950431" sldId="730"/>
+            <ac:picMk id="2" creationId="{6E7EE1C9-3622-F6FC-BAEB-948A44088EA2}"/>
+          </ac:picMkLst>
+        </pc:picChg>
+        <pc:picChg chg="del">
+          <ac:chgData name="OLIVEIRA Caio" userId="56a7264e-9c39-4238-9707-ce8f921f56b1" providerId="ADAL" clId="{AFDDA80C-A534-4E36-919F-69419C73824D}" dt="2024-08-03T14:37:07.264" v="37" actId="478"/>
+          <ac:picMkLst>
+            <pc:docMk/>
+            <pc:sldMk cId="2002950431" sldId="730"/>
+            <ac:picMk id="6" creationId="{9242B5EF-76E2-9D7E-DF18-007DE348448D}"/>
+          </ac:picMkLst>
+        </pc:picChg>
+      </pc:sldChg>
+      <pc:sldChg chg="addSp delSp modSp add del mod">
+        <pc:chgData name="OLIVEIRA Caio" userId="56a7264e-9c39-4238-9707-ce8f921f56b1" providerId="ADAL" clId="{AFDDA80C-A534-4E36-919F-69419C73824D}" dt="2024-08-03T14:37:25.923" v="44" actId="1076"/>
+        <pc:sldMkLst>
+          <pc:docMk/>
+          <pc:sldMk cId="332661816" sldId="732"/>
+        </pc:sldMkLst>
+        <pc:picChg chg="add mod">
+          <ac:chgData name="OLIVEIRA Caio" userId="56a7264e-9c39-4238-9707-ce8f921f56b1" providerId="ADAL" clId="{AFDDA80C-A534-4E36-919F-69419C73824D}" dt="2024-08-03T14:37:25.923" v="44" actId="1076"/>
+          <ac:picMkLst>
+            <pc:docMk/>
+            <pc:sldMk cId="332661816" sldId="732"/>
+            <ac:picMk id="2" creationId="{D46A3C4E-D8D4-B734-4191-65E06A2BA6A2}"/>
+          </ac:picMkLst>
+        </pc:picChg>
+        <pc:picChg chg="del">
+          <ac:chgData name="OLIVEIRA Caio" userId="56a7264e-9c39-4238-9707-ce8f921f56b1" providerId="ADAL" clId="{AFDDA80C-A534-4E36-919F-69419C73824D}" dt="2024-08-03T14:37:22.564" v="42" actId="478"/>
+          <ac:picMkLst>
+            <pc:docMk/>
+            <pc:sldMk cId="332661816" sldId="732"/>
+            <ac:picMk id="4" creationId="{7821BD56-E129-9D35-AA4C-B0B37AC4A2C1}"/>
+          </ac:picMkLst>
+        </pc:picChg>
+      </pc:sldChg>
+    </pc:docChg>
+  </pc:docChgLst>
+  <pc:docChgLst>
+    <pc:chgData name="OLIVEIRA Caio" userId="56a7264e-9c39-4238-9707-ce8f921f56b1" providerId="ADAL" clId="{231D7465-E426-43AB-BACA-F33533CB366D}"/>
+    <pc:docChg chg="custSel modSld">
+      <pc:chgData name="OLIVEIRA Caio" userId="56a7264e-9c39-4238-9707-ce8f921f56b1" providerId="ADAL" clId="{231D7465-E426-43AB-BACA-F33533CB366D}" dt="2024-08-08T13:44:05.618" v="163" actId="403"/>
+      <pc:docMkLst>
+        <pc:docMk/>
+      </pc:docMkLst>
+      <pc:sldChg chg="modSp mod">
+        <pc:chgData name="OLIVEIRA Caio" userId="56a7264e-9c39-4238-9707-ce8f921f56b1" providerId="ADAL" clId="{231D7465-E426-43AB-BACA-F33533CB366D}" dt="2024-08-08T13:43:35.997" v="153" actId="20577"/>
+        <pc:sldMkLst>
+          <pc:docMk/>
+          <pc:sldMk cId="3900553097" sldId="348"/>
+        </pc:sldMkLst>
+        <pc:spChg chg="mod">
+          <ac:chgData name="OLIVEIRA Caio" userId="56a7264e-9c39-4238-9707-ce8f921f56b1" providerId="ADAL" clId="{231D7465-E426-43AB-BACA-F33533CB366D}" dt="2024-08-08T13:43:35.997" v="153" actId="20577"/>
+          <ac:spMkLst>
+            <pc:docMk/>
+            <pc:sldMk cId="3900553097" sldId="348"/>
+            <ac:spMk id="6" creationId="{00000000-0000-0000-0000-000000000000}"/>
+          </ac:spMkLst>
+        </pc:spChg>
+      </pc:sldChg>
+      <pc:sldChg chg="addSp delSp modSp mod">
+        <pc:chgData name="OLIVEIRA Caio" userId="56a7264e-9c39-4238-9707-ce8f921f56b1" providerId="ADAL" clId="{231D7465-E426-43AB-BACA-F33533CB366D}" dt="2024-08-08T13:39:58.532" v="129" actId="1076"/>
+        <pc:sldMkLst>
+          <pc:docMk/>
+          <pc:sldMk cId="3107087685" sldId="681"/>
+        </pc:sldMkLst>
+        <pc:picChg chg="add mod">
+          <ac:chgData name="OLIVEIRA Caio" userId="56a7264e-9c39-4238-9707-ce8f921f56b1" providerId="ADAL" clId="{231D7465-E426-43AB-BACA-F33533CB366D}" dt="2024-08-08T13:39:58.532" v="129" actId="1076"/>
+          <ac:picMkLst>
+            <pc:docMk/>
+            <pc:sldMk cId="3107087685" sldId="681"/>
+            <ac:picMk id="2" creationId="{09CB4B47-0955-2657-7891-4DE3C6CB9211}"/>
+          </ac:picMkLst>
+        </pc:picChg>
+        <pc:picChg chg="del">
+          <ac:chgData name="OLIVEIRA Caio" userId="56a7264e-9c39-4238-9707-ce8f921f56b1" providerId="ADAL" clId="{231D7465-E426-43AB-BACA-F33533CB366D}" dt="2024-08-08T13:39:46.536" v="122" actId="478"/>
+          <ac:picMkLst>
+            <pc:docMk/>
+            <pc:sldMk cId="3107087685" sldId="681"/>
+            <ac:picMk id="4" creationId="{33FF13AD-B751-5553-53C8-48B2B5872978}"/>
+          </ac:picMkLst>
+        </pc:picChg>
+      </pc:sldChg>
+      <pc:sldChg chg="addSp delSp modSp mod">
+        <pc:chgData name="OLIVEIRA Caio" userId="56a7264e-9c39-4238-9707-ce8f921f56b1" providerId="ADAL" clId="{231D7465-E426-43AB-BACA-F33533CB366D}" dt="2024-08-08T13:40:42.540" v="143" actId="1076"/>
+        <pc:sldMkLst>
+          <pc:docMk/>
+          <pc:sldMk cId="330742605" sldId="683"/>
+        </pc:sldMkLst>
+        <pc:picChg chg="del">
+          <ac:chgData name="OLIVEIRA Caio" userId="56a7264e-9c39-4238-9707-ce8f921f56b1" providerId="ADAL" clId="{231D7465-E426-43AB-BACA-F33533CB366D}" dt="2024-08-08T13:40:35.393" v="139" actId="478"/>
+          <ac:picMkLst>
+            <pc:docMk/>
+            <pc:sldMk cId="330742605" sldId="683"/>
+            <ac:picMk id="3" creationId="{CF598411-E4FC-DC58-CEE0-D149201E63C6}"/>
+          </ac:picMkLst>
+        </pc:picChg>
+        <pc:picChg chg="add mod">
+          <ac:chgData name="OLIVEIRA Caio" userId="56a7264e-9c39-4238-9707-ce8f921f56b1" providerId="ADAL" clId="{231D7465-E426-43AB-BACA-F33533CB366D}" dt="2024-08-08T13:40:42.540" v="143" actId="1076"/>
+          <ac:picMkLst>
+            <pc:docMk/>
+            <pc:sldMk cId="330742605" sldId="683"/>
+            <ac:picMk id="4" creationId="{AD762F4A-0741-3C33-2F02-1DEB1BA6E59F}"/>
+          </ac:picMkLst>
+        </pc:picChg>
+      </pc:sldChg>
+      <pc:sldChg chg="addSp delSp modSp mod">
+        <pc:chgData name="OLIVEIRA Caio" userId="56a7264e-9c39-4238-9707-ce8f921f56b1" providerId="ADAL" clId="{231D7465-E426-43AB-BACA-F33533CB366D}" dt="2024-08-08T13:40:23.030" v="138" actId="478"/>
+        <pc:sldMkLst>
+          <pc:docMk/>
+          <pc:sldMk cId="1884443606" sldId="687"/>
+        </pc:sldMkLst>
+        <pc:spChg chg="del">
+          <ac:chgData name="OLIVEIRA Caio" userId="56a7264e-9c39-4238-9707-ce8f921f56b1" providerId="ADAL" clId="{231D7465-E426-43AB-BACA-F33533CB366D}" dt="2024-08-08T13:40:23.030" v="138" actId="478"/>
+          <ac:spMkLst>
+            <pc:docMk/>
+            <pc:sldMk cId="1884443606" sldId="687"/>
+            <ac:spMk id="4" creationId="{29E3A5D8-1290-83BC-4016-9F8A1A7A5D3D}"/>
+          </ac:spMkLst>
+        </pc:spChg>
+        <pc:picChg chg="del">
+          <ac:chgData name="OLIVEIRA Caio" userId="56a7264e-9c39-4238-9707-ce8f921f56b1" providerId="ADAL" clId="{231D7465-E426-43AB-BACA-F33533CB366D}" dt="2024-08-08T13:40:07.783" v="130" actId="478"/>
+          <ac:picMkLst>
+            <pc:docMk/>
+            <pc:sldMk cId="1884443606" sldId="687"/>
+            <ac:picMk id="2" creationId="{4ABD5002-B7D8-7913-A535-59D51A40F541}"/>
+          </ac:picMkLst>
+        </pc:picChg>
+        <pc:picChg chg="add mod">
+          <ac:chgData name="OLIVEIRA Caio" userId="56a7264e-9c39-4238-9707-ce8f921f56b1" providerId="ADAL" clId="{231D7465-E426-43AB-BACA-F33533CB366D}" dt="2024-08-08T13:40:21.372" v="137" actId="1076"/>
+          <ac:picMkLst>
+            <pc:docMk/>
+            <pc:sldMk cId="1884443606" sldId="687"/>
+            <ac:picMk id="3" creationId="{1B399161-B9C3-600B-FBC5-641ABE84C018}"/>
+          </ac:picMkLst>
+        </pc:picChg>
+      </pc:sldChg>
+      <pc:sldChg chg="modSp mod">
+        <pc:chgData name="OLIVEIRA Caio" userId="56a7264e-9c39-4238-9707-ce8f921f56b1" providerId="ADAL" clId="{231D7465-E426-43AB-BACA-F33533CB366D}" dt="2024-08-08T13:32:25.699" v="17" actId="1076"/>
+        <pc:sldMkLst>
+          <pc:docMk/>
+          <pc:sldMk cId="318140112" sldId="712"/>
+        </pc:sldMkLst>
+        <pc:spChg chg="mod">
+          <ac:chgData name="OLIVEIRA Caio" userId="56a7264e-9c39-4238-9707-ce8f921f56b1" providerId="ADAL" clId="{231D7465-E426-43AB-BACA-F33533CB366D}" dt="2024-08-08T13:32:19.612" v="16" actId="20577"/>
+          <ac:spMkLst>
+            <pc:docMk/>
+            <pc:sldMk cId="318140112" sldId="712"/>
+            <ac:spMk id="3" creationId="{E47AEACB-2C32-482B-BC10-2C2F64AF4448}"/>
+          </ac:spMkLst>
+        </pc:spChg>
+        <pc:picChg chg="mod">
+          <ac:chgData name="OLIVEIRA Caio" userId="56a7264e-9c39-4238-9707-ce8f921f56b1" providerId="ADAL" clId="{231D7465-E426-43AB-BACA-F33533CB366D}" dt="2024-08-08T13:32:25.699" v="17" actId="1076"/>
+          <ac:picMkLst>
+            <pc:docMk/>
+            <pc:sldMk cId="318140112" sldId="712"/>
+            <ac:picMk id="5" creationId="{0A620BA4-0C65-BEFE-BB13-3F83A7B30112}"/>
+          </ac:picMkLst>
+        </pc:picChg>
+      </pc:sldChg>
+      <pc:sldChg chg="addSp delSp modSp mod">
+        <pc:chgData name="OLIVEIRA Caio" userId="56a7264e-9c39-4238-9707-ce8f921f56b1" providerId="ADAL" clId="{231D7465-E426-43AB-BACA-F33533CB366D}" dt="2024-08-08T13:33:19.126" v="73" actId="14100"/>
+        <pc:sldMkLst>
+          <pc:docMk/>
+          <pc:sldMk cId="2958950422" sldId="713"/>
+        </pc:sldMkLst>
+        <pc:spChg chg="mod">
+          <ac:chgData name="OLIVEIRA Caio" userId="56a7264e-9c39-4238-9707-ce8f921f56b1" providerId="ADAL" clId="{231D7465-E426-43AB-BACA-F33533CB366D}" dt="2024-08-08T13:32:45.408" v="63" actId="20577"/>
+          <ac:spMkLst>
+            <pc:docMk/>
+            <pc:sldMk cId="2958950422" sldId="713"/>
+            <ac:spMk id="8" creationId="{734E3C71-79C5-7938-D68B-38493B1B9E12}"/>
+          </ac:spMkLst>
+        </pc:spChg>
+        <pc:picChg chg="add mod">
+          <ac:chgData name="OLIVEIRA Caio" userId="56a7264e-9c39-4238-9707-ce8f921f56b1" providerId="ADAL" clId="{231D7465-E426-43AB-BACA-F33533CB366D}" dt="2024-08-08T13:32:53.937" v="67" actId="14100"/>
+          <ac:picMkLst>
+            <pc:docMk/>
+            <pc:sldMk cId="2958950422" sldId="713"/>
+            <ac:picMk id="3" creationId="{F4BDA308-3546-BCD6-188A-75123578329C}"/>
+          </ac:picMkLst>
+        </pc:picChg>
+        <pc:picChg chg="del">
+          <ac:chgData name="OLIVEIRA Caio" userId="56a7264e-9c39-4238-9707-ce8f921f56b1" providerId="ADAL" clId="{231D7465-E426-43AB-BACA-F33533CB366D}" dt="2024-08-08T13:32:48.639" v="64" actId="478"/>
+          <ac:picMkLst>
+            <pc:docMk/>
+            <pc:sldMk cId="2958950422" sldId="713"/>
+            <ac:picMk id="4" creationId="{B006364D-2C4A-A2CF-0054-E39A37251C81}"/>
+          </ac:picMkLst>
+        </pc:picChg>
+        <pc:picChg chg="del">
+          <ac:chgData name="OLIVEIRA Caio" userId="56a7264e-9c39-4238-9707-ce8f921f56b1" providerId="ADAL" clId="{231D7465-E426-43AB-BACA-F33533CB366D}" dt="2024-08-08T13:33:09.029" v="68" actId="478"/>
+          <ac:picMkLst>
+            <pc:docMk/>
+            <pc:sldMk cId="2958950422" sldId="713"/>
+            <ac:picMk id="7" creationId="{FBD96A5D-3A82-D37E-7F61-613533EB68E9}"/>
+          </ac:picMkLst>
+        </pc:picChg>
+        <pc:picChg chg="add mod">
+          <ac:chgData name="OLIVEIRA Caio" userId="56a7264e-9c39-4238-9707-ce8f921f56b1" providerId="ADAL" clId="{231D7465-E426-43AB-BACA-F33533CB366D}" dt="2024-08-08T13:33:19.126" v="73" actId="14100"/>
+          <ac:picMkLst>
+            <pc:docMk/>
+            <pc:sldMk cId="2958950422" sldId="713"/>
+            <ac:picMk id="9" creationId="{CC8E1FAA-FFB9-9A77-7111-FC1DFF582900}"/>
+          </ac:picMkLst>
+        </pc:picChg>
+      </pc:sldChg>
+      <pc:sldChg chg="addSp delSp modSp mod">
+        <pc:chgData name="OLIVEIRA Caio" userId="56a7264e-9c39-4238-9707-ce8f921f56b1" providerId="ADAL" clId="{231D7465-E426-43AB-BACA-F33533CB366D}" dt="2024-08-08T13:34:49.178" v="83" actId="1076"/>
+        <pc:sldMkLst>
+          <pc:docMk/>
+          <pc:sldMk cId="3828268161" sldId="714"/>
+        </pc:sldMkLst>
+        <pc:spChg chg="del mod">
+          <ac:chgData name="OLIVEIRA Caio" userId="56a7264e-9c39-4238-9707-ce8f921f56b1" providerId="ADAL" clId="{231D7465-E426-43AB-BACA-F33533CB366D}" dt="2024-08-08T13:34:31.065" v="77" actId="478"/>
+          <ac:spMkLst>
+            <pc:docMk/>
+            <pc:sldMk cId="3828268161" sldId="714"/>
+            <ac:spMk id="4" creationId="{7D9A824A-CB5E-4FA7-4970-92C2E1797043}"/>
+          </ac:spMkLst>
+        </pc:spChg>
+        <pc:spChg chg="add mod">
+          <ac:chgData name="OLIVEIRA Caio" userId="56a7264e-9c39-4238-9707-ce8f921f56b1" providerId="ADAL" clId="{231D7465-E426-43AB-BACA-F33533CB366D}" dt="2024-08-08T13:34:31.320" v="78"/>
+          <ac:spMkLst>
+            <pc:docMk/>
+            <pc:sldMk cId="3828268161" sldId="714"/>
+            <ac:spMk id="9" creationId="{7FDFF354-FBFC-69F7-B182-562D092FE891}"/>
+          </ac:spMkLst>
+        </pc:spChg>
+        <pc:picChg chg="del">
+          <ac:chgData name="OLIVEIRA Caio" userId="56a7264e-9c39-4238-9707-ce8f921f56b1" providerId="ADAL" clId="{231D7465-E426-43AB-BACA-F33533CB366D}" dt="2024-08-08T13:34:25.276" v="74" actId="478"/>
+          <ac:picMkLst>
+            <pc:docMk/>
+            <pc:sldMk cId="3828268161" sldId="714"/>
+            <ac:picMk id="6" creationId="{30CE6780-057B-7021-EB25-3791FFFB8603}"/>
+          </ac:picMkLst>
+        </pc:picChg>
+        <pc:picChg chg="add mod">
+          <ac:chgData name="OLIVEIRA Caio" userId="56a7264e-9c39-4238-9707-ce8f921f56b1" providerId="ADAL" clId="{231D7465-E426-43AB-BACA-F33533CB366D}" dt="2024-08-08T13:34:25.559" v="75"/>
+          <ac:picMkLst>
+            <pc:docMk/>
+            <pc:sldMk cId="3828268161" sldId="714"/>
+            <ac:picMk id="7" creationId="{B2FA3F49-5C7A-F805-3DAE-89B9F29B366B}"/>
+          </ac:picMkLst>
+        </pc:picChg>
+        <pc:picChg chg="del">
+          <ac:chgData name="OLIVEIRA Caio" userId="56a7264e-9c39-4238-9707-ce8f921f56b1" providerId="ADAL" clId="{231D7465-E426-43AB-BACA-F33533CB366D}" dt="2024-08-08T13:34:41.459" v="79" actId="478"/>
+          <ac:picMkLst>
+            <pc:docMk/>
+            <pc:sldMk cId="3828268161" sldId="714"/>
+            <ac:picMk id="8" creationId="{DC6871B8-34F5-7E20-21C4-40413964C0D7}"/>
+          </ac:picMkLst>
+        </pc:picChg>
+        <pc:picChg chg="add mod">
+          <ac:chgData name="OLIVEIRA Caio" userId="56a7264e-9c39-4238-9707-ce8f921f56b1" providerId="ADAL" clId="{231D7465-E426-43AB-BACA-F33533CB366D}" dt="2024-08-08T13:34:49.178" v="83" actId="1076"/>
+          <ac:picMkLst>
+            <pc:docMk/>
+            <pc:sldMk cId="3828268161" sldId="714"/>
+            <ac:picMk id="11" creationId="{E961D3CF-7790-EDAD-2E7B-7CF769F230D9}"/>
+          </ac:picMkLst>
+        </pc:picChg>
+      </pc:sldChg>
+      <pc:sldChg chg="addSp delSp modSp mod">
+        <pc:chgData name="OLIVEIRA Caio" userId="56a7264e-9c39-4238-9707-ce8f921f56b1" providerId="ADAL" clId="{231D7465-E426-43AB-BACA-F33533CB366D}" dt="2024-08-08T13:38:34.810" v="121" actId="1076"/>
+        <pc:sldMkLst>
+          <pc:docMk/>
+          <pc:sldMk cId="1026930713" sldId="717"/>
+        </pc:sldMkLst>
+        <pc:picChg chg="del">
+          <ac:chgData name="OLIVEIRA Caio" userId="56a7264e-9c39-4238-9707-ce8f921f56b1" providerId="ADAL" clId="{231D7465-E426-43AB-BACA-F33533CB366D}" dt="2024-08-08T13:38:28.564" v="117" actId="478"/>
+          <ac:picMkLst>
+            <pc:docMk/>
+            <pc:sldMk cId="1026930713" sldId="717"/>
+            <ac:picMk id="4" creationId="{60AA6229-A0C9-05D2-1B50-C7E2AB501664}"/>
+          </ac:picMkLst>
+        </pc:picChg>
+        <pc:picChg chg="add mod">
+          <ac:chgData name="OLIVEIRA Caio" userId="56a7264e-9c39-4238-9707-ce8f921f56b1" providerId="ADAL" clId="{231D7465-E426-43AB-BACA-F33533CB366D}" dt="2024-08-08T13:38:34.810" v="121" actId="1076"/>
+          <ac:picMkLst>
+            <pc:docMk/>
+            <pc:sldMk cId="1026930713" sldId="717"/>
+            <ac:picMk id="6" creationId="{DE58EC42-80CD-EEF8-5E62-35758FBE7A4E}"/>
+          </ac:picMkLst>
+        </pc:picChg>
+      </pc:sldChg>
+      <pc:sldChg chg="addSp delSp modSp mod">
+        <pc:chgData name="OLIVEIRA Caio" userId="56a7264e-9c39-4238-9707-ce8f921f56b1" providerId="ADAL" clId="{231D7465-E426-43AB-BACA-F33533CB366D}" dt="2024-08-08T13:44:05.618" v="163" actId="403"/>
+        <pc:sldMkLst>
+          <pc:docMk/>
+          <pc:sldMk cId="1414522034" sldId="718"/>
+        </pc:sldMkLst>
+        <pc:spChg chg="mod">
+          <ac:chgData name="OLIVEIRA Caio" userId="56a7264e-9c39-4238-9707-ce8f921f56b1" providerId="ADAL" clId="{231D7465-E426-43AB-BACA-F33533CB366D}" dt="2024-08-08T13:44:05.618" v="163" actId="403"/>
+          <ac:spMkLst>
+            <pc:docMk/>
+            <pc:sldMk cId="1414522034" sldId="718"/>
+            <ac:spMk id="6" creationId="{D481E455-8B56-109B-A60D-0286916A19DC}"/>
+          </ac:spMkLst>
+        </pc:spChg>
+        <pc:spChg chg="mod">
+          <ac:chgData name="OLIVEIRA Caio" userId="56a7264e-9c39-4238-9707-ce8f921f56b1" providerId="ADAL" clId="{231D7465-E426-43AB-BACA-F33533CB366D}" dt="2024-08-08T13:38:16.296" v="116" actId="20577"/>
+          <ac:spMkLst>
+            <pc:docMk/>
+            <pc:sldMk cId="1414522034" sldId="718"/>
+            <ac:spMk id="7" creationId="{0AF17F77-5D84-3F2F-7B7F-5A136FCEDFF4}"/>
+          </ac:spMkLst>
+        </pc:spChg>
+        <pc:picChg chg="add mod">
+          <ac:chgData name="OLIVEIRA Caio" userId="56a7264e-9c39-4238-9707-ce8f921f56b1" providerId="ADAL" clId="{231D7465-E426-43AB-BACA-F33533CB366D}" dt="2024-08-08T13:37:54.759" v="87" actId="1076"/>
+          <ac:picMkLst>
+            <pc:docMk/>
+            <pc:sldMk cId="1414522034" sldId="718"/>
+            <ac:picMk id="3" creationId="{CCE2F506-7DAD-4A8B-5DAF-5E2D4B68E856}"/>
+          </ac:picMkLst>
+        </pc:picChg>
+        <pc:picChg chg="del">
+          <ac:chgData name="OLIVEIRA Caio" userId="56a7264e-9c39-4238-9707-ce8f921f56b1" providerId="ADAL" clId="{231D7465-E426-43AB-BACA-F33533CB366D}" dt="2024-08-08T13:37:48.518" v="84" actId="478"/>
+          <ac:picMkLst>
+            <pc:docMk/>
+            <pc:sldMk cId="1414522034" sldId="718"/>
+            <ac:picMk id="4" creationId="{254DA8DD-1DF4-727D-B729-6F29F94E6DFF}"/>
+          </ac:picMkLst>
+        </pc:picChg>
+      </pc:sldChg>
+    </pc:docChg>
+  </pc:docChgLst>
+  <pc:docChgLst>
+    <pc:chgData name="OLIVEIRA Caio" userId="56a7264e-9c39-4238-9707-ce8f921f56b1" providerId="ADAL" clId="{64B2F274-A096-4B38-9B91-669EA7A5250E}"/>
+    <pc:docChg chg="undo custSel modSld">
+      <pc:chgData name="OLIVEIRA Caio" userId="56a7264e-9c39-4238-9707-ce8f921f56b1" providerId="ADAL" clId="{64B2F274-A096-4B38-9B91-669EA7A5250E}" dt="2024-08-01T21:49:33.814" v="258" actId="1076"/>
+      <pc:docMkLst>
+        <pc:docMk/>
+      </pc:docMkLst>
+      <pc:sldChg chg="addSp delSp modSp mod">
+        <pc:chgData name="OLIVEIRA Caio" userId="56a7264e-9c39-4238-9707-ce8f921f56b1" providerId="ADAL" clId="{64B2F274-A096-4B38-9B91-669EA7A5250E}" dt="2024-08-01T21:35:51.785" v="4" actId="14100"/>
+        <pc:sldMkLst>
+          <pc:docMk/>
+          <pc:sldMk cId="3049616452" sldId="733"/>
+        </pc:sldMkLst>
+        <pc:picChg chg="add mod">
+          <ac:chgData name="OLIVEIRA Caio" userId="56a7264e-9c39-4238-9707-ce8f921f56b1" providerId="ADAL" clId="{64B2F274-A096-4B38-9B91-669EA7A5250E}" dt="2024-08-01T21:35:51.785" v="4" actId="14100"/>
+          <ac:picMkLst>
+            <pc:docMk/>
+            <pc:sldMk cId="3049616452" sldId="733"/>
+            <ac:picMk id="3" creationId="{B8A11036-0111-AAC4-0CAD-DF5A1FE74BC3}"/>
+          </ac:picMkLst>
+        </pc:picChg>
+        <pc:picChg chg="del">
+          <ac:chgData name="OLIVEIRA Caio" userId="56a7264e-9c39-4238-9707-ce8f921f56b1" providerId="ADAL" clId="{64B2F274-A096-4B38-9B91-669EA7A5250E}" dt="2024-08-01T21:35:45.225" v="0" actId="478"/>
+          <ac:picMkLst>
+            <pc:docMk/>
+            <pc:sldMk cId="3049616452" sldId="733"/>
+            <ac:picMk id="4" creationId="{85C83F03-5A81-8883-E618-61FAE6FB3302}"/>
+          </ac:picMkLst>
+        </pc:picChg>
+      </pc:sldChg>
+      <pc:sldChg chg="modSp mod">
+        <pc:chgData name="OLIVEIRA Caio" userId="56a7264e-9c39-4238-9707-ce8f921f56b1" providerId="ADAL" clId="{64B2F274-A096-4B38-9B91-669EA7A5250E}" dt="2024-08-01T21:49:33.814" v="258" actId="1076"/>
+        <pc:sldMkLst>
+          <pc:docMk/>
+          <pc:sldMk cId="2448947866" sldId="734"/>
+        </pc:sldMkLst>
+        <pc:graphicFrameChg chg="mod modGraphic">
+          <ac:chgData name="OLIVEIRA Caio" userId="56a7264e-9c39-4238-9707-ce8f921f56b1" providerId="ADAL" clId="{64B2F274-A096-4B38-9B91-669EA7A5250E}" dt="2024-08-01T21:49:33.814" v="258" actId="1076"/>
+          <ac:graphicFrameMkLst>
+            <pc:docMk/>
+            <pc:sldMk cId="2448947866" sldId="734"/>
+            <ac:graphicFrameMk id="5" creationId="{AD23D24C-29D8-22B6-50C8-0CBC6085835D}"/>
+          </ac:graphicFrameMkLst>
+        </pc:graphicFrameChg>
+      </pc:sldChg>
+    </pc:docChg>
+  </pc:docChgLst>
+  <pc:docChgLst>
+    <pc:chgData name="OLIVEIRA Caio" userId="56a7264e-9c39-4238-9707-ce8f921f56b1" providerId="ADAL" clId="{0F281342-F1AD-4CF5-BBAF-EAAE3D77943A}"/>
+    <pc:docChg chg="undo custSel addSld delSld modSld modSection">
+      <pc:chgData name="OLIVEIRA Caio" userId="56a7264e-9c39-4238-9707-ce8f921f56b1" providerId="ADAL" clId="{0F281342-F1AD-4CF5-BBAF-EAAE3D77943A}" dt="2024-10-10T14:27:21.866" v="294" actId="478"/>
+      <pc:docMkLst>
+        <pc:docMk/>
+      </pc:docMkLst>
+      <pc:sldChg chg="modSp mod">
+        <pc:chgData name="OLIVEIRA Caio" userId="56a7264e-9c39-4238-9707-ce8f921f56b1" providerId="ADAL" clId="{0F281342-F1AD-4CF5-BBAF-EAAE3D77943A}" dt="2024-10-09T22:00:16.364" v="10" actId="20577"/>
+        <pc:sldMkLst>
+          <pc:docMk/>
+          <pc:sldMk cId="3900553097" sldId="348"/>
+        </pc:sldMkLst>
+        <pc:spChg chg="mod">
+          <ac:chgData name="OLIVEIRA Caio" userId="56a7264e-9c39-4238-9707-ce8f921f56b1" providerId="ADAL" clId="{0F281342-F1AD-4CF5-BBAF-EAAE3D77943A}" dt="2024-10-09T22:00:14.440" v="6" actId="20577"/>
+          <ac:spMkLst>
+            <pc:docMk/>
+            <pc:sldMk cId="3900553097" sldId="348"/>
+            <ac:spMk id="3" creationId="{00000000-0000-0000-0000-000000000000}"/>
+          </ac:spMkLst>
+        </pc:spChg>
+        <pc:spChg chg="mod">
+          <ac:chgData name="OLIVEIRA Caio" userId="56a7264e-9c39-4238-9707-ce8f921f56b1" providerId="ADAL" clId="{0F281342-F1AD-4CF5-BBAF-EAAE3D77943A}" dt="2024-10-09T22:00:16.364" v="10" actId="20577"/>
+          <ac:spMkLst>
+            <pc:docMk/>
+            <pc:sldMk cId="3900553097" sldId="348"/>
+            <ac:spMk id="6" creationId="{00000000-0000-0000-0000-000000000000}"/>
+          </ac:spMkLst>
+        </pc:spChg>
+      </pc:sldChg>
+      <pc:sldChg chg="modSp mod">
+        <pc:chgData name="OLIVEIRA Caio" userId="56a7264e-9c39-4238-9707-ce8f921f56b1" providerId="ADAL" clId="{0F281342-F1AD-4CF5-BBAF-EAAE3D77943A}" dt="2024-10-09T22:01:03.810" v="26" actId="20577"/>
+        <pc:sldMkLst>
+          <pc:docMk/>
+          <pc:sldMk cId="355161130" sldId="716"/>
+        </pc:sldMkLst>
+        <pc:spChg chg="mod">
+          <ac:chgData name="OLIVEIRA Caio" userId="56a7264e-9c39-4238-9707-ce8f921f56b1" providerId="ADAL" clId="{0F281342-F1AD-4CF5-BBAF-EAAE3D77943A}" dt="2024-10-09T22:01:03.810" v="26" actId="20577"/>
+          <ac:spMkLst>
+            <pc:docMk/>
+            <pc:sldMk cId="355161130" sldId="716"/>
+            <ac:spMk id="2" creationId="{B12499F1-1C3F-4D39-879E-1CA91B16467D}"/>
+          </ac:spMkLst>
+        </pc:spChg>
+      </pc:sldChg>
+      <pc:sldChg chg="modSp mod">
+        <pc:chgData name="OLIVEIRA Caio" userId="56a7264e-9c39-4238-9707-ce8f921f56b1" providerId="ADAL" clId="{0F281342-F1AD-4CF5-BBAF-EAAE3D77943A}" dt="2024-10-09T22:01:14.072" v="29" actId="20577"/>
+        <pc:sldMkLst>
+          <pc:docMk/>
+          <pc:sldMk cId="2675303299" sldId="717"/>
+        </pc:sldMkLst>
+        <pc:spChg chg="mod">
+          <ac:chgData name="OLIVEIRA Caio" userId="56a7264e-9c39-4238-9707-ce8f921f56b1" providerId="ADAL" clId="{0F281342-F1AD-4CF5-BBAF-EAAE3D77943A}" dt="2024-10-09T22:01:14.072" v="29" actId="20577"/>
+          <ac:spMkLst>
+            <pc:docMk/>
+            <pc:sldMk cId="2675303299" sldId="717"/>
+            <ac:spMk id="2" creationId="{B12499F1-1C3F-4D39-879E-1CA91B16467D}"/>
+          </ac:spMkLst>
+        </pc:spChg>
+      </pc:sldChg>
+      <pc:sldChg chg="addSp delSp modSp mod">
+        <pc:chgData name="OLIVEIRA Caio" userId="56a7264e-9c39-4238-9707-ce8f921f56b1" providerId="ADAL" clId="{0F281342-F1AD-4CF5-BBAF-EAAE3D77943A}" dt="2024-10-10T14:27:21.866" v="294" actId="478"/>
+        <pc:sldMkLst>
+          <pc:docMk/>
+          <pc:sldMk cId="473989691" sldId="718"/>
+        </pc:sldMkLst>
+        <pc:spChg chg="mod">
+          <ac:chgData name="OLIVEIRA Caio" userId="56a7264e-9c39-4238-9707-ce8f921f56b1" providerId="ADAL" clId="{0F281342-F1AD-4CF5-BBAF-EAAE3D77943A}" dt="2024-10-09T22:00:43.113" v="23" actId="20577"/>
+          <ac:spMkLst>
+            <pc:docMk/>
+            <pc:sldMk cId="473989691" sldId="718"/>
+            <ac:spMk id="3" creationId="{E47AEACB-2C32-482B-BC10-2C2F64AF4448}"/>
+          </ac:spMkLst>
+        </pc:spChg>
+        <pc:graphicFrameChg chg="add del mod">
+          <ac:chgData name="OLIVEIRA Caio" userId="56a7264e-9c39-4238-9707-ce8f921f56b1" providerId="ADAL" clId="{0F281342-F1AD-4CF5-BBAF-EAAE3D77943A}" dt="2024-10-10T14:27:21.866" v="294" actId="478"/>
+          <ac:graphicFrameMkLst>
+            <pc:docMk/>
+            <pc:sldMk cId="473989691" sldId="718"/>
+            <ac:graphicFrameMk id="4" creationId="{B34634BA-E367-727F-128C-6FC4EB6982A0}"/>
+          </ac:graphicFrameMkLst>
+        </pc:graphicFrameChg>
+      </pc:sldChg>
+      <pc:sldChg chg="addSp delSp modSp mod">
+        <pc:chgData name="OLIVEIRA Caio" userId="56a7264e-9c39-4238-9707-ce8f921f56b1" providerId="ADAL" clId="{0F281342-F1AD-4CF5-BBAF-EAAE3D77943A}" dt="2024-10-09T22:17:25.349" v="134" actId="20577"/>
+        <pc:sldMkLst>
+          <pc:docMk/>
+          <pc:sldMk cId="441448050" sldId="719"/>
+        </pc:sldMkLst>
+        <pc:spChg chg="mod">
+          <ac:chgData name="OLIVEIRA Caio" userId="56a7264e-9c39-4238-9707-ce8f921f56b1" providerId="ADAL" clId="{0F281342-F1AD-4CF5-BBAF-EAAE3D77943A}" dt="2024-10-09T22:17:25.349" v="134" actId="20577"/>
+          <ac:spMkLst>
+            <pc:docMk/>
+            <pc:sldMk cId="441448050" sldId="719"/>
+            <ac:spMk id="2" creationId="{B12499F1-1C3F-4D39-879E-1CA91B16467D}"/>
+          </ac:spMkLst>
+        </pc:spChg>
+        <pc:spChg chg="mod">
+          <ac:chgData name="OLIVEIRA Caio" userId="56a7264e-9c39-4238-9707-ce8f921f56b1" providerId="ADAL" clId="{0F281342-F1AD-4CF5-BBAF-EAAE3D77943A}" dt="2024-10-09T22:17:12.477" v="110" actId="20577"/>
+          <ac:spMkLst>
+            <pc:docMk/>
+            <pc:sldMk cId="441448050" sldId="719"/>
+            <ac:spMk id="7" creationId="{DABBBDCF-1201-8067-E281-0187D65DF6AC}"/>
+          </ac:spMkLst>
+        </pc:spChg>
+        <pc:graphicFrameChg chg="add del modGraphic">
+          <ac:chgData name="OLIVEIRA Caio" userId="56a7264e-9c39-4238-9707-ce8f921f56b1" providerId="ADAL" clId="{0F281342-F1AD-4CF5-BBAF-EAAE3D77943A}" dt="2024-10-09T22:17:14.756" v="115" actId="478"/>
+          <ac:graphicFrameMkLst>
+            <pc:docMk/>
+            <pc:sldMk cId="441448050" sldId="719"/>
+            <ac:graphicFrameMk id="6" creationId="{F6AD1875-E718-3BA6-CDED-8162C89430EE}"/>
+          </ac:graphicFrameMkLst>
+        </pc:graphicFrameChg>
+        <pc:picChg chg="add del mod">
+          <ac:chgData name="OLIVEIRA Caio" userId="56a7264e-9c39-4238-9707-ce8f921f56b1" providerId="ADAL" clId="{0F281342-F1AD-4CF5-BBAF-EAAE3D77943A}" dt="2024-10-09T22:17:14.377" v="114" actId="22"/>
+          <ac:picMkLst>
+            <pc:docMk/>
+            <pc:sldMk cId="441448050" sldId="719"/>
+            <ac:picMk id="5" creationId="{20F514A1-60CB-6931-E015-A355AB83DA2E}"/>
+          </ac:picMkLst>
+        </pc:picChg>
+      </pc:sldChg>
+      <pc:sldChg chg="addSp delSp modSp add mod">
+        <pc:chgData name="OLIVEIRA Caio" userId="56a7264e-9c39-4238-9707-ce8f921f56b1" providerId="ADAL" clId="{0F281342-F1AD-4CF5-BBAF-EAAE3D77943A}" dt="2024-10-10T12:34:45.195" v="293" actId="20577"/>
+        <pc:sldMkLst>
+          <pc:docMk/>
+          <pc:sldMk cId="972143660" sldId="720"/>
+        </pc:sldMkLst>
+        <pc:spChg chg="mod">
+          <ac:chgData name="OLIVEIRA Caio" userId="56a7264e-9c39-4238-9707-ce8f921f56b1" providerId="ADAL" clId="{0F281342-F1AD-4CF5-BBAF-EAAE3D77943A}" dt="2024-10-09T22:01:27.609" v="51" actId="6549"/>
+          <ac:spMkLst>
+            <pc:docMk/>
+            <pc:sldMk cId="972143660" sldId="720"/>
+            <ac:spMk id="2" creationId="{607A9ADE-5D8A-F4D9-62C8-A922F8C01F56}"/>
+          </ac:spMkLst>
+        </pc:spChg>
+        <pc:spChg chg="mod">
+          <ac:chgData name="OLIVEIRA Caio" userId="56a7264e-9c39-4238-9707-ce8f921f56b1" providerId="ADAL" clId="{0F281342-F1AD-4CF5-BBAF-EAAE3D77943A}" dt="2024-10-10T12:34:45.195" v="293" actId="20577"/>
+          <ac:spMkLst>
+            <pc:docMk/>
+            <pc:sldMk cId="972143660" sldId="720"/>
+            <ac:spMk id="3" creationId="{D8E21981-8555-86EF-A068-18A688DEFD46}"/>
+          </ac:spMkLst>
+        </pc:spChg>
+        <pc:picChg chg="del">
+          <ac:chgData name="OLIVEIRA Caio" userId="56a7264e-9c39-4238-9707-ce8f921f56b1" providerId="ADAL" clId="{0F281342-F1AD-4CF5-BBAF-EAAE3D77943A}" dt="2024-10-09T22:01:53.073" v="52" actId="478"/>
+          <ac:picMkLst>
+            <pc:docMk/>
+            <pc:sldMk cId="972143660" sldId="720"/>
+            <ac:picMk id="5" creationId="{F0B7D7A2-793B-D86C-EFB4-B43AAE5DF36F}"/>
+          </ac:picMkLst>
+        </pc:picChg>
+        <pc:picChg chg="add mod">
+          <ac:chgData name="OLIVEIRA Caio" userId="56a7264e-9c39-4238-9707-ce8f921f56b1" providerId="ADAL" clId="{0F281342-F1AD-4CF5-BBAF-EAAE3D77943A}" dt="2024-10-09T22:03:01.559" v="81" actId="14100"/>
+          <ac:picMkLst>
+            <pc:docMk/>
+            <pc:sldMk cId="972143660" sldId="720"/>
+            <ac:picMk id="6" creationId="{285236B9-C870-C1BC-F7A9-0415225D4E2C}"/>
+          </ac:picMkLst>
+        </pc:picChg>
+      </pc:sldChg>
+      <pc:sldChg chg="addSp delSp modSp add mod">
+        <pc:chgData name="OLIVEIRA Caio" userId="56a7264e-9c39-4238-9707-ce8f921f56b1" providerId="ADAL" clId="{0F281342-F1AD-4CF5-BBAF-EAAE3D77943A}" dt="2024-10-09T22:27:45.829" v="259" actId="207"/>
+        <pc:sldMkLst>
+          <pc:docMk/>
+          <pc:sldMk cId="4075727788" sldId="721"/>
+        </pc:sldMkLst>
+        <pc:spChg chg="mod">
+          <ac:chgData name="OLIVEIRA Caio" userId="56a7264e-9c39-4238-9707-ce8f921f56b1" providerId="ADAL" clId="{0F281342-F1AD-4CF5-BBAF-EAAE3D77943A}" dt="2024-10-09T22:27:45.829" v="259" actId="207"/>
+          <ac:spMkLst>
+            <pc:docMk/>
+            <pc:sldMk cId="4075727788" sldId="721"/>
+            <ac:spMk id="3" creationId="{916D1DC2-0399-AE84-7032-8FA753E1D518}"/>
+          </ac:spMkLst>
+        </pc:spChg>
+        <pc:spChg chg="mod">
+          <ac:chgData name="OLIVEIRA Caio" userId="56a7264e-9c39-4238-9707-ce8f921f56b1" providerId="ADAL" clId="{0F281342-F1AD-4CF5-BBAF-EAAE3D77943A}" dt="2024-10-09T22:17:31.766" v="138" actId="20577"/>
+          <ac:spMkLst>
+            <pc:docMk/>
+            <pc:sldMk cId="4075727788" sldId="721"/>
+            <ac:spMk id="7" creationId="{A61AF022-43EC-8F7F-41B2-8012372D95A5}"/>
+          </ac:spMkLst>
+        </pc:spChg>
+        <pc:graphicFrameChg chg="del">
+          <ac:chgData name="OLIVEIRA Caio" userId="56a7264e-9c39-4238-9707-ce8f921f56b1" providerId="ADAL" clId="{0F281342-F1AD-4CF5-BBAF-EAAE3D77943A}" dt="2024-10-09T22:19:03.828" v="139" actId="478"/>
+          <ac:graphicFrameMkLst>
+            <pc:docMk/>
+            <pc:sldMk cId="4075727788" sldId="721"/>
+            <ac:graphicFrameMk id="6" creationId="{4BA8A884-6122-42C4-8BD1-20CEC87C22FA}"/>
+          </ac:graphicFrameMkLst>
+        </pc:graphicFrameChg>
+        <pc:graphicFrameChg chg="add mod">
+          <ac:chgData name="OLIVEIRA Caio" userId="56a7264e-9c39-4238-9707-ce8f921f56b1" providerId="ADAL" clId="{0F281342-F1AD-4CF5-BBAF-EAAE3D77943A}" dt="2024-10-09T22:23:10.968" v="225"/>
+          <ac:graphicFrameMkLst>
+            <pc:docMk/>
+            <pc:sldMk cId="4075727788" sldId="721"/>
+            <ac:graphicFrameMk id="8" creationId="{E112EA0E-3B08-9C1B-4601-BB360F6E7677}"/>
+          </ac:graphicFrameMkLst>
+        </pc:graphicFrameChg>
+        <pc:graphicFrameChg chg="add mod">
+          <ac:chgData name="OLIVEIRA Caio" userId="56a7264e-9c39-4238-9707-ce8f921f56b1" providerId="ADAL" clId="{0F281342-F1AD-4CF5-BBAF-EAAE3D77943A}" dt="2024-10-09T22:23:21.634" v="233"/>
+          <ac:graphicFrameMkLst>
+            <pc:docMk/>
+            <pc:sldMk cId="4075727788" sldId="721"/>
+            <ac:graphicFrameMk id="10" creationId="{7077080F-303C-749B-77C4-E798765EA410}"/>
+          </ac:graphicFrameMkLst>
+        </pc:graphicFrameChg>
+        <pc:picChg chg="add mod">
+          <ac:chgData name="OLIVEIRA Caio" userId="56a7264e-9c39-4238-9707-ce8f921f56b1" providerId="ADAL" clId="{0F281342-F1AD-4CF5-BBAF-EAAE3D77943A}" dt="2024-10-09T22:19:11.045" v="143" actId="1076"/>
+          <ac:picMkLst>
+            <pc:docMk/>
+            <pc:sldMk cId="4075727788" sldId="721"/>
+            <ac:picMk id="5" creationId="{0FC8E413-B9DB-A648-24C1-BFDFEDC7A61F}"/>
+          </ac:picMkLst>
+        </pc:picChg>
+        <pc:cxnChg chg="mod">
+          <ac:chgData name="OLIVEIRA Caio" userId="56a7264e-9c39-4238-9707-ce8f921f56b1" providerId="ADAL" clId="{0F281342-F1AD-4CF5-BBAF-EAAE3D77943A}" dt="2024-10-09T22:20:37.369" v="172" actId="1038"/>
+          <ac:cxnSpMkLst>
+            <pc:docMk/>
+            <pc:sldMk cId="4075727788" sldId="721"/>
+            <ac:cxnSpMk id="9" creationId="{1FD0D19D-C4C8-4F82-403A-96ECECD5F81A}"/>
+          </ac:cxnSpMkLst>
+        </pc:cxnChg>
+      </pc:sldChg>
+      <pc:sldChg chg="delSp add del mod">
+        <pc:chgData name="OLIVEIRA Caio" userId="56a7264e-9c39-4238-9707-ce8f921f56b1" providerId="ADAL" clId="{0F281342-F1AD-4CF5-BBAF-EAAE3D77943A}" dt="2024-10-09T22:38:51.989" v="273" actId="47"/>
+        <pc:sldMkLst>
+          <pc:docMk/>
+          <pc:sldMk cId="2284348680" sldId="722"/>
+        </pc:sldMkLst>
+        <pc:picChg chg="del">
+          <ac:chgData name="OLIVEIRA Caio" userId="56a7264e-9c39-4238-9707-ce8f921f56b1" providerId="ADAL" clId="{0F281342-F1AD-4CF5-BBAF-EAAE3D77943A}" dt="2024-10-09T22:37:41.631" v="261" actId="478"/>
+          <ac:picMkLst>
+            <pc:docMk/>
+            <pc:sldMk cId="2284348680" sldId="722"/>
+            <ac:picMk id="6" creationId="{3E7E2E3B-FD87-E0D4-EE1E-FE6CB63AB212}"/>
+          </ac:picMkLst>
+        </pc:picChg>
+      </pc:sldChg>
+      <pc:sldChg chg="addSp delSp modSp add mod">
+        <pc:chgData name="OLIVEIRA Caio" userId="56a7264e-9c39-4238-9707-ce8f921f56b1" providerId="ADAL" clId="{0F281342-F1AD-4CF5-BBAF-EAAE3D77943A}" dt="2024-10-09T22:38:43.867" v="272" actId="1076"/>
+        <pc:sldMkLst>
+          <pc:docMk/>
+          <pc:sldMk cId="1163888016" sldId="723"/>
+        </pc:sldMkLst>
+        <pc:picChg chg="add del mod">
+          <ac:chgData name="OLIVEIRA Caio" userId="56a7264e-9c39-4238-9707-ce8f921f56b1" providerId="ADAL" clId="{0F281342-F1AD-4CF5-BBAF-EAAE3D77943A}" dt="2024-10-09T22:38:38.412" v="269" actId="478"/>
+          <ac:picMkLst>
+            <pc:docMk/>
+            <pc:sldMk cId="1163888016" sldId="723"/>
+            <ac:picMk id="5" creationId="{32292F5D-8415-99F5-E2FD-9DBE17940F1F}"/>
+          </ac:picMkLst>
+        </pc:picChg>
+        <pc:picChg chg="del">
+          <ac:chgData name="OLIVEIRA Caio" userId="56a7264e-9c39-4238-9707-ce8f921f56b1" providerId="ADAL" clId="{0F281342-F1AD-4CF5-BBAF-EAAE3D77943A}" dt="2024-10-09T22:37:56.128" v="263" actId="478"/>
+          <ac:picMkLst>
+            <pc:docMk/>
+            <pc:sldMk cId="1163888016" sldId="723"/>
+            <ac:picMk id="6" creationId="{B0BB34CF-1399-72FF-72F1-340967669B21}"/>
+          </ac:picMkLst>
+        </pc:picChg>
+        <pc:picChg chg="add mod">
+          <ac:chgData name="OLIVEIRA Caio" userId="56a7264e-9c39-4238-9707-ce8f921f56b1" providerId="ADAL" clId="{0F281342-F1AD-4CF5-BBAF-EAAE3D77943A}" dt="2024-10-09T22:38:43.867" v="272" actId="1076"/>
+          <ac:picMkLst>
+            <pc:docMk/>
+            <pc:sldMk cId="1163888016" sldId="723"/>
+            <ac:picMk id="8" creationId="{9235B3A3-1C7F-0CEE-E94B-0E1D5CAF3875}"/>
           </ac:picMkLst>
         </pc:picChg>
       </pc:sldChg>
@@ -1651,714 +2512,6 @@
     </pc:docChg>
   </pc:docChgLst>
   <pc:docChgLst>
-    <pc:chgData name="OLIVEIRA Caio" userId="56a7264e-9c39-4238-9707-ce8f921f56b1" providerId="ADAL" clId="{39EF1533-FF8C-45BE-831F-342CE5239DAC}"/>
-    <pc:docChg chg="custSel modSld">
-      <pc:chgData name="OLIVEIRA Caio" userId="56a7264e-9c39-4238-9707-ce8f921f56b1" providerId="ADAL" clId="{39EF1533-FF8C-45BE-831F-342CE5239DAC}" dt="2024-08-02T23:16:46.098" v="80" actId="1076"/>
-      <pc:docMkLst>
-        <pc:docMk/>
-      </pc:docMkLst>
-      <pc:sldChg chg="modSp mod">
-        <pc:chgData name="OLIVEIRA Caio" userId="56a7264e-9c39-4238-9707-ce8f921f56b1" providerId="ADAL" clId="{39EF1533-FF8C-45BE-831F-342CE5239DAC}" dt="2024-08-02T22:48:58.594" v="10" actId="20577"/>
-        <pc:sldMkLst>
-          <pc:docMk/>
-          <pc:sldMk cId="3900553097" sldId="348"/>
-        </pc:sldMkLst>
-        <pc:spChg chg="mod">
-          <ac:chgData name="OLIVEIRA Caio" userId="56a7264e-9c39-4238-9707-ce8f921f56b1" providerId="ADAL" clId="{39EF1533-FF8C-45BE-831F-342CE5239DAC}" dt="2024-08-02T22:48:58.594" v="10" actId="20577"/>
-          <ac:spMkLst>
-            <pc:docMk/>
-            <pc:sldMk cId="3900553097" sldId="348"/>
-            <ac:spMk id="3" creationId="{00000000-0000-0000-0000-000000000000}"/>
-          </ac:spMkLst>
-        </pc:spChg>
-      </pc:sldChg>
-      <pc:sldChg chg="addSp delSp modSp mod">
-        <pc:chgData name="OLIVEIRA Caio" userId="56a7264e-9c39-4238-9707-ce8f921f56b1" providerId="ADAL" clId="{39EF1533-FF8C-45BE-831F-342CE5239DAC}" dt="2024-08-02T23:07:15.243" v="19" actId="1076"/>
-        <pc:sldMkLst>
-          <pc:docMk/>
-          <pc:sldMk cId="4168217179" sldId="721"/>
-        </pc:sldMkLst>
-        <pc:picChg chg="add del mod">
-          <ac:chgData name="OLIVEIRA Caio" userId="56a7264e-9c39-4238-9707-ce8f921f56b1" providerId="ADAL" clId="{39EF1533-FF8C-45BE-831F-342CE5239DAC}" dt="2024-08-02T23:05:24.652" v="14" actId="478"/>
-          <ac:picMkLst>
-            <pc:docMk/>
-            <pc:sldMk cId="4168217179" sldId="721"/>
-            <ac:picMk id="2" creationId="{14B7C641-70E1-93A3-04AF-977B6CF65C26}"/>
-          </ac:picMkLst>
-        </pc:picChg>
-        <pc:picChg chg="add del mod">
-          <ac:chgData name="OLIVEIRA Caio" userId="56a7264e-9c39-4238-9707-ce8f921f56b1" providerId="ADAL" clId="{39EF1533-FF8C-45BE-831F-342CE5239DAC}" dt="2024-08-02T23:07:10.954" v="17" actId="478"/>
-          <ac:picMkLst>
-            <pc:docMk/>
-            <pc:sldMk cId="4168217179" sldId="721"/>
-            <ac:picMk id="3" creationId="{6A75C436-47E6-E73B-E5F2-4182C1EF2CBB}"/>
-          </ac:picMkLst>
-        </pc:picChg>
-        <pc:picChg chg="add mod">
-          <ac:chgData name="OLIVEIRA Caio" userId="56a7264e-9c39-4238-9707-ce8f921f56b1" providerId="ADAL" clId="{39EF1533-FF8C-45BE-831F-342CE5239DAC}" dt="2024-08-02T23:07:15.243" v="19" actId="1076"/>
-          <ac:picMkLst>
-            <pc:docMk/>
-            <pc:sldMk cId="4168217179" sldId="721"/>
-            <ac:picMk id="7" creationId="{505B496D-6AB5-5F8B-544B-1B718F663AF7}"/>
-          </ac:picMkLst>
-        </pc:picChg>
-        <pc:picChg chg="del">
-          <ac:chgData name="OLIVEIRA Caio" userId="56a7264e-9c39-4238-9707-ce8f921f56b1" providerId="ADAL" clId="{39EF1533-FF8C-45BE-831F-342CE5239DAC}" dt="2024-08-02T23:04:50.583" v="11" actId="478"/>
-          <ac:picMkLst>
-            <pc:docMk/>
-            <pc:sldMk cId="4168217179" sldId="721"/>
-            <ac:picMk id="15" creationId="{4632A027-918D-93D9-2393-355078C0B55B}"/>
-          </ac:picMkLst>
-        </pc:picChg>
-      </pc:sldChg>
-      <pc:sldChg chg="addSp delSp modSp mod">
-        <pc:chgData name="OLIVEIRA Caio" userId="56a7264e-9c39-4238-9707-ce8f921f56b1" providerId="ADAL" clId="{39EF1533-FF8C-45BE-831F-342CE5239DAC}" dt="2024-08-02T23:07:55.149" v="28"/>
-        <pc:sldMkLst>
-          <pc:docMk/>
-          <pc:sldMk cId="3159271183" sldId="722"/>
-        </pc:sldMkLst>
-        <pc:spChg chg="add mod">
-          <ac:chgData name="OLIVEIRA Caio" userId="56a7264e-9c39-4238-9707-ce8f921f56b1" providerId="ADAL" clId="{39EF1533-FF8C-45BE-831F-342CE5239DAC}" dt="2024-08-02T23:07:55.149" v="28"/>
-          <ac:spMkLst>
-            <pc:docMk/>
-            <pc:sldMk cId="3159271183" sldId="722"/>
-            <ac:spMk id="7" creationId="{0EAB1B86-3A2B-4E89-5405-2713D93B9147}"/>
-          </ac:spMkLst>
-        </pc:spChg>
-        <pc:spChg chg="del">
-          <ac:chgData name="OLIVEIRA Caio" userId="56a7264e-9c39-4238-9707-ce8f921f56b1" providerId="ADAL" clId="{39EF1533-FF8C-45BE-831F-342CE5239DAC}" dt="2024-08-02T23:07:54.917" v="27" actId="478"/>
-          <ac:spMkLst>
-            <pc:docMk/>
-            <pc:sldMk cId="3159271183" sldId="722"/>
-            <ac:spMk id="10" creationId="{08BF51D8-9027-21BF-2C39-BE0DE6443D97}"/>
-          </ac:spMkLst>
-        </pc:spChg>
-        <pc:graphicFrameChg chg="add mod">
-          <ac:chgData name="OLIVEIRA Caio" userId="56a7264e-9c39-4238-9707-ce8f921f56b1" providerId="ADAL" clId="{39EF1533-FF8C-45BE-831F-342CE5239DAC}" dt="2024-08-02T23:07:38.024" v="22"/>
-          <ac:graphicFrameMkLst>
-            <pc:docMk/>
-            <pc:sldMk cId="3159271183" sldId="722"/>
-            <ac:graphicFrameMk id="3" creationId="{18FA1FAB-420D-2280-119D-EFD092632EFB}"/>
-          </ac:graphicFrameMkLst>
-        </pc:graphicFrameChg>
-        <pc:picChg chg="add mod">
-          <ac:chgData name="OLIVEIRA Caio" userId="56a7264e-9c39-4238-9707-ce8f921f56b1" providerId="ADAL" clId="{39EF1533-FF8C-45BE-831F-342CE5239DAC}" dt="2024-08-02T23:07:48.420" v="26" actId="1076"/>
-          <ac:picMkLst>
-            <pc:docMk/>
-            <pc:sldMk cId="3159271183" sldId="722"/>
-            <ac:picMk id="5" creationId="{BBE5AC62-8531-39AA-0A10-896D5C0771EE}"/>
-          </ac:picMkLst>
-        </pc:picChg>
-        <pc:picChg chg="del">
-          <ac:chgData name="OLIVEIRA Caio" userId="56a7264e-9c39-4238-9707-ce8f921f56b1" providerId="ADAL" clId="{39EF1533-FF8C-45BE-831F-342CE5239DAC}" dt="2024-08-02T23:07:45.037" v="25" actId="478"/>
-          <ac:picMkLst>
-            <pc:docMk/>
-            <pc:sldMk cId="3159271183" sldId="722"/>
-            <ac:picMk id="6" creationId="{68E45C9F-BF24-0AD8-16B6-DA84F89B05C1}"/>
-          </ac:picMkLst>
-        </pc:picChg>
-        <pc:picChg chg="del">
-          <ac:chgData name="OLIVEIRA Caio" userId="56a7264e-9c39-4238-9707-ce8f921f56b1" providerId="ADAL" clId="{39EF1533-FF8C-45BE-831F-342CE5239DAC}" dt="2024-08-02T23:07:54.917" v="27" actId="478"/>
-          <ac:picMkLst>
-            <pc:docMk/>
-            <pc:sldMk cId="3159271183" sldId="722"/>
-            <ac:picMk id="9" creationId="{74FC49D0-E7DE-8433-0570-AD5388B80551}"/>
-          </ac:picMkLst>
-        </pc:picChg>
-        <pc:picChg chg="add mod">
-          <ac:chgData name="OLIVEIRA Caio" userId="56a7264e-9c39-4238-9707-ce8f921f56b1" providerId="ADAL" clId="{39EF1533-FF8C-45BE-831F-342CE5239DAC}" dt="2024-08-02T23:07:55.149" v="28"/>
-          <ac:picMkLst>
-            <pc:docMk/>
-            <pc:sldMk cId="3159271183" sldId="722"/>
-            <ac:picMk id="11" creationId="{10C6EBE1-0563-4664-35A5-62CA8225D7CA}"/>
-          </ac:picMkLst>
-        </pc:picChg>
-      </pc:sldChg>
-      <pc:sldChg chg="addSp delSp modSp mod">
-        <pc:chgData name="OLIVEIRA Caio" userId="56a7264e-9c39-4238-9707-ce8f921f56b1" providerId="ADAL" clId="{39EF1533-FF8C-45BE-831F-342CE5239DAC}" dt="2024-08-02T23:15:15.522" v="70" actId="1076"/>
-        <pc:sldMkLst>
-          <pc:docMk/>
-          <pc:sldMk cId="2325547052" sldId="723"/>
-        </pc:sldMkLst>
-        <pc:picChg chg="del">
-          <ac:chgData name="OLIVEIRA Caio" userId="56a7264e-9c39-4238-9707-ce8f921f56b1" providerId="ADAL" clId="{39EF1533-FF8C-45BE-831F-342CE5239DAC}" dt="2024-08-02T23:08:23.266" v="31" actId="478"/>
-          <ac:picMkLst>
-            <pc:docMk/>
-            <pc:sldMk cId="2325547052" sldId="723"/>
-            <ac:picMk id="5" creationId="{AF9BDE04-3045-7700-F79B-1DB76360AAC4}"/>
-          </ac:picMkLst>
-        </pc:picChg>
-        <pc:picChg chg="add del mod">
-          <ac:chgData name="OLIVEIRA Caio" userId="56a7264e-9c39-4238-9707-ce8f921f56b1" providerId="ADAL" clId="{39EF1533-FF8C-45BE-831F-342CE5239DAC}" dt="2024-08-02T23:11:36.524" v="41" actId="478"/>
-          <ac:picMkLst>
-            <pc:docMk/>
-            <pc:sldMk cId="2325547052" sldId="723"/>
-            <ac:picMk id="6" creationId="{6777587F-9189-6D85-4B2C-7C7C7A82CA92}"/>
-          </ac:picMkLst>
-        </pc:picChg>
-        <pc:picChg chg="add del mod">
-          <ac:chgData name="OLIVEIRA Caio" userId="56a7264e-9c39-4238-9707-ce8f921f56b1" providerId="ADAL" clId="{39EF1533-FF8C-45BE-831F-342CE5239DAC}" dt="2024-08-02T23:15:12.799" v="68" actId="478"/>
-          <ac:picMkLst>
-            <pc:docMk/>
-            <pc:sldMk cId="2325547052" sldId="723"/>
-            <ac:picMk id="7" creationId="{8F5A8E4F-1345-ADBD-2744-3D1AA6AE0D4B}"/>
-          </ac:picMkLst>
-        </pc:picChg>
-        <pc:picChg chg="add mod">
-          <ac:chgData name="OLIVEIRA Caio" userId="56a7264e-9c39-4238-9707-ce8f921f56b1" providerId="ADAL" clId="{39EF1533-FF8C-45BE-831F-342CE5239DAC}" dt="2024-08-02T23:15:15.522" v="70" actId="1076"/>
-          <ac:picMkLst>
-            <pc:docMk/>
-            <pc:sldMk cId="2325547052" sldId="723"/>
-            <ac:picMk id="8" creationId="{77B844DE-F2F2-AF23-223D-2C803B511024}"/>
-          </ac:picMkLst>
-        </pc:picChg>
-      </pc:sldChg>
-      <pc:sldChg chg="addSp delSp modSp mod">
-        <pc:chgData name="OLIVEIRA Caio" userId="56a7264e-9c39-4238-9707-ce8f921f56b1" providerId="ADAL" clId="{39EF1533-FF8C-45BE-831F-342CE5239DAC}" dt="2024-08-02T23:08:47.381" v="37" actId="1076"/>
-        <pc:sldMkLst>
-          <pc:docMk/>
-          <pc:sldMk cId="1595295665" sldId="724"/>
-        </pc:sldMkLst>
-        <pc:picChg chg="del">
-          <ac:chgData name="OLIVEIRA Caio" userId="56a7264e-9c39-4238-9707-ce8f921f56b1" providerId="ADAL" clId="{39EF1533-FF8C-45BE-831F-342CE5239DAC}" dt="2024-08-02T23:08:45.378" v="36" actId="478"/>
-          <ac:picMkLst>
-            <pc:docMk/>
-            <pc:sldMk cId="1595295665" sldId="724"/>
-            <ac:picMk id="2" creationId="{11BB514B-375D-A53B-ECBA-DD082D94744C}"/>
-          </ac:picMkLst>
-        </pc:picChg>
-        <pc:picChg chg="add mod">
-          <ac:chgData name="OLIVEIRA Caio" userId="56a7264e-9c39-4238-9707-ce8f921f56b1" providerId="ADAL" clId="{39EF1533-FF8C-45BE-831F-342CE5239DAC}" dt="2024-08-02T23:08:47.381" v="37" actId="1076"/>
-          <ac:picMkLst>
-            <pc:docMk/>
-            <pc:sldMk cId="1595295665" sldId="724"/>
-            <ac:picMk id="4" creationId="{2D2475A6-257E-F99D-0733-39EF1ED57C65}"/>
-          </ac:picMkLst>
-        </pc:picChg>
-      </pc:sldChg>
-      <pc:sldChg chg="addSp delSp modSp mod">
-        <pc:chgData name="OLIVEIRA Caio" userId="56a7264e-9c39-4238-9707-ce8f921f56b1" providerId="ADAL" clId="{39EF1533-FF8C-45BE-831F-342CE5239DAC}" dt="2024-08-02T23:15:00.094" v="67" actId="1076"/>
-        <pc:sldMkLst>
-          <pc:docMk/>
-          <pc:sldMk cId="2074372884" sldId="725"/>
-        </pc:sldMkLst>
-        <pc:picChg chg="del">
-          <ac:chgData name="OLIVEIRA Caio" userId="56a7264e-9c39-4238-9707-ce8f921f56b1" providerId="ADAL" clId="{39EF1533-FF8C-45BE-831F-342CE5239DAC}" dt="2024-08-02T23:12:24.538" v="45" actId="478"/>
-          <ac:picMkLst>
-            <pc:docMk/>
-            <pc:sldMk cId="2074372884" sldId="725"/>
-            <ac:picMk id="4" creationId="{056B4D05-B5FD-9E4C-5598-9770F9A8149A}"/>
-          </ac:picMkLst>
-        </pc:picChg>
-        <pc:picChg chg="add del mod">
-          <ac:chgData name="OLIVEIRA Caio" userId="56a7264e-9c39-4238-9707-ce8f921f56b1" providerId="ADAL" clId="{39EF1533-FF8C-45BE-831F-342CE5239DAC}" dt="2024-08-02T23:11:48.180" v="43" actId="478"/>
-          <ac:picMkLst>
-            <pc:docMk/>
-            <pc:sldMk cId="2074372884" sldId="725"/>
-            <ac:picMk id="6" creationId="{D7F74476-2F05-77EE-4FFD-49FF1D43B4A7}"/>
-          </ac:picMkLst>
-        </pc:picChg>
-        <pc:picChg chg="add del mod">
-          <ac:chgData name="OLIVEIRA Caio" userId="56a7264e-9c39-4238-9707-ce8f921f56b1" providerId="ADAL" clId="{39EF1533-FF8C-45BE-831F-342CE5239DAC}" dt="2024-08-02T23:14:57.486" v="66" actId="478"/>
-          <ac:picMkLst>
-            <pc:docMk/>
-            <pc:sldMk cId="2074372884" sldId="725"/>
-            <ac:picMk id="7" creationId="{A2B3B481-51C8-3644-E440-25AD20ACD419}"/>
-          </ac:picMkLst>
-        </pc:picChg>
-        <pc:picChg chg="add mod">
-          <ac:chgData name="OLIVEIRA Caio" userId="56a7264e-9c39-4238-9707-ce8f921f56b1" providerId="ADAL" clId="{39EF1533-FF8C-45BE-831F-342CE5239DAC}" dt="2024-08-02T23:15:00.094" v="67" actId="1076"/>
-          <ac:picMkLst>
-            <pc:docMk/>
-            <pc:sldMk cId="2074372884" sldId="725"/>
-            <ac:picMk id="8" creationId="{CC6B638C-2C79-8585-C3E0-1F423FA6FEB7}"/>
-          </ac:picMkLst>
-        </pc:picChg>
-      </pc:sldChg>
-      <pc:sldChg chg="addSp delSp modSp mod">
-        <pc:chgData name="OLIVEIRA Caio" userId="56a7264e-9c39-4238-9707-ce8f921f56b1" providerId="ADAL" clId="{39EF1533-FF8C-45BE-831F-342CE5239DAC}" dt="2024-08-02T23:12:50.917" v="50" actId="1076"/>
-        <pc:sldMkLst>
-          <pc:docMk/>
-          <pc:sldMk cId="4174650935" sldId="726"/>
-        </pc:sldMkLst>
-        <pc:picChg chg="add mod">
-          <ac:chgData name="OLIVEIRA Caio" userId="56a7264e-9c39-4238-9707-ce8f921f56b1" providerId="ADAL" clId="{39EF1533-FF8C-45BE-831F-342CE5239DAC}" dt="2024-08-02T23:12:50.917" v="50" actId="1076"/>
-          <ac:picMkLst>
-            <pc:docMk/>
-            <pc:sldMk cId="4174650935" sldId="726"/>
-            <ac:picMk id="4" creationId="{936A7893-802D-1521-67FE-402F6F9C2308}"/>
-          </ac:picMkLst>
-        </pc:picChg>
-        <pc:picChg chg="del">
-          <ac:chgData name="OLIVEIRA Caio" userId="56a7264e-9c39-4238-9707-ce8f921f56b1" providerId="ADAL" clId="{39EF1533-FF8C-45BE-831F-342CE5239DAC}" dt="2024-08-02T23:12:48.226" v="49" actId="478"/>
-          <ac:picMkLst>
-            <pc:docMk/>
-            <pc:sldMk cId="4174650935" sldId="726"/>
-            <ac:picMk id="8" creationId="{A4898C6A-F81D-4D48-A0BF-CB0B2AE0CBCC}"/>
-          </ac:picMkLst>
-        </pc:picChg>
-      </pc:sldChg>
-      <pc:sldChg chg="addSp delSp modSp mod">
-        <pc:chgData name="OLIVEIRA Caio" userId="56a7264e-9c39-4238-9707-ce8f921f56b1" providerId="ADAL" clId="{39EF1533-FF8C-45BE-831F-342CE5239DAC}" dt="2024-08-02T23:14:41.848" v="64" actId="1076"/>
-        <pc:sldMkLst>
-          <pc:docMk/>
-          <pc:sldMk cId="874457255" sldId="727"/>
-        </pc:sldMkLst>
-        <pc:picChg chg="add del mod">
-          <ac:chgData name="OLIVEIRA Caio" userId="56a7264e-9c39-4238-9707-ce8f921f56b1" providerId="ADAL" clId="{39EF1533-FF8C-45BE-831F-342CE5239DAC}" dt="2024-08-02T23:14:40.091" v="63" actId="478"/>
-          <ac:picMkLst>
-            <pc:docMk/>
-            <pc:sldMk cId="874457255" sldId="727"/>
-            <ac:picMk id="3" creationId="{7D55DBF0-BD06-0E80-1A02-5E9E43D8F862}"/>
-          </ac:picMkLst>
-        </pc:picChg>
-        <pc:picChg chg="del">
-          <ac:chgData name="OLIVEIRA Caio" userId="56a7264e-9c39-4238-9707-ce8f921f56b1" providerId="ADAL" clId="{39EF1533-FF8C-45BE-831F-342CE5239DAC}" dt="2024-08-02T23:13:01.770" v="51" actId="478"/>
-          <ac:picMkLst>
-            <pc:docMk/>
-            <pc:sldMk cId="874457255" sldId="727"/>
-            <ac:picMk id="8" creationId="{949E5473-72FE-0F40-C9EC-DBA5B42B75FD}"/>
-          </ac:picMkLst>
-        </pc:picChg>
-        <pc:picChg chg="add mod">
-          <ac:chgData name="OLIVEIRA Caio" userId="56a7264e-9c39-4238-9707-ce8f921f56b1" providerId="ADAL" clId="{39EF1533-FF8C-45BE-831F-342CE5239DAC}" dt="2024-08-02T23:14:41.848" v="64" actId="1076"/>
-          <ac:picMkLst>
-            <pc:docMk/>
-            <pc:sldMk cId="874457255" sldId="727"/>
-            <ac:picMk id="9" creationId="{20919F60-C581-8ECB-7F1D-717422A0E950}"/>
-          </ac:picMkLst>
-        </pc:picChg>
-      </pc:sldChg>
-      <pc:sldChg chg="addSp delSp modSp mod">
-        <pc:chgData name="OLIVEIRA Caio" userId="56a7264e-9c39-4238-9707-ce8f921f56b1" providerId="ADAL" clId="{39EF1533-FF8C-45BE-831F-342CE5239DAC}" dt="2024-08-02T23:14:27.615" v="61" actId="1076"/>
-        <pc:sldMkLst>
-          <pc:docMk/>
-          <pc:sldMk cId="3078111408" sldId="728"/>
-        </pc:sldMkLst>
-        <pc:picChg chg="add del">
-          <ac:chgData name="OLIVEIRA Caio" userId="56a7264e-9c39-4238-9707-ce8f921f56b1" providerId="ADAL" clId="{39EF1533-FF8C-45BE-831F-342CE5239DAC}" dt="2024-08-02T23:13:27.463" v="56" actId="478"/>
-          <ac:picMkLst>
-            <pc:docMk/>
-            <pc:sldMk cId="3078111408" sldId="728"/>
-            <ac:picMk id="4" creationId="{505C75F4-111E-1885-A502-7B98EB203F65}"/>
-          </ac:picMkLst>
-        </pc:picChg>
-        <pc:picChg chg="del">
-          <ac:chgData name="OLIVEIRA Caio" userId="56a7264e-9c39-4238-9707-ce8f921f56b1" providerId="ADAL" clId="{39EF1533-FF8C-45BE-831F-342CE5239DAC}" dt="2024-08-02T23:13:20.130" v="54" actId="478"/>
-          <ac:picMkLst>
-            <pc:docMk/>
-            <pc:sldMk cId="3078111408" sldId="728"/>
-            <ac:picMk id="8" creationId="{27C45D7A-B899-C9B5-DA7F-F8C4B9434844}"/>
-          </ac:picMkLst>
-        </pc:picChg>
-        <pc:picChg chg="add del mod">
-          <ac:chgData name="OLIVEIRA Caio" userId="56a7264e-9c39-4238-9707-ce8f921f56b1" providerId="ADAL" clId="{39EF1533-FF8C-45BE-831F-342CE5239DAC}" dt="2024-08-02T23:14:23.551" v="59" actId="478"/>
-          <ac:picMkLst>
-            <pc:docMk/>
-            <pc:sldMk cId="3078111408" sldId="728"/>
-            <ac:picMk id="9" creationId="{627A4DFF-187D-93DC-1252-5BFA57DA3E15}"/>
-          </ac:picMkLst>
-        </pc:picChg>
-        <pc:picChg chg="add mod">
-          <ac:chgData name="OLIVEIRA Caio" userId="56a7264e-9c39-4238-9707-ce8f921f56b1" providerId="ADAL" clId="{39EF1533-FF8C-45BE-831F-342CE5239DAC}" dt="2024-08-02T23:14:27.615" v="61" actId="1076"/>
-          <ac:picMkLst>
-            <pc:docMk/>
-            <pc:sldMk cId="3078111408" sldId="728"/>
-            <ac:picMk id="10" creationId="{7F030280-516C-FBF0-5878-F3B4EA69643C}"/>
-          </ac:picMkLst>
-        </pc:picChg>
-      </pc:sldChg>
-      <pc:sldChg chg="addSp delSp modSp mod">
-        <pc:chgData name="OLIVEIRA Caio" userId="56a7264e-9c39-4238-9707-ce8f921f56b1" providerId="ADAL" clId="{39EF1533-FF8C-45BE-831F-342CE5239DAC}" dt="2024-08-02T23:15:49.327" v="73" actId="1076"/>
-        <pc:sldMkLst>
-          <pc:docMk/>
-          <pc:sldMk cId="2002950431" sldId="730"/>
-        </pc:sldMkLst>
-        <pc:picChg chg="add mod">
-          <ac:chgData name="OLIVEIRA Caio" userId="56a7264e-9c39-4238-9707-ce8f921f56b1" providerId="ADAL" clId="{39EF1533-FF8C-45BE-831F-342CE5239DAC}" dt="2024-08-02T23:15:49.327" v="73" actId="1076"/>
-          <ac:picMkLst>
-            <pc:docMk/>
-            <pc:sldMk cId="2002950431" sldId="730"/>
-            <ac:picMk id="2" creationId="{C60DF78C-604E-669E-BE89-8911C6EEE976}"/>
-          </ac:picMkLst>
-        </pc:picChg>
-        <pc:picChg chg="del">
-          <ac:chgData name="OLIVEIRA Caio" userId="56a7264e-9c39-4238-9707-ce8f921f56b1" providerId="ADAL" clId="{39EF1533-FF8C-45BE-831F-342CE5239DAC}" dt="2024-08-02T23:15:46.573" v="72" actId="478"/>
-          <ac:picMkLst>
-            <pc:docMk/>
-            <pc:sldMk cId="2002950431" sldId="730"/>
-            <ac:picMk id="3" creationId="{4E2C1BC9-4963-9F55-912B-16B7CD62F2D3}"/>
-          </ac:picMkLst>
-        </pc:picChg>
-      </pc:sldChg>
-      <pc:sldChg chg="addSp delSp modSp mod">
-        <pc:chgData name="OLIVEIRA Caio" userId="56a7264e-9c39-4238-9707-ce8f921f56b1" providerId="ADAL" clId="{39EF1533-FF8C-45BE-831F-342CE5239DAC}" dt="2024-08-02T23:16:11.123" v="76" actId="1076"/>
-        <pc:sldMkLst>
-          <pc:docMk/>
-          <pc:sldMk cId="332661816" sldId="732"/>
-        </pc:sldMkLst>
-        <pc:picChg chg="add mod">
-          <ac:chgData name="OLIVEIRA Caio" userId="56a7264e-9c39-4238-9707-ce8f921f56b1" providerId="ADAL" clId="{39EF1533-FF8C-45BE-831F-342CE5239DAC}" dt="2024-08-02T23:16:11.123" v="76" actId="1076"/>
-          <ac:picMkLst>
-            <pc:docMk/>
-            <pc:sldMk cId="332661816" sldId="732"/>
-            <ac:picMk id="2" creationId="{706B9896-F54C-6F7E-17AE-B495E1FFE6A8}"/>
-          </ac:picMkLst>
-        </pc:picChg>
-        <pc:picChg chg="del">
-          <ac:chgData name="OLIVEIRA Caio" userId="56a7264e-9c39-4238-9707-ce8f921f56b1" providerId="ADAL" clId="{39EF1533-FF8C-45BE-831F-342CE5239DAC}" dt="2024-08-02T23:16:07.831" v="75" actId="478"/>
-          <ac:picMkLst>
-            <pc:docMk/>
-            <pc:sldMk cId="332661816" sldId="732"/>
-            <ac:picMk id="3" creationId="{7896158F-FE58-8A80-160F-BE5F174F21E8}"/>
-          </ac:picMkLst>
-        </pc:picChg>
-      </pc:sldChg>
-      <pc:sldChg chg="addSp delSp modSp mod">
-        <pc:chgData name="OLIVEIRA Caio" userId="56a7264e-9c39-4238-9707-ce8f921f56b1" providerId="ADAL" clId="{39EF1533-FF8C-45BE-831F-342CE5239DAC}" dt="2024-08-02T23:16:46.098" v="80" actId="1076"/>
-        <pc:sldMkLst>
-          <pc:docMk/>
-          <pc:sldMk cId="3049616452" sldId="733"/>
-        </pc:sldMkLst>
-        <pc:picChg chg="del">
-          <ac:chgData name="OLIVEIRA Caio" userId="56a7264e-9c39-4238-9707-ce8f921f56b1" providerId="ADAL" clId="{39EF1533-FF8C-45BE-831F-342CE5239DAC}" dt="2024-08-02T23:16:41.040" v="77" actId="478"/>
-          <ac:picMkLst>
-            <pc:docMk/>
-            <pc:sldMk cId="3049616452" sldId="733"/>
-            <ac:picMk id="3" creationId="{B8A11036-0111-AAC4-0CAD-DF5A1FE74BC3}"/>
-          </ac:picMkLst>
-        </pc:picChg>
-        <pc:picChg chg="add mod">
-          <ac:chgData name="OLIVEIRA Caio" userId="56a7264e-9c39-4238-9707-ce8f921f56b1" providerId="ADAL" clId="{39EF1533-FF8C-45BE-831F-342CE5239DAC}" dt="2024-08-02T23:16:46.098" v="80" actId="1076"/>
-          <ac:picMkLst>
-            <pc:docMk/>
-            <pc:sldMk cId="3049616452" sldId="733"/>
-            <ac:picMk id="4" creationId="{CBD6E218-B01D-909B-F4CB-CB54DF8A6D5E}"/>
-          </ac:picMkLst>
-        </pc:picChg>
-      </pc:sldChg>
-    </pc:docChg>
-  </pc:docChgLst>
-  <pc:docChgLst>
-    <pc:chgData name="OLIVEIRA Caio" userId="56a7264e-9c39-4238-9707-ce8f921f56b1" providerId="ADAL" clId="{0F281342-F1AD-4CF5-BBAF-EAAE3D77943A}"/>
-    <pc:docChg chg="undo custSel addSld delSld modSld modSection">
-      <pc:chgData name="OLIVEIRA Caio" userId="56a7264e-9c39-4238-9707-ce8f921f56b1" providerId="ADAL" clId="{0F281342-F1AD-4CF5-BBAF-EAAE3D77943A}" dt="2024-10-10T14:27:21.866" v="294" actId="478"/>
-      <pc:docMkLst>
-        <pc:docMk/>
-      </pc:docMkLst>
-      <pc:sldChg chg="modSp mod">
-        <pc:chgData name="OLIVEIRA Caio" userId="56a7264e-9c39-4238-9707-ce8f921f56b1" providerId="ADAL" clId="{0F281342-F1AD-4CF5-BBAF-EAAE3D77943A}" dt="2024-10-09T22:00:16.364" v="10" actId="20577"/>
-        <pc:sldMkLst>
-          <pc:docMk/>
-          <pc:sldMk cId="3900553097" sldId="348"/>
-        </pc:sldMkLst>
-        <pc:spChg chg="mod">
-          <ac:chgData name="OLIVEIRA Caio" userId="56a7264e-9c39-4238-9707-ce8f921f56b1" providerId="ADAL" clId="{0F281342-F1AD-4CF5-BBAF-EAAE3D77943A}" dt="2024-10-09T22:00:14.440" v="6" actId="20577"/>
-          <ac:spMkLst>
-            <pc:docMk/>
-            <pc:sldMk cId="3900553097" sldId="348"/>
-            <ac:spMk id="3" creationId="{00000000-0000-0000-0000-000000000000}"/>
-          </ac:spMkLst>
-        </pc:spChg>
-        <pc:spChg chg="mod">
-          <ac:chgData name="OLIVEIRA Caio" userId="56a7264e-9c39-4238-9707-ce8f921f56b1" providerId="ADAL" clId="{0F281342-F1AD-4CF5-BBAF-EAAE3D77943A}" dt="2024-10-09T22:00:16.364" v="10" actId="20577"/>
-          <ac:spMkLst>
-            <pc:docMk/>
-            <pc:sldMk cId="3900553097" sldId="348"/>
-            <ac:spMk id="6" creationId="{00000000-0000-0000-0000-000000000000}"/>
-          </ac:spMkLst>
-        </pc:spChg>
-      </pc:sldChg>
-      <pc:sldChg chg="modSp mod">
-        <pc:chgData name="OLIVEIRA Caio" userId="56a7264e-9c39-4238-9707-ce8f921f56b1" providerId="ADAL" clId="{0F281342-F1AD-4CF5-BBAF-EAAE3D77943A}" dt="2024-10-09T22:01:03.810" v="26" actId="20577"/>
-        <pc:sldMkLst>
-          <pc:docMk/>
-          <pc:sldMk cId="355161130" sldId="716"/>
-        </pc:sldMkLst>
-        <pc:spChg chg="mod">
-          <ac:chgData name="OLIVEIRA Caio" userId="56a7264e-9c39-4238-9707-ce8f921f56b1" providerId="ADAL" clId="{0F281342-F1AD-4CF5-BBAF-EAAE3D77943A}" dt="2024-10-09T22:01:03.810" v="26" actId="20577"/>
-          <ac:spMkLst>
-            <pc:docMk/>
-            <pc:sldMk cId="355161130" sldId="716"/>
-            <ac:spMk id="2" creationId="{B12499F1-1C3F-4D39-879E-1CA91B16467D}"/>
-          </ac:spMkLst>
-        </pc:spChg>
-      </pc:sldChg>
-      <pc:sldChg chg="modSp mod">
-        <pc:chgData name="OLIVEIRA Caio" userId="56a7264e-9c39-4238-9707-ce8f921f56b1" providerId="ADAL" clId="{0F281342-F1AD-4CF5-BBAF-EAAE3D77943A}" dt="2024-10-09T22:01:14.072" v="29" actId="20577"/>
-        <pc:sldMkLst>
-          <pc:docMk/>
-          <pc:sldMk cId="2675303299" sldId="717"/>
-        </pc:sldMkLst>
-        <pc:spChg chg="mod">
-          <ac:chgData name="OLIVEIRA Caio" userId="56a7264e-9c39-4238-9707-ce8f921f56b1" providerId="ADAL" clId="{0F281342-F1AD-4CF5-BBAF-EAAE3D77943A}" dt="2024-10-09T22:01:14.072" v="29" actId="20577"/>
-          <ac:spMkLst>
-            <pc:docMk/>
-            <pc:sldMk cId="2675303299" sldId="717"/>
-            <ac:spMk id="2" creationId="{B12499F1-1C3F-4D39-879E-1CA91B16467D}"/>
-          </ac:spMkLst>
-        </pc:spChg>
-      </pc:sldChg>
-      <pc:sldChg chg="addSp delSp modSp mod">
-        <pc:chgData name="OLIVEIRA Caio" userId="56a7264e-9c39-4238-9707-ce8f921f56b1" providerId="ADAL" clId="{0F281342-F1AD-4CF5-BBAF-EAAE3D77943A}" dt="2024-10-10T14:27:21.866" v="294" actId="478"/>
-        <pc:sldMkLst>
-          <pc:docMk/>
-          <pc:sldMk cId="473989691" sldId="718"/>
-        </pc:sldMkLst>
-        <pc:spChg chg="mod">
-          <ac:chgData name="OLIVEIRA Caio" userId="56a7264e-9c39-4238-9707-ce8f921f56b1" providerId="ADAL" clId="{0F281342-F1AD-4CF5-BBAF-EAAE3D77943A}" dt="2024-10-09T22:00:43.113" v="23" actId="20577"/>
-          <ac:spMkLst>
-            <pc:docMk/>
-            <pc:sldMk cId="473989691" sldId="718"/>
-            <ac:spMk id="3" creationId="{E47AEACB-2C32-482B-BC10-2C2F64AF4448}"/>
-          </ac:spMkLst>
-        </pc:spChg>
-        <pc:graphicFrameChg chg="add del mod">
-          <ac:chgData name="OLIVEIRA Caio" userId="56a7264e-9c39-4238-9707-ce8f921f56b1" providerId="ADAL" clId="{0F281342-F1AD-4CF5-BBAF-EAAE3D77943A}" dt="2024-10-10T14:27:21.866" v="294" actId="478"/>
-          <ac:graphicFrameMkLst>
-            <pc:docMk/>
-            <pc:sldMk cId="473989691" sldId="718"/>
-            <ac:graphicFrameMk id="4" creationId="{B34634BA-E367-727F-128C-6FC4EB6982A0}"/>
-          </ac:graphicFrameMkLst>
-        </pc:graphicFrameChg>
-      </pc:sldChg>
-      <pc:sldChg chg="addSp delSp modSp mod">
-        <pc:chgData name="OLIVEIRA Caio" userId="56a7264e-9c39-4238-9707-ce8f921f56b1" providerId="ADAL" clId="{0F281342-F1AD-4CF5-BBAF-EAAE3D77943A}" dt="2024-10-09T22:17:25.349" v="134" actId="20577"/>
-        <pc:sldMkLst>
-          <pc:docMk/>
-          <pc:sldMk cId="441448050" sldId="719"/>
-        </pc:sldMkLst>
-        <pc:spChg chg="mod">
-          <ac:chgData name="OLIVEIRA Caio" userId="56a7264e-9c39-4238-9707-ce8f921f56b1" providerId="ADAL" clId="{0F281342-F1AD-4CF5-BBAF-EAAE3D77943A}" dt="2024-10-09T22:17:25.349" v="134" actId="20577"/>
-          <ac:spMkLst>
-            <pc:docMk/>
-            <pc:sldMk cId="441448050" sldId="719"/>
-            <ac:spMk id="2" creationId="{B12499F1-1C3F-4D39-879E-1CA91B16467D}"/>
-          </ac:spMkLst>
-        </pc:spChg>
-        <pc:spChg chg="mod">
-          <ac:chgData name="OLIVEIRA Caio" userId="56a7264e-9c39-4238-9707-ce8f921f56b1" providerId="ADAL" clId="{0F281342-F1AD-4CF5-BBAF-EAAE3D77943A}" dt="2024-10-09T22:17:12.477" v="110" actId="20577"/>
-          <ac:spMkLst>
-            <pc:docMk/>
-            <pc:sldMk cId="441448050" sldId="719"/>
-            <ac:spMk id="7" creationId="{DABBBDCF-1201-8067-E281-0187D65DF6AC}"/>
-          </ac:spMkLst>
-        </pc:spChg>
-        <pc:graphicFrameChg chg="add del modGraphic">
-          <ac:chgData name="OLIVEIRA Caio" userId="56a7264e-9c39-4238-9707-ce8f921f56b1" providerId="ADAL" clId="{0F281342-F1AD-4CF5-BBAF-EAAE3D77943A}" dt="2024-10-09T22:17:14.756" v="115" actId="478"/>
-          <ac:graphicFrameMkLst>
-            <pc:docMk/>
-            <pc:sldMk cId="441448050" sldId="719"/>
-            <ac:graphicFrameMk id="6" creationId="{F6AD1875-E718-3BA6-CDED-8162C89430EE}"/>
-          </ac:graphicFrameMkLst>
-        </pc:graphicFrameChg>
-        <pc:picChg chg="add del mod">
-          <ac:chgData name="OLIVEIRA Caio" userId="56a7264e-9c39-4238-9707-ce8f921f56b1" providerId="ADAL" clId="{0F281342-F1AD-4CF5-BBAF-EAAE3D77943A}" dt="2024-10-09T22:17:14.377" v="114" actId="22"/>
-          <ac:picMkLst>
-            <pc:docMk/>
-            <pc:sldMk cId="441448050" sldId="719"/>
-            <ac:picMk id="5" creationId="{20F514A1-60CB-6931-E015-A355AB83DA2E}"/>
-          </ac:picMkLst>
-        </pc:picChg>
-      </pc:sldChg>
-      <pc:sldChg chg="addSp delSp modSp add mod">
-        <pc:chgData name="OLIVEIRA Caio" userId="56a7264e-9c39-4238-9707-ce8f921f56b1" providerId="ADAL" clId="{0F281342-F1AD-4CF5-BBAF-EAAE3D77943A}" dt="2024-10-10T12:34:45.195" v="293" actId="20577"/>
-        <pc:sldMkLst>
-          <pc:docMk/>
-          <pc:sldMk cId="972143660" sldId="720"/>
-        </pc:sldMkLst>
-        <pc:spChg chg="mod">
-          <ac:chgData name="OLIVEIRA Caio" userId="56a7264e-9c39-4238-9707-ce8f921f56b1" providerId="ADAL" clId="{0F281342-F1AD-4CF5-BBAF-EAAE3D77943A}" dt="2024-10-09T22:01:27.609" v="51" actId="6549"/>
-          <ac:spMkLst>
-            <pc:docMk/>
-            <pc:sldMk cId="972143660" sldId="720"/>
-            <ac:spMk id="2" creationId="{607A9ADE-5D8A-F4D9-62C8-A922F8C01F56}"/>
-          </ac:spMkLst>
-        </pc:spChg>
-        <pc:spChg chg="mod">
-          <ac:chgData name="OLIVEIRA Caio" userId="56a7264e-9c39-4238-9707-ce8f921f56b1" providerId="ADAL" clId="{0F281342-F1AD-4CF5-BBAF-EAAE3D77943A}" dt="2024-10-10T12:34:45.195" v="293" actId="20577"/>
-          <ac:spMkLst>
-            <pc:docMk/>
-            <pc:sldMk cId="972143660" sldId="720"/>
-            <ac:spMk id="3" creationId="{D8E21981-8555-86EF-A068-18A688DEFD46}"/>
-          </ac:spMkLst>
-        </pc:spChg>
-        <pc:picChg chg="del">
-          <ac:chgData name="OLIVEIRA Caio" userId="56a7264e-9c39-4238-9707-ce8f921f56b1" providerId="ADAL" clId="{0F281342-F1AD-4CF5-BBAF-EAAE3D77943A}" dt="2024-10-09T22:01:53.073" v="52" actId="478"/>
-          <ac:picMkLst>
-            <pc:docMk/>
-            <pc:sldMk cId="972143660" sldId="720"/>
-            <ac:picMk id="5" creationId="{F0B7D7A2-793B-D86C-EFB4-B43AAE5DF36F}"/>
-          </ac:picMkLst>
-        </pc:picChg>
-        <pc:picChg chg="add mod">
-          <ac:chgData name="OLIVEIRA Caio" userId="56a7264e-9c39-4238-9707-ce8f921f56b1" providerId="ADAL" clId="{0F281342-F1AD-4CF5-BBAF-EAAE3D77943A}" dt="2024-10-09T22:03:01.559" v="81" actId="14100"/>
-          <ac:picMkLst>
-            <pc:docMk/>
-            <pc:sldMk cId="972143660" sldId="720"/>
-            <ac:picMk id="6" creationId="{285236B9-C870-C1BC-F7A9-0415225D4E2C}"/>
-          </ac:picMkLst>
-        </pc:picChg>
-      </pc:sldChg>
-      <pc:sldChg chg="addSp delSp modSp add mod">
-        <pc:chgData name="OLIVEIRA Caio" userId="56a7264e-9c39-4238-9707-ce8f921f56b1" providerId="ADAL" clId="{0F281342-F1AD-4CF5-BBAF-EAAE3D77943A}" dt="2024-10-09T22:27:45.829" v="259" actId="207"/>
-        <pc:sldMkLst>
-          <pc:docMk/>
-          <pc:sldMk cId="4075727788" sldId="721"/>
-        </pc:sldMkLst>
-        <pc:spChg chg="mod">
-          <ac:chgData name="OLIVEIRA Caio" userId="56a7264e-9c39-4238-9707-ce8f921f56b1" providerId="ADAL" clId="{0F281342-F1AD-4CF5-BBAF-EAAE3D77943A}" dt="2024-10-09T22:27:45.829" v="259" actId="207"/>
-          <ac:spMkLst>
-            <pc:docMk/>
-            <pc:sldMk cId="4075727788" sldId="721"/>
-            <ac:spMk id="3" creationId="{916D1DC2-0399-AE84-7032-8FA753E1D518}"/>
-          </ac:spMkLst>
-        </pc:spChg>
-        <pc:spChg chg="mod">
-          <ac:chgData name="OLIVEIRA Caio" userId="56a7264e-9c39-4238-9707-ce8f921f56b1" providerId="ADAL" clId="{0F281342-F1AD-4CF5-BBAF-EAAE3D77943A}" dt="2024-10-09T22:17:31.766" v="138" actId="20577"/>
-          <ac:spMkLst>
-            <pc:docMk/>
-            <pc:sldMk cId="4075727788" sldId="721"/>
-            <ac:spMk id="7" creationId="{A61AF022-43EC-8F7F-41B2-8012372D95A5}"/>
-          </ac:spMkLst>
-        </pc:spChg>
-        <pc:graphicFrameChg chg="del">
-          <ac:chgData name="OLIVEIRA Caio" userId="56a7264e-9c39-4238-9707-ce8f921f56b1" providerId="ADAL" clId="{0F281342-F1AD-4CF5-BBAF-EAAE3D77943A}" dt="2024-10-09T22:19:03.828" v="139" actId="478"/>
-          <ac:graphicFrameMkLst>
-            <pc:docMk/>
-            <pc:sldMk cId="4075727788" sldId="721"/>
-            <ac:graphicFrameMk id="6" creationId="{4BA8A884-6122-42C4-8BD1-20CEC87C22FA}"/>
-          </ac:graphicFrameMkLst>
-        </pc:graphicFrameChg>
-        <pc:graphicFrameChg chg="add mod">
-          <ac:chgData name="OLIVEIRA Caio" userId="56a7264e-9c39-4238-9707-ce8f921f56b1" providerId="ADAL" clId="{0F281342-F1AD-4CF5-BBAF-EAAE3D77943A}" dt="2024-10-09T22:23:10.968" v="225"/>
-          <ac:graphicFrameMkLst>
-            <pc:docMk/>
-            <pc:sldMk cId="4075727788" sldId="721"/>
-            <ac:graphicFrameMk id="8" creationId="{E112EA0E-3B08-9C1B-4601-BB360F6E7677}"/>
-          </ac:graphicFrameMkLst>
-        </pc:graphicFrameChg>
-        <pc:graphicFrameChg chg="add mod">
-          <ac:chgData name="OLIVEIRA Caio" userId="56a7264e-9c39-4238-9707-ce8f921f56b1" providerId="ADAL" clId="{0F281342-F1AD-4CF5-BBAF-EAAE3D77943A}" dt="2024-10-09T22:23:21.634" v="233"/>
-          <ac:graphicFrameMkLst>
-            <pc:docMk/>
-            <pc:sldMk cId="4075727788" sldId="721"/>
-            <ac:graphicFrameMk id="10" creationId="{7077080F-303C-749B-77C4-E798765EA410}"/>
-          </ac:graphicFrameMkLst>
-        </pc:graphicFrameChg>
-        <pc:picChg chg="add mod">
-          <ac:chgData name="OLIVEIRA Caio" userId="56a7264e-9c39-4238-9707-ce8f921f56b1" providerId="ADAL" clId="{0F281342-F1AD-4CF5-BBAF-EAAE3D77943A}" dt="2024-10-09T22:19:11.045" v="143" actId="1076"/>
-          <ac:picMkLst>
-            <pc:docMk/>
-            <pc:sldMk cId="4075727788" sldId="721"/>
-            <ac:picMk id="5" creationId="{0FC8E413-B9DB-A648-24C1-BFDFEDC7A61F}"/>
-          </ac:picMkLst>
-        </pc:picChg>
-        <pc:cxnChg chg="mod">
-          <ac:chgData name="OLIVEIRA Caio" userId="56a7264e-9c39-4238-9707-ce8f921f56b1" providerId="ADAL" clId="{0F281342-F1AD-4CF5-BBAF-EAAE3D77943A}" dt="2024-10-09T22:20:37.369" v="172" actId="1038"/>
-          <ac:cxnSpMkLst>
-            <pc:docMk/>
-            <pc:sldMk cId="4075727788" sldId="721"/>
-            <ac:cxnSpMk id="9" creationId="{1FD0D19D-C4C8-4F82-403A-96ECECD5F81A}"/>
-          </ac:cxnSpMkLst>
-        </pc:cxnChg>
-      </pc:sldChg>
-      <pc:sldChg chg="delSp add del mod">
-        <pc:chgData name="OLIVEIRA Caio" userId="56a7264e-9c39-4238-9707-ce8f921f56b1" providerId="ADAL" clId="{0F281342-F1AD-4CF5-BBAF-EAAE3D77943A}" dt="2024-10-09T22:38:51.989" v="273" actId="47"/>
-        <pc:sldMkLst>
-          <pc:docMk/>
-          <pc:sldMk cId="2284348680" sldId="722"/>
-        </pc:sldMkLst>
-        <pc:picChg chg="del">
-          <ac:chgData name="OLIVEIRA Caio" userId="56a7264e-9c39-4238-9707-ce8f921f56b1" providerId="ADAL" clId="{0F281342-F1AD-4CF5-BBAF-EAAE3D77943A}" dt="2024-10-09T22:37:41.631" v="261" actId="478"/>
-          <ac:picMkLst>
-            <pc:docMk/>
-            <pc:sldMk cId="2284348680" sldId="722"/>
-            <ac:picMk id="6" creationId="{3E7E2E3B-FD87-E0D4-EE1E-FE6CB63AB212}"/>
-          </ac:picMkLst>
-        </pc:picChg>
-      </pc:sldChg>
-      <pc:sldChg chg="addSp delSp modSp add mod">
-        <pc:chgData name="OLIVEIRA Caio" userId="56a7264e-9c39-4238-9707-ce8f921f56b1" providerId="ADAL" clId="{0F281342-F1AD-4CF5-BBAF-EAAE3D77943A}" dt="2024-10-09T22:38:43.867" v="272" actId="1076"/>
-        <pc:sldMkLst>
-          <pc:docMk/>
-          <pc:sldMk cId="1163888016" sldId="723"/>
-        </pc:sldMkLst>
-        <pc:picChg chg="add del mod">
-          <ac:chgData name="OLIVEIRA Caio" userId="56a7264e-9c39-4238-9707-ce8f921f56b1" providerId="ADAL" clId="{0F281342-F1AD-4CF5-BBAF-EAAE3D77943A}" dt="2024-10-09T22:38:38.412" v="269" actId="478"/>
-          <ac:picMkLst>
-            <pc:docMk/>
-            <pc:sldMk cId="1163888016" sldId="723"/>
-            <ac:picMk id="5" creationId="{32292F5D-8415-99F5-E2FD-9DBE17940F1F}"/>
-          </ac:picMkLst>
-        </pc:picChg>
-        <pc:picChg chg="del">
-          <ac:chgData name="OLIVEIRA Caio" userId="56a7264e-9c39-4238-9707-ce8f921f56b1" providerId="ADAL" clId="{0F281342-F1AD-4CF5-BBAF-EAAE3D77943A}" dt="2024-10-09T22:37:56.128" v="263" actId="478"/>
-          <ac:picMkLst>
-            <pc:docMk/>
-            <pc:sldMk cId="1163888016" sldId="723"/>
-            <ac:picMk id="6" creationId="{B0BB34CF-1399-72FF-72F1-340967669B21}"/>
-          </ac:picMkLst>
-        </pc:picChg>
-        <pc:picChg chg="add mod">
-          <ac:chgData name="OLIVEIRA Caio" userId="56a7264e-9c39-4238-9707-ce8f921f56b1" providerId="ADAL" clId="{0F281342-F1AD-4CF5-BBAF-EAAE3D77943A}" dt="2024-10-09T22:38:43.867" v="272" actId="1076"/>
-          <ac:picMkLst>
-            <pc:docMk/>
-            <pc:sldMk cId="1163888016" sldId="723"/>
-            <ac:picMk id="8" creationId="{9235B3A3-1C7F-0CEE-E94B-0E1D5CAF3875}"/>
-          </ac:picMkLst>
-        </pc:picChg>
-      </pc:sldChg>
-    </pc:docChg>
-  </pc:docChgLst>
-  <pc:docChgLst>
-    <pc:chgData name="OLIVEIRA Caio" userId="56a7264e-9c39-4238-9707-ce8f921f56b1" providerId="ADAL" clId="{64B2F274-A096-4B38-9B91-669EA7A5250E}"/>
-    <pc:docChg chg="undo custSel modSld">
-      <pc:chgData name="OLIVEIRA Caio" userId="56a7264e-9c39-4238-9707-ce8f921f56b1" providerId="ADAL" clId="{64B2F274-A096-4B38-9B91-669EA7A5250E}" dt="2024-08-01T21:49:33.814" v="258" actId="1076"/>
-      <pc:docMkLst>
-        <pc:docMk/>
-      </pc:docMkLst>
-      <pc:sldChg chg="addSp delSp modSp mod">
-        <pc:chgData name="OLIVEIRA Caio" userId="56a7264e-9c39-4238-9707-ce8f921f56b1" providerId="ADAL" clId="{64B2F274-A096-4B38-9B91-669EA7A5250E}" dt="2024-08-01T21:35:51.785" v="4" actId="14100"/>
-        <pc:sldMkLst>
-          <pc:docMk/>
-          <pc:sldMk cId="3049616452" sldId="733"/>
-        </pc:sldMkLst>
-        <pc:picChg chg="add mod">
-          <ac:chgData name="OLIVEIRA Caio" userId="56a7264e-9c39-4238-9707-ce8f921f56b1" providerId="ADAL" clId="{64B2F274-A096-4B38-9B91-669EA7A5250E}" dt="2024-08-01T21:35:51.785" v="4" actId="14100"/>
-          <ac:picMkLst>
-            <pc:docMk/>
-            <pc:sldMk cId="3049616452" sldId="733"/>
-            <ac:picMk id="3" creationId="{B8A11036-0111-AAC4-0CAD-DF5A1FE74BC3}"/>
-          </ac:picMkLst>
-        </pc:picChg>
-        <pc:picChg chg="del">
-          <ac:chgData name="OLIVEIRA Caio" userId="56a7264e-9c39-4238-9707-ce8f921f56b1" providerId="ADAL" clId="{64B2F274-A096-4B38-9B91-669EA7A5250E}" dt="2024-08-01T21:35:45.225" v="0" actId="478"/>
-          <ac:picMkLst>
-            <pc:docMk/>
-            <pc:sldMk cId="3049616452" sldId="733"/>
-            <ac:picMk id="4" creationId="{85C83F03-5A81-8883-E618-61FAE6FB3302}"/>
-          </ac:picMkLst>
-        </pc:picChg>
-      </pc:sldChg>
-      <pc:sldChg chg="modSp mod">
-        <pc:chgData name="OLIVEIRA Caio" userId="56a7264e-9c39-4238-9707-ce8f921f56b1" providerId="ADAL" clId="{64B2F274-A096-4B38-9B91-669EA7A5250E}" dt="2024-08-01T21:49:33.814" v="258" actId="1076"/>
-        <pc:sldMkLst>
-          <pc:docMk/>
-          <pc:sldMk cId="2448947866" sldId="734"/>
-        </pc:sldMkLst>
-        <pc:graphicFrameChg chg="mod modGraphic">
-          <ac:chgData name="OLIVEIRA Caio" userId="56a7264e-9c39-4238-9707-ce8f921f56b1" providerId="ADAL" clId="{64B2F274-A096-4B38-9B91-669EA7A5250E}" dt="2024-08-01T21:49:33.814" v="258" actId="1076"/>
-          <ac:graphicFrameMkLst>
-            <pc:docMk/>
-            <pc:sldMk cId="2448947866" sldId="734"/>
-            <ac:graphicFrameMk id="5" creationId="{AD23D24C-29D8-22B6-50C8-0CBC6085835D}"/>
-          </ac:graphicFrameMkLst>
-        </pc:graphicFrameChg>
-      </pc:sldChg>
-    </pc:docChg>
-  </pc:docChgLst>
-  <pc:docChgLst>
     <pc:chgData name="OLIVEIRA Caio" userId="56a7264e-9c39-4238-9707-ce8f921f56b1" providerId="ADAL" clId="{4E697462-6B60-4554-8238-2EE099F5B41F}"/>
     <pc:docChg chg="undo custSel modSld">
       <pc:chgData name="OLIVEIRA Caio" userId="56a7264e-9c39-4238-9707-ce8f921f56b1" providerId="ADAL" clId="{4E697462-6B60-4554-8238-2EE099F5B41F}" dt="2024-09-07T03:25:02.084" v="65" actId="1037"/>
@@ -2649,294 +2802,6 @@
             <pc:docMk/>
             <pc:sldMk cId="332661816" sldId="732"/>
             <ac:picMk id="4" creationId="{249993C7-0364-F9C3-79FD-491F71B42991}"/>
-          </ac:picMkLst>
-        </pc:picChg>
-      </pc:sldChg>
-    </pc:docChg>
-  </pc:docChgLst>
-  <pc:docChgLst>
-    <pc:chgData name="OLIVEIRA Caio" userId="56a7264e-9c39-4238-9707-ce8f921f56b1" providerId="ADAL" clId="{231D7465-E426-43AB-BACA-F33533CB366D}"/>
-    <pc:docChg chg="custSel modSld">
-      <pc:chgData name="OLIVEIRA Caio" userId="56a7264e-9c39-4238-9707-ce8f921f56b1" providerId="ADAL" clId="{231D7465-E426-43AB-BACA-F33533CB366D}" dt="2024-08-08T13:44:05.618" v="163" actId="403"/>
-      <pc:docMkLst>
-        <pc:docMk/>
-      </pc:docMkLst>
-      <pc:sldChg chg="modSp mod">
-        <pc:chgData name="OLIVEIRA Caio" userId="56a7264e-9c39-4238-9707-ce8f921f56b1" providerId="ADAL" clId="{231D7465-E426-43AB-BACA-F33533CB366D}" dt="2024-08-08T13:43:35.997" v="153" actId="20577"/>
-        <pc:sldMkLst>
-          <pc:docMk/>
-          <pc:sldMk cId="3900553097" sldId="348"/>
-        </pc:sldMkLst>
-        <pc:spChg chg="mod">
-          <ac:chgData name="OLIVEIRA Caio" userId="56a7264e-9c39-4238-9707-ce8f921f56b1" providerId="ADAL" clId="{231D7465-E426-43AB-BACA-F33533CB366D}" dt="2024-08-08T13:43:35.997" v="153" actId="20577"/>
-          <ac:spMkLst>
-            <pc:docMk/>
-            <pc:sldMk cId="3900553097" sldId="348"/>
-            <ac:spMk id="6" creationId="{00000000-0000-0000-0000-000000000000}"/>
-          </ac:spMkLst>
-        </pc:spChg>
-      </pc:sldChg>
-      <pc:sldChg chg="addSp delSp modSp mod">
-        <pc:chgData name="OLIVEIRA Caio" userId="56a7264e-9c39-4238-9707-ce8f921f56b1" providerId="ADAL" clId="{231D7465-E426-43AB-BACA-F33533CB366D}" dt="2024-08-08T13:39:58.532" v="129" actId="1076"/>
-        <pc:sldMkLst>
-          <pc:docMk/>
-          <pc:sldMk cId="3107087685" sldId="681"/>
-        </pc:sldMkLst>
-        <pc:picChg chg="add mod">
-          <ac:chgData name="OLIVEIRA Caio" userId="56a7264e-9c39-4238-9707-ce8f921f56b1" providerId="ADAL" clId="{231D7465-E426-43AB-BACA-F33533CB366D}" dt="2024-08-08T13:39:58.532" v="129" actId="1076"/>
-          <ac:picMkLst>
-            <pc:docMk/>
-            <pc:sldMk cId="3107087685" sldId="681"/>
-            <ac:picMk id="2" creationId="{09CB4B47-0955-2657-7891-4DE3C6CB9211}"/>
-          </ac:picMkLst>
-        </pc:picChg>
-        <pc:picChg chg="del">
-          <ac:chgData name="OLIVEIRA Caio" userId="56a7264e-9c39-4238-9707-ce8f921f56b1" providerId="ADAL" clId="{231D7465-E426-43AB-BACA-F33533CB366D}" dt="2024-08-08T13:39:46.536" v="122" actId="478"/>
-          <ac:picMkLst>
-            <pc:docMk/>
-            <pc:sldMk cId="3107087685" sldId="681"/>
-            <ac:picMk id="4" creationId="{33FF13AD-B751-5553-53C8-48B2B5872978}"/>
-          </ac:picMkLst>
-        </pc:picChg>
-      </pc:sldChg>
-      <pc:sldChg chg="addSp delSp modSp mod">
-        <pc:chgData name="OLIVEIRA Caio" userId="56a7264e-9c39-4238-9707-ce8f921f56b1" providerId="ADAL" clId="{231D7465-E426-43AB-BACA-F33533CB366D}" dt="2024-08-08T13:40:42.540" v="143" actId="1076"/>
-        <pc:sldMkLst>
-          <pc:docMk/>
-          <pc:sldMk cId="330742605" sldId="683"/>
-        </pc:sldMkLst>
-        <pc:picChg chg="del">
-          <ac:chgData name="OLIVEIRA Caio" userId="56a7264e-9c39-4238-9707-ce8f921f56b1" providerId="ADAL" clId="{231D7465-E426-43AB-BACA-F33533CB366D}" dt="2024-08-08T13:40:35.393" v="139" actId="478"/>
-          <ac:picMkLst>
-            <pc:docMk/>
-            <pc:sldMk cId="330742605" sldId="683"/>
-            <ac:picMk id="3" creationId="{CF598411-E4FC-DC58-CEE0-D149201E63C6}"/>
-          </ac:picMkLst>
-        </pc:picChg>
-        <pc:picChg chg="add mod">
-          <ac:chgData name="OLIVEIRA Caio" userId="56a7264e-9c39-4238-9707-ce8f921f56b1" providerId="ADAL" clId="{231D7465-E426-43AB-BACA-F33533CB366D}" dt="2024-08-08T13:40:42.540" v="143" actId="1076"/>
-          <ac:picMkLst>
-            <pc:docMk/>
-            <pc:sldMk cId="330742605" sldId="683"/>
-            <ac:picMk id="4" creationId="{AD762F4A-0741-3C33-2F02-1DEB1BA6E59F}"/>
-          </ac:picMkLst>
-        </pc:picChg>
-      </pc:sldChg>
-      <pc:sldChg chg="addSp delSp modSp mod">
-        <pc:chgData name="OLIVEIRA Caio" userId="56a7264e-9c39-4238-9707-ce8f921f56b1" providerId="ADAL" clId="{231D7465-E426-43AB-BACA-F33533CB366D}" dt="2024-08-08T13:40:23.030" v="138" actId="478"/>
-        <pc:sldMkLst>
-          <pc:docMk/>
-          <pc:sldMk cId="1884443606" sldId="687"/>
-        </pc:sldMkLst>
-        <pc:spChg chg="del">
-          <ac:chgData name="OLIVEIRA Caio" userId="56a7264e-9c39-4238-9707-ce8f921f56b1" providerId="ADAL" clId="{231D7465-E426-43AB-BACA-F33533CB366D}" dt="2024-08-08T13:40:23.030" v="138" actId="478"/>
-          <ac:spMkLst>
-            <pc:docMk/>
-            <pc:sldMk cId="1884443606" sldId="687"/>
-            <ac:spMk id="4" creationId="{29E3A5D8-1290-83BC-4016-9F8A1A7A5D3D}"/>
-          </ac:spMkLst>
-        </pc:spChg>
-        <pc:picChg chg="del">
-          <ac:chgData name="OLIVEIRA Caio" userId="56a7264e-9c39-4238-9707-ce8f921f56b1" providerId="ADAL" clId="{231D7465-E426-43AB-BACA-F33533CB366D}" dt="2024-08-08T13:40:07.783" v="130" actId="478"/>
-          <ac:picMkLst>
-            <pc:docMk/>
-            <pc:sldMk cId="1884443606" sldId="687"/>
-            <ac:picMk id="2" creationId="{4ABD5002-B7D8-7913-A535-59D51A40F541}"/>
-          </ac:picMkLst>
-        </pc:picChg>
-        <pc:picChg chg="add mod">
-          <ac:chgData name="OLIVEIRA Caio" userId="56a7264e-9c39-4238-9707-ce8f921f56b1" providerId="ADAL" clId="{231D7465-E426-43AB-BACA-F33533CB366D}" dt="2024-08-08T13:40:21.372" v="137" actId="1076"/>
-          <ac:picMkLst>
-            <pc:docMk/>
-            <pc:sldMk cId="1884443606" sldId="687"/>
-            <ac:picMk id="3" creationId="{1B399161-B9C3-600B-FBC5-641ABE84C018}"/>
-          </ac:picMkLst>
-        </pc:picChg>
-      </pc:sldChg>
-      <pc:sldChg chg="modSp mod">
-        <pc:chgData name="OLIVEIRA Caio" userId="56a7264e-9c39-4238-9707-ce8f921f56b1" providerId="ADAL" clId="{231D7465-E426-43AB-BACA-F33533CB366D}" dt="2024-08-08T13:32:25.699" v="17" actId="1076"/>
-        <pc:sldMkLst>
-          <pc:docMk/>
-          <pc:sldMk cId="318140112" sldId="712"/>
-        </pc:sldMkLst>
-        <pc:spChg chg="mod">
-          <ac:chgData name="OLIVEIRA Caio" userId="56a7264e-9c39-4238-9707-ce8f921f56b1" providerId="ADAL" clId="{231D7465-E426-43AB-BACA-F33533CB366D}" dt="2024-08-08T13:32:19.612" v="16" actId="20577"/>
-          <ac:spMkLst>
-            <pc:docMk/>
-            <pc:sldMk cId="318140112" sldId="712"/>
-            <ac:spMk id="3" creationId="{E47AEACB-2C32-482B-BC10-2C2F64AF4448}"/>
-          </ac:spMkLst>
-        </pc:spChg>
-        <pc:picChg chg="mod">
-          <ac:chgData name="OLIVEIRA Caio" userId="56a7264e-9c39-4238-9707-ce8f921f56b1" providerId="ADAL" clId="{231D7465-E426-43AB-BACA-F33533CB366D}" dt="2024-08-08T13:32:25.699" v="17" actId="1076"/>
-          <ac:picMkLst>
-            <pc:docMk/>
-            <pc:sldMk cId="318140112" sldId="712"/>
-            <ac:picMk id="5" creationId="{0A620BA4-0C65-BEFE-BB13-3F83A7B30112}"/>
-          </ac:picMkLst>
-        </pc:picChg>
-      </pc:sldChg>
-      <pc:sldChg chg="addSp delSp modSp mod">
-        <pc:chgData name="OLIVEIRA Caio" userId="56a7264e-9c39-4238-9707-ce8f921f56b1" providerId="ADAL" clId="{231D7465-E426-43AB-BACA-F33533CB366D}" dt="2024-08-08T13:33:19.126" v="73" actId="14100"/>
-        <pc:sldMkLst>
-          <pc:docMk/>
-          <pc:sldMk cId="2958950422" sldId="713"/>
-        </pc:sldMkLst>
-        <pc:spChg chg="mod">
-          <ac:chgData name="OLIVEIRA Caio" userId="56a7264e-9c39-4238-9707-ce8f921f56b1" providerId="ADAL" clId="{231D7465-E426-43AB-BACA-F33533CB366D}" dt="2024-08-08T13:32:45.408" v="63" actId="20577"/>
-          <ac:spMkLst>
-            <pc:docMk/>
-            <pc:sldMk cId="2958950422" sldId="713"/>
-            <ac:spMk id="8" creationId="{734E3C71-79C5-7938-D68B-38493B1B9E12}"/>
-          </ac:spMkLst>
-        </pc:spChg>
-        <pc:picChg chg="add mod">
-          <ac:chgData name="OLIVEIRA Caio" userId="56a7264e-9c39-4238-9707-ce8f921f56b1" providerId="ADAL" clId="{231D7465-E426-43AB-BACA-F33533CB366D}" dt="2024-08-08T13:32:53.937" v="67" actId="14100"/>
-          <ac:picMkLst>
-            <pc:docMk/>
-            <pc:sldMk cId="2958950422" sldId="713"/>
-            <ac:picMk id="3" creationId="{F4BDA308-3546-BCD6-188A-75123578329C}"/>
-          </ac:picMkLst>
-        </pc:picChg>
-        <pc:picChg chg="del">
-          <ac:chgData name="OLIVEIRA Caio" userId="56a7264e-9c39-4238-9707-ce8f921f56b1" providerId="ADAL" clId="{231D7465-E426-43AB-BACA-F33533CB366D}" dt="2024-08-08T13:32:48.639" v="64" actId="478"/>
-          <ac:picMkLst>
-            <pc:docMk/>
-            <pc:sldMk cId="2958950422" sldId="713"/>
-            <ac:picMk id="4" creationId="{B006364D-2C4A-A2CF-0054-E39A37251C81}"/>
-          </ac:picMkLst>
-        </pc:picChg>
-        <pc:picChg chg="del">
-          <ac:chgData name="OLIVEIRA Caio" userId="56a7264e-9c39-4238-9707-ce8f921f56b1" providerId="ADAL" clId="{231D7465-E426-43AB-BACA-F33533CB366D}" dt="2024-08-08T13:33:09.029" v="68" actId="478"/>
-          <ac:picMkLst>
-            <pc:docMk/>
-            <pc:sldMk cId="2958950422" sldId="713"/>
-            <ac:picMk id="7" creationId="{FBD96A5D-3A82-D37E-7F61-613533EB68E9}"/>
-          </ac:picMkLst>
-        </pc:picChg>
-        <pc:picChg chg="add mod">
-          <ac:chgData name="OLIVEIRA Caio" userId="56a7264e-9c39-4238-9707-ce8f921f56b1" providerId="ADAL" clId="{231D7465-E426-43AB-BACA-F33533CB366D}" dt="2024-08-08T13:33:19.126" v="73" actId="14100"/>
-          <ac:picMkLst>
-            <pc:docMk/>
-            <pc:sldMk cId="2958950422" sldId="713"/>
-            <ac:picMk id="9" creationId="{CC8E1FAA-FFB9-9A77-7111-FC1DFF582900}"/>
-          </ac:picMkLst>
-        </pc:picChg>
-      </pc:sldChg>
-      <pc:sldChg chg="addSp delSp modSp mod">
-        <pc:chgData name="OLIVEIRA Caio" userId="56a7264e-9c39-4238-9707-ce8f921f56b1" providerId="ADAL" clId="{231D7465-E426-43AB-BACA-F33533CB366D}" dt="2024-08-08T13:34:49.178" v="83" actId="1076"/>
-        <pc:sldMkLst>
-          <pc:docMk/>
-          <pc:sldMk cId="3828268161" sldId="714"/>
-        </pc:sldMkLst>
-        <pc:spChg chg="del mod">
-          <ac:chgData name="OLIVEIRA Caio" userId="56a7264e-9c39-4238-9707-ce8f921f56b1" providerId="ADAL" clId="{231D7465-E426-43AB-BACA-F33533CB366D}" dt="2024-08-08T13:34:31.065" v="77" actId="478"/>
-          <ac:spMkLst>
-            <pc:docMk/>
-            <pc:sldMk cId="3828268161" sldId="714"/>
-            <ac:spMk id="4" creationId="{7D9A824A-CB5E-4FA7-4970-92C2E1797043}"/>
-          </ac:spMkLst>
-        </pc:spChg>
-        <pc:spChg chg="add mod">
-          <ac:chgData name="OLIVEIRA Caio" userId="56a7264e-9c39-4238-9707-ce8f921f56b1" providerId="ADAL" clId="{231D7465-E426-43AB-BACA-F33533CB366D}" dt="2024-08-08T13:34:31.320" v="78"/>
-          <ac:spMkLst>
-            <pc:docMk/>
-            <pc:sldMk cId="3828268161" sldId="714"/>
-            <ac:spMk id="9" creationId="{7FDFF354-FBFC-69F7-B182-562D092FE891}"/>
-          </ac:spMkLst>
-        </pc:spChg>
-        <pc:picChg chg="del">
-          <ac:chgData name="OLIVEIRA Caio" userId="56a7264e-9c39-4238-9707-ce8f921f56b1" providerId="ADAL" clId="{231D7465-E426-43AB-BACA-F33533CB366D}" dt="2024-08-08T13:34:25.276" v="74" actId="478"/>
-          <ac:picMkLst>
-            <pc:docMk/>
-            <pc:sldMk cId="3828268161" sldId="714"/>
-            <ac:picMk id="6" creationId="{30CE6780-057B-7021-EB25-3791FFFB8603}"/>
-          </ac:picMkLst>
-        </pc:picChg>
-        <pc:picChg chg="add mod">
-          <ac:chgData name="OLIVEIRA Caio" userId="56a7264e-9c39-4238-9707-ce8f921f56b1" providerId="ADAL" clId="{231D7465-E426-43AB-BACA-F33533CB366D}" dt="2024-08-08T13:34:25.559" v="75"/>
-          <ac:picMkLst>
-            <pc:docMk/>
-            <pc:sldMk cId="3828268161" sldId="714"/>
-            <ac:picMk id="7" creationId="{B2FA3F49-5C7A-F805-3DAE-89B9F29B366B}"/>
-          </ac:picMkLst>
-        </pc:picChg>
-        <pc:picChg chg="del">
-          <ac:chgData name="OLIVEIRA Caio" userId="56a7264e-9c39-4238-9707-ce8f921f56b1" providerId="ADAL" clId="{231D7465-E426-43AB-BACA-F33533CB366D}" dt="2024-08-08T13:34:41.459" v="79" actId="478"/>
-          <ac:picMkLst>
-            <pc:docMk/>
-            <pc:sldMk cId="3828268161" sldId="714"/>
-            <ac:picMk id="8" creationId="{DC6871B8-34F5-7E20-21C4-40413964C0D7}"/>
-          </ac:picMkLst>
-        </pc:picChg>
-        <pc:picChg chg="add mod">
-          <ac:chgData name="OLIVEIRA Caio" userId="56a7264e-9c39-4238-9707-ce8f921f56b1" providerId="ADAL" clId="{231D7465-E426-43AB-BACA-F33533CB366D}" dt="2024-08-08T13:34:49.178" v="83" actId="1076"/>
-          <ac:picMkLst>
-            <pc:docMk/>
-            <pc:sldMk cId="3828268161" sldId="714"/>
-            <ac:picMk id="11" creationId="{E961D3CF-7790-EDAD-2E7B-7CF769F230D9}"/>
-          </ac:picMkLst>
-        </pc:picChg>
-      </pc:sldChg>
-      <pc:sldChg chg="addSp delSp modSp mod">
-        <pc:chgData name="OLIVEIRA Caio" userId="56a7264e-9c39-4238-9707-ce8f921f56b1" providerId="ADAL" clId="{231D7465-E426-43AB-BACA-F33533CB366D}" dt="2024-08-08T13:38:34.810" v="121" actId="1076"/>
-        <pc:sldMkLst>
-          <pc:docMk/>
-          <pc:sldMk cId="1026930713" sldId="717"/>
-        </pc:sldMkLst>
-        <pc:picChg chg="del">
-          <ac:chgData name="OLIVEIRA Caio" userId="56a7264e-9c39-4238-9707-ce8f921f56b1" providerId="ADAL" clId="{231D7465-E426-43AB-BACA-F33533CB366D}" dt="2024-08-08T13:38:28.564" v="117" actId="478"/>
-          <ac:picMkLst>
-            <pc:docMk/>
-            <pc:sldMk cId="1026930713" sldId="717"/>
-            <ac:picMk id="4" creationId="{60AA6229-A0C9-05D2-1B50-C7E2AB501664}"/>
-          </ac:picMkLst>
-        </pc:picChg>
-        <pc:picChg chg="add mod">
-          <ac:chgData name="OLIVEIRA Caio" userId="56a7264e-9c39-4238-9707-ce8f921f56b1" providerId="ADAL" clId="{231D7465-E426-43AB-BACA-F33533CB366D}" dt="2024-08-08T13:38:34.810" v="121" actId="1076"/>
-          <ac:picMkLst>
-            <pc:docMk/>
-            <pc:sldMk cId="1026930713" sldId="717"/>
-            <ac:picMk id="6" creationId="{DE58EC42-80CD-EEF8-5E62-35758FBE7A4E}"/>
-          </ac:picMkLst>
-        </pc:picChg>
-      </pc:sldChg>
-      <pc:sldChg chg="addSp delSp modSp mod">
-        <pc:chgData name="OLIVEIRA Caio" userId="56a7264e-9c39-4238-9707-ce8f921f56b1" providerId="ADAL" clId="{231D7465-E426-43AB-BACA-F33533CB366D}" dt="2024-08-08T13:44:05.618" v="163" actId="403"/>
-        <pc:sldMkLst>
-          <pc:docMk/>
-          <pc:sldMk cId="1414522034" sldId="718"/>
-        </pc:sldMkLst>
-        <pc:spChg chg="mod">
-          <ac:chgData name="OLIVEIRA Caio" userId="56a7264e-9c39-4238-9707-ce8f921f56b1" providerId="ADAL" clId="{231D7465-E426-43AB-BACA-F33533CB366D}" dt="2024-08-08T13:44:05.618" v="163" actId="403"/>
-          <ac:spMkLst>
-            <pc:docMk/>
-            <pc:sldMk cId="1414522034" sldId="718"/>
-            <ac:spMk id="6" creationId="{D481E455-8B56-109B-A60D-0286916A19DC}"/>
-          </ac:spMkLst>
-        </pc:spChg>
-        <pc:spChg chg="mod">
-          <ac:chgData name="OLIVEIRA Caio" userId="56a7264e-9c39-4238-9707-ce8f921f56b1" providerId="ADAL" clId="{231D7465-E426-43AB-BACA-F33533CB366D}" dt="2024-08-08T13:38:16.296" v="116" actId="20577"/>
-          <ac:spMkLst>
-            <pc:docMk/>
-            <pc:sldMk cId="1414522034" sldId="718"/>
-            <ac:spMk id="7" creationId="{0AF17F77-5D84-3F2F-7B7F-5A136FCEDFF4}"/>
-          </ac:spMkLst>
-        </pc:spChg>
-        <pc:picChg chg="add mod">
-          <ac:chgData name="OLIVEIRA Caio" userId="56a7264e-9c39-4238-9707-ce8f921f56b1" providerId="ADAL" clId="{231D7465-E426-43AB-BACA-F33533CB366D}" dt="2024-08-08T13:37:54.759" v="87" actId="1076"/>
-          <ac:picMkLst>
-            <pc:docMk/>
-            <pc:sldMk cId="1414522034" sldId="718"/>
-            <ac:picMk id="3" creationId="{CCE2F506-7DAD-4A8B-5DAF-5E2D4B68E856}"/>
-          </ac:picMkLst>
-        </pc:picChg>
-        <pc:picChg chg="del">
-          <ac:chgData name="OLIVEIRA Caio" userId="56a7264e-9c39-4238-9707-ce8f921f56b1" providerId="ADAL" clId="{231D7465-E426-43AB-BACA-F33533CB366D}" dt="2024-08-08T13:37:48.518" v="84" actId="478"/>
-          <ac:picMkLst>
-            <pc:docMk/>
-            <pc:sldMk cId="1414522034" sldId="718"/>
-            <ac:picMk id="4" creationId="{254DA8DD-1DF4-727D-B729-6F29F94E6DFF}"/>
           </ac:picMkLst>
         </pc:picChg>
       </pc:sldChg>
@@ -3448,20 +3313,20 @@
     </pc:docChg>
   </pc:docChgLst>
   <pc:docChgLst>
-    <pc:chgData name="OLIVEIRA Caio" userId="56a7264e-9c39-4238-9707-ce8f921f56b1" providerId="ADAL" clId="{AFDDA80C-A534-4E36-919F-69419C73824D}"/>
-    <pc:docChg chg="undo custSel addSld delSld modSld modSection">
-      <pc:chgData name="OLIVEIRA Caio" userId="56a7264e-9c39-4238-9707-ce8f921f56b1" providerId="ADAL" clId="{AFDDA80C-A534-4E36-919F-69419C73824D}" dt="2024-08-03T15:42:36.380" v="50" actId="1037"/>
+    <pc:chgData name="OLIVEIRA Caio" userId="56a7264e-9c39-4238-9707-ce8f921f56b1" providerId="ADAL" clId="{39EF1533-FF8C-45BE-831F-342CE5239DAC}"/>
+    <pc:docChg chg="custSel modSld">
+      <pc:chgData name="OLIVEIRA Caio" userId="56a7264e-9c39-4238-9707-ce8f921f56b1" providerId="ADAL" clId="{39EF1533-FF8C-45BE-831F-342CE5239DAC}" dt="2024-08-02T23:16:46.098" v="80" actId="1076"/>
       <pc:docMkLst>
         <pc:docMk/>
       </pc:docMkLst>
       <pc:sldChg chg="modSp mod">
-        <pc:chgData name="OLIVEIRA Caio" userId="56a7264e-9c39-4238-9707-ce8f921f56b1" providerId="ADAL" clId="{AFDDA80C-A534-4E36-919F-69419C73824D}" dt="2024-08-03T14:13:13.839" v="12" actId="20577"/>
+        <pc:chgData name="OLIVEIRA Caio" userId="56a7264e-9c39-4238-9707-ce8f921f56b1" providerId="ADAL" clId="{39EF1533-FF8C-45BE-831F-342CE5239DAC}" dt="2024-08-02T22:48:58.594" v="10" actId="20577"/>
         <pc:sldMkLst>
           <pc:docMk/>
           <pc:sldMk cId="3900553097" sldId="348"/>
         </pc:sldMkLst>
         <pc:spChg chg="mod">
-          <ac:chgData name="OLIVEIRA Caio" userId="56a7264e-9c39-4238-9707-ce8f921f56b1" providerId="ADAL" clId="{AFDDA80C-A534-4E36-919F-69419C73824D}" dt="2024-08-03T14:13:13.839" v="12" actId="20577"/>
+          <ac:chgData name="OLIVEIRA Caio" userId="56a7264e-9c39-4238-9707-ce8f921f56b1" providerId="ADAL" clId="{39EF1533-FF8C-45BE-831F-342CE5239DAC}" dt="2024-08-02T22:48:58.594" v="10" actId="20577"/>
           <ac:spMkLst>
             <pc:docMk/>
             <pc:sldMk cId="3900553097" sldId="348"/>
@@ -3470,232 +3335,367 @@
         </pc:spChg>
       </pc:sldChg>
       <pc:sldChg chg="addSp delSp modSp mod">
-        <pc:chgData name="OLIVEIRA Caio" userId="56a7264e-9c39-4238-9707-ce8f921f56b1" providerId="ADAL" clId="{AFDDA80C-A534-4E36-919F-69419C73824D}" dt="2024-08-03T14:33:25.954" v="15" actId="1076"/>
+        <pc:chgData name="OLIVEIRA Caio" userId="56a7264e-9c39-4238-9707-ce8f921f56b1" providerId="ADAL" clId="{39EF1533-FF8C-45BE-831F-342CE5239DAC}" dt="2024-08-02T23:07:15.243" v="19" actId="1076"/>
         <pc:sldMkLst>
           <pc:docMk/>
           <pc:sldMk cId="4168217179" sldId="721"/>
         </pc:sldMkLst>
-        <pc:picChg chg="add mod">
-          <ac:chgData name="OLIVEIRA Caio" userId="56a7264e-9c39-4238-9707-ce8f921f56b1" providerId="ADAL" clId="{AFDDA80C-A534-4E36-919F-69419C73824D}" dt="2024-08-03T14:33:25.954" v="15" actId="1076"/>
+        <pc:picChg chg="add del mod">
+          <ac:chgData name="OLIVEIRA Caio" userId="56a7264e-9c39-4238-9707-ce8f921f56b1" providerId="ADAL" clId="{39EF1533-FF8C-45BE-831F-342CE5239DAC}" dt="2024-08-02T23:05:24.652" v="14" actId="478"/>
           <ac:picMkLst>
             <pc:docMk/>
             <pc:sldMk cId="4168217179" sldId="721"/>
-            <ac:picMk id="2" creationId="{5B0D6675-5AB9-D081-FD96-FF1229A5C039}"/>
+            <ac:picMk id="2" creationId="{14B7C641-70E1-93A3-04AF-977B6CF65C26}"/>
+          </ac:picMkLst>
+        </pc:picChg>
+        <pc:picChg chg="add del mod">
+          <ac:chgData name="OLIVEIRA Caio" userId="56a7264e-9c39-4238-9707-ce8f921f56b1" providerId="ADAL" clId="{39EF1533-FF8C-45BE-831F-342CE5239DAC}" dt="2024-08-02T23:07:10.954" v="17" actId="478"/>
+          <ac:picMkLst>
+            <pc:docMk/>
+            <pc:sldMk cId="4168217179" sldId="721"/>
+            <ac:picMk id="3" creationId="{6A75C436-47E6-E73B-E5F2-4182C1EF2CBB}"/>
+          </ac:picMkLst>
+        </pc:picChg>
+        <pc:picChg chg="add mod">
+          <ac:chgData name="OLIVEIRA Caio" userId="56a7264e-9c39-4238-9707-ce8f921f56b1" providerId="ADAL" clId="{39EF1533-FF8C-45BE-831F-342CE5239DAC}" dt="2024-08-02T23:07:15.243" v="19" actId="1076"/>
+          <ac:picMkLst>
+            <pc:docMk/>
+            <pc:sldMk cId="4168217179" sldId="721"/>
+            <ac:picMk id="7" creationId="{505B496D-6AB5-5F8B-544B-1B718F663AF7}"/>
           </ac:picMkLst>
         </pc:picChg>
         <pc:picChg chg="del">
-          <ac:chgData name="OLIVEIRA Caio" userId="56a7264e-9c39-4238-9707-ce8f921f56b1" providerId="ADAL" clId="{AFDDA80C-A534-4E36-919F-69419C73824D}" dt="2024-08-03T14:33:21.357" v="13" actId="478"/>
+          <ac:chgData name="OLIVEIRA Caio" userId="56a7264e-9c39-4238-9707-ce8f921f56b1" providerId="ADAL" clId="{39EF1533-FF8C-45BE-831F-342CE5239DAC}" dt="2024-08-02T23:04:50.583" v="11" actId="478"/>
           <ac:picMkLst>
             <pc:docMk/>
             <pc:sldMk cId="4168217179" sldId="721"/>
-            <ac:picMk id="8" creationId="{55EE02AB-8B1F-98A9-D7C2-C441E321E719}"/>
+            <ac:picMk id="15" creationId="{4632A027-918D-93D9-2393-355078C0B55B}"/>
           </ac:picMkLst>
         </pc:picChg>
       </pc:sldChg>
       <pc:sldChg chg="addSp delSp modSp mod">
-        <pc:chgData name="OLIVEIRA Caio" userId="56a7264e-9c39-4238-9707-ce8f921f56b1" providerId="ADAL" clId="{AFDDA80C-A534-4E36-919F-69419C73824D}" dt="2024-08-03T14:34:28.891" v="18" actId="1076"/>
+        <pc:chgData name="OLIVEIRA Caio" userId="56a7264e-9c39-4238-9707-ce8f921f56b1" providerId="ADAL" clId="{39EF1533-FF8C-45BE-831F-342CE5239DAC}" dt="2024-08-02T23:07:55.149" v="28"/>
         <pc:sldMkLst>
           <pc:docMk/>
           <pc:sldMk cId="3159271183" sldId="722"/>
         </pc:sldMkLst>
+        <pc:spChg chg="add mod">
+          <ac:chgData name="OLIVEIRA Caio" userId="56a7264e-9c39-4238-9707-ce8f921f56b1" providerId="ADAL" clId="{39EF1533-FF8C-45BE-831F-342CE5239DAC}" dt="2024-08-02T23:07:55.149" v="28"/>
+          <ac:spMkLst>
+            <pc:docMk/>
+            <pc:sldMk cId="3159271183" sldId="722"/>
+            <ac:spMk id="7" creationId="{0EAB1B86-3A2B-4E89-5405-2713D93B9147}"/>
+          </ac:spMkLst>
+        </pc:spChg>
+        <pc:spChg chg="del">
+          <ac:chgData name="OLIVEIRA Caio" userId="56a7264e-9c39-4238-9707-ce8f921f56b1" providerId="ADAL" clId="{39EF1533-FF8C-45BE-831F-342CE5239DAC}" dt="2024-08-02T23:07:54.917" v="27" actId="478"/>
+          <ac:spMkLst>
+            <pc:docMk/>
+            <pc:sldMk cId="3159271183" sldId="722"/>
+            <ac:spMk id="10" creationId="{08BF51D8-9027-21BF-2C39-BE0DE6443D97}"/>
+          </ac:spMkLst>
+        </pc:spChg>
+        <pc:graphicFrameChg chg="add mod">
+          <ac:chgData name="OLIVEIRA Caio" userId="56a7264e-9c39-4238-9707-ce8f921f56b1" providerId="ADAL" clId="{39EF1533-FF8C-45BE-831F-342CE5239DAC}" dt="2024-08-02T23:07:38.024" v="22"/>
+          <ac:graphicFrameMkLst>
+            <pc:docMk/>
+            <pc:sldMk cId="3159271183" sldId="722"/>
+            <ac:graphicFrameMk id="3" creationId="{18FA1FAB-420D-2280-119D-EFD092632EFB}"/>
+          </ac:graphicFrameMkLst>
+        </pc:graphicFrameChg>
         <pc:picChg chg="add mod">
-          <ac:chgData name="OLIVEIRA Caio" userId="56a7264e-9c39-4238-9707-ce8f921f56b1" providerId="ADAL" clId="{AFDDA80C-A534-4E36-919F-69419C73824D}" dt="2024-08-03T14:34:28.891" v="18" actId="1076"/>
+          <ac:chgData name="OLIVEIRA Caio" userId="56a7264e-9c39-4238-9707-ce8f921f56b1" providerId="ADAL" clId="{39EF1533-FF8C-45BE-831F-342CE5239DAC}" dt="2024-08-02T23:07:48.420" v="26" actId="1076"/>
           <ac:picMkLst>
             <pc:docMk/>
             <pc:sldMk cId="3159271183" sldId="722"/>
-            <ac:picMk id="3" creationId="{DCC81DFA-4ED0-1972-20B3-447D149C70FD}"/>
+            <ac:picMk id="5" creationId="{BBE5AC62-8531-39AA-0A10-896D5C0771EE}"/>
           </ac:picMkLst>
         </pc:picChg>
         <pc:picChg chg="del">
-          <ac:chgData name="OLIVEIRA Caio" userId="56a7264e-9c39-4238-9707-ce8f921f56b1" providerId="ADAL" clId="{AFDDA80C-A534-4E36-919F-69419C73824D}" dt="2024-08-03T14:34:24.729" v="16" actId="478"/>
+          <ac:chgData name="OLIVEIRA Caio" userId="56a7264e-9c39-4238-9707-ce8f921f56b1" providerId="ADAL" clId="{39EF1533-FF8C-45BE-831F-342CE5239DAC}" dt="2024-08-02T23:07:45.037" v="25" actId="478"/>
           <ac:picMkLst>
             <pc:docMk/>
             <pc:sldMk cId="3159271183" sldId="722"/>
-            <ac:picMk id="6" creationId="{602B49BC-183C-4571-D007-FE1DC0F70F14}"/>
+            <ac:picMk id="6" creationId="{68E45C9F-BF24-0AD8-16B6-DA84F89B05C1}"/>
+          </ac:picMkLst>
+        </pc:picChg>
+        <pc:picChg chg="del">
+          <ac:chgData name="OLIVEIRA Caio" userId="56a7264e-9c39-4238-9707-ce8f921f56b1" providerId="ADAL" clId="{39EF1533-FF8C-45BE-831F-342CE5239DAC}" dt="2024-08-02T23:07:54.917" v="27" actId="478"/>
+          <ac:picMkLst>
+            <pc:docMk/>
+            <pc:sldMk cId="3159271183" sldId="722"/>
+            <ac:picMk id="9" creationId="{74FC49D0-E7DE-8433-0570-AD5388B80551}"/>
+          </ac:picMkLst>
+        </pc:picChg>
+        <pc:picChg chg="add mod">
+          <ac:chgData name="OLIVEIRA Caio" userId="56a7264e-9c39-4238-9707-ce8f921f56b1" providerId="ADAL" clId="{39EF1533-FF8C-45BE-831F-342CE5239DAC}" dt="2024-08-02T23:07:55.149" v="28"/>
+          <ac:picMkLst>
+            <pc:docMk/>
+            <pc:sldMk cId="3159271183" sldId="722"/>
+            <ac:picMk id="11" creationId="{10C6EBE1-0563-4664-35A5-62CA8225D7CA}"/>
           </ac:picMkLst>
         </pc:picChg>
       </pc:sldChg>
       <pc:sldChg chg="addSp delSp modSp mod">
-        <pc:chgData name="OLIVEIRA Caio" userId="56a7264e-9c39-4238-9707-ce8f921f56b1" providerId="ADAL" clId="{AFDDA80C-A534-4E36-919F-69419C73824D}" dt="2024-08-03T15:42:36.380" v="50" actId="1037"/>
+        <pc:chgData name="OLIVEIRA Caio" userId="56a7264e-9c39-4238-9707-ce8f921f56b1" providerId="ADAL" clId="{39EF1533-FF8C-45BE-831F-342CE5239DAC}" dt="2024-08-02T23:15:15.522" v="70" actId="1076"/>
         <pc:sldMkLst>
           <pc:docMk/>
           <pc:sldMk cId="2325547052" sldId="723"/>
         </pc:sldMkLst>
         <pc:picChg chg="del">
-          <ac:chgData name="OLIVEIRA Caio" userId="56a7264e-9c39-4238-9707-ce8f921f56b1" providerId="ADAL" clId="{AFDDA80C-A534-4E36-919F-69419C73824D}" dt="2024-08-03T14:34:42.796" v="19" actId="478"/>
+          <ac:chgData name="OLIVEIRA Caio" userId="56a7264e-9c39-4238-9707-ce8f921f56b1" providerId="ADAL" clId="{39EF1533-FF8C-45BE-831F-342CE5239DAC}" dt="2024-08-02T23:08:23.266" v="31" actId="478"/>
           <ac:picMkLst>
             <pc:docMk/>
             <pc:sldMk cId="2325547052" sldId="723"/>
-            <ac:picMk id="5" creationId="{2B673CBB-B257-5C4A-01D2-FA642B66DE48}"/>
+            <ac:picMk id="5" creationId="{AF9BDE04-3045-7700-F79B-1DB76360AAC4}"/>
+          </ac:picMkLst>
+        </pc:picChg>
+        <pc:picChg chg="add del mod">
+          <ac:chgData name="OLIVEIRA Caio" userId="56a7264e-9c39-4238-9707-ce8f921f56b1" providerId="ADAL" clId="{39EF1533-FF8C-45BE-831F-342CE5239DAC}" dt="2024-08-02T23:11:36.524" v="41" actId="478"/>
+          <ac:picMkLst>
+            <pc:docMk/>
+            <pc:sldMk cId="2325547052" sldId="723"/>
+            <ac:picMk id="6" creationId="{6777587F-9189-6D85-4B2C-7C7C7A82CA92}"/>
+          </ac:picMkLst>
+        </pc:picChg>
+        <pc:picChg chg="add del mod">
+          <ac:chgData name="OLIVEIRA Caio" userId="56a7264e-9c39-4238-9707-ce8f921f56b1" providerId="ADAL" clId="{39EF1533-FF8C-45BE-831F-342CE5239DAC}" dt="2024-08-02T23:15:12.799" v="68" actId="478"/>
+          <ac:picMkLst>
+            <pc:docMk/>
+            <pc:sldMk cId="2325547052" sldId="723"/>
+            <ac:picMk id="7" creationId="{8F5A8E4F-1345-ADBD-2744-3D1AA6AE0D4B}"/>
           </ac:picMkLst>
         </pc:picChg>
         <pc:picChg chg="add mod">
-          <ac:chgData name="OLIVEIRA Caio" userId="56a7264e-9c39-4238-9707-ce8f921f56b1" providerId="ADAL" clId="{AFDDA80C-A534-4E36-919F-69419C73824D}" dt="2024-08-03T15:42:36.380" v="50" actId="1037"/>
+          <ac:chgData name="OLIVEIRA Caio" userId="56a7264e-9c39-4238-9707-ce8f921f56b1" providerId="ADAL" clId="{39EF1533-FF8C-45BE-831F-342CE5239DAC}" dt="2024-08-02T23:15:15.522" v="70" actId="1076"/>
           <ac:picMkLst>
             <pc:docMk/>
             <pc:sldMk cId="2325547052" sldId="723"/>
-            <ac:picMk id="6" creationId="{108247D3-C171-260E-CC10-B45F21B5DEFE}"/>
+            <ac:picMk id="8" creationId="{77B844DE-F2F2-AF23-223D-2C803B511024}"/>
           </ac:picMkLst>
         </pc:picChg>
       </pc:sldChg>
       <pc:sldChg chg="addSp delSp modSp mod">
-        <pc:chgData name="OLIVEIRA Caio" userId="56a7264e-9c39-4238-9707-ce8f921f56b1" providerId="ADAL" clId="{AFDDA80C-A534-4E36-919F-69419C73824D}" dt="2024-08-03T14:35:01.838" v="24" actId="1076"/>
+        <pc:chgData name="OLIVEIRA Caio" userId="56a7264e-9c39-4238-9707-ce8f921f56b1" providerId="ADAL" clId="{39EF1533-FF8C-45BE-831F-342CE5239DAC}" dt="2024-08-02T23:08:47.381" v="37" actId="1076"/>
         <pc:sldMkLst>
           <pc:docMk/>
           <pc:sldMk cId="1595295665" sldId="724"/>
         </pc:sldMkLst>
         <pc:picChg chg="del">
-          <ac:chgData name="OLIVEIRA Caio" userId="56a7264e-9c39-4238-9707-ce8f921f56b1" providerId="ADAL" clId="{AFDDA80C-A534-4E36-919F-69419C73824D}" dt="2024-08-03T14:34:56.610" v="22" actId="478"/>
+          <ac:chgData name="OLIVEIRA Caio" userId="56a7264e-9c39-4238-9707-ce8f921f56b1" providerId="ADAL" clId="{39EF1533-FF8C-45BE-831F-342CE5239DAC}" dt="2024-08-02T23:08:45.378" v="36" actId="478"/>
           <ac:picMkLst>
             <pc:docMk/>
             <pc:sldMk cId="1595295665" sldId="724"/>
-            <ac:picMk id="2" creationId="{5BDDDF0C-0933-69FC-6C47-D88164D87FFC}"/>
+            <ac:picMk id="2" creationId="{11BB514B-375D-A53B-ECBA-DD082D94744C}"/>
           </ac:picMkLst>
         </pc:picChg>
         <pc:picChg chg="add mod">
-          <ac:chgData name="OLIVEIRA Caio" userId="56a7264e-9c39-4238-9707-ce8f921f56b1" providerId="ADAL" clId="{AFDDA80C-A534-4E36-919F-69419C73824D}" dt="2024-08-03T14:35:01.838" v="24" actId="1076"/>
+          <ac:chgData name="OLIVEIRA Caio" userId="56a7264e-9c39-4238-9707-ce8f921f56b1" providerId="ADAL" clId="{39EF1533-FF8C-45BE-831F-342CE5239DAC}" dt="2024-08-02T23:08:47.381" v="37" actId="1076"/>
           <ac:picMkLst>
             <pc:docMk/>
             <pc:sldMk cId="1595295665" sldId="724"/>
-            <ac:picMk id="4" creationId="{A44A079F-8CB5-B259-0A3B-133DA50F2416}"/>
+            <ac:picMk id="4" creationId="{2D2475A6-257E-F99D-0733-39EF1ED57C65}"/>
           </ac:picMkLst>
         </pc:picChg>
       </pc:sldChg>
       <pc:sldChg chg="addSp delSp modSp mod">
-        <pc:chgData name="OLIVEIRA Caio" userId="56a7264e-9c39-4238-9707-ce8f921f56b1" providerId="ADAL" clId="{AFDDA80C-A534-4E36-919F-69419C73824D}" dt="2024-08-03T14:35:18.157" v="27" actId="1076"/>
+        <pc:chgData name="OLIVEIRA Caio" userId="56a7264e-9c39-4238-9707-ce8f921f56b1" providerId="ADAL" clId="{39EF1533-FF8C-45BE-831F-342CE5239DAC}" dt="2024-08-02T23:15:00.094" v="67" actId="1076"/>
         <pc:sldMkLst>
           <pc:docMk/>
           <pc:sldMk cId="2074372884" sldId="725"/>
         </pc:sldMkLst>
-        <pc:picChg chg="add mod">
-          <ac:chgData name="OLIVEIRA Caio" userId="56a7264e-9c39-4238-9707-ce8f921f56b1" providerId="ADAL" clId="{AFDDA80C-A534-4E36-919F-69419C73824D}" dt="2024-08-03T14:35:18.157" v="27" actId="1076"/>
+        <pc:picChg chg="del">
+          <ac:chgData name="OLIVEIRA Caio" userId="56a7264e-9c39-4238-9707-ce8f921f56b1" providerId="ADAL" clId="{39EF1533-FF8C-45BE-831F-342CE5239DAC}" dt="2024-08-02T23:12:24.538" v="45" actId="478"/>
           <ac:picMkLst>
             <pc:docMk/>
             <pc:sldMk cId="2074372884" sldId="725"/>
-            <ac:picMk id="4" creationId="{364CDF07-F954-8977-B55E-1820D6A70DE2}"/>
+            <ac:picMk id="4" creationId="{056B4D05-B5FD-9E4C-5598-9770F9A8149A}"/>
           </ac:picMkLst>
         </pc:picChg>
-        <pc:picChg chg="del">
-          <ac:chgData name="OLIVEIRA Caio" userId="56a7264e-9c39-4238-9707-ce8f921f56b1" providerId="ADAL" clId="{AFDDA80C-A534-4E36-919F-69419C73824D}" dt="2024-08-03T14:35:14.069" v="25" actId="478"/>
+        <pc:picChg chg="add del mod">
+          <ac:chgData name="OLIVEIRA Caio" userId="56a7264e-9c39-4238-9707-ce8f921f56b1" providerId="ADAL" clId="{39EF1533-FF8C-45BE-831F-342CE5239DAC}" dt="2024-08-02T23:11:48.180" v="43" actId="478"/>
           <ac:picMkLst>
             <pc:docMk/>
             <pc:sldMk cId="2074372884" sldId="725"/>
-            <ac:picMk id="14" creationId="{A2920D15-7274-3E75-C69C-96DCAF0CAD09}"/>
+            <ac:picMk id="6" creationId="{D7F74476-2F05-77EE-4FFD-49FF1D43B4A7}"/>
+          </ac:picMkLst>
+        </pc:picChg>
+        <pc:picChg chg="add del mod">
+          <ac:chgData name="OLIVEIRA Caio" userId="56a7264e-9c39-4238-9707-ce8f921f56b1" providerId="ADAL" clId="{39EF1533-FF8C-45BE-831F-342CE5239DAC}" dt="2024-08-02T23:14:57.486" v="66" actId="478"/>
+          <ac:picMkLst>
+            <pc:docMk/>
+            <pc:sldMk cId="2074372884" sldId="725"/>
+            <ac:picMk id="7" creationId="{A2B3B481-51C8-3644-E440-25AD20ACD419}"/>
+          </ac:picMkLst>
+        </pc:picChg>
+        <pc:picChg chg="add mod">
+          <ac:chgData name="OLIVEIRA Caio" userId="56a7264e-9c39-4238-9707-ce8f921f56b1" providerId="ADAL" clId="{39EF1533-FF8C-45BE-831F-342CE5239DAC}" dt="2024-08-02T23:15:00.094" v="67" actId="1076"/>
+          <ac:picMkLst>
+            <pc:docMk/>
+            <pc:sldMk cId="2074372884" sldId="725"/>
+            <ac:picMk id="8" creationId="{CC6B638C-2C79-8585-C3E0-1F423FA6FEB7}"/>
           </ac:picMkLst>
         </pc:picChg>
       </pc:sldChg>
       <pc:sldChg chg="addSp delSp modSp mod">
-        <pc:chgData name="OLIVEIRA Caio" userId="56a7264e-9c39-4238-9707-ce8f921f56b1" providerId="ADAL" clId="{AFDDA80C-A534-4E36-919F-69419C73824D}" dt="2024-08-03T14:35:37.799" v="30" actId="1076"/>
+        <pc:chgData name="OLIVEIRA Caio" userId="56a7264e-9c39-4238-9707-ce8f921f56b1" providerId="ADAL" clId="{39EF1533-FF8C-45BE-831F-342CE5239DAC}" dt="2024-08-02T23:12:50.917" v="50" actId="1076"/>
         <pc:sldMkLst>
           <pc:docMk/>
           <pc:sldMk cId="4174650935" sldId="726"/>
         </pc:sldMkLst>
         <pc:picChg chg="add mod">
-          <ac:chgData name="OLIVEIRA Caio" userId="56a7264e-9c39-4238-9707-ce8f921f56b1" providerId="ADAL" clId="{AFDDA80C-A534-4E36-919F-69419C73824D}" dt="2024-08-03T14:35:37.799" v="30" actId="1076"/>
+          <ac:chgData name="OLIVEIRA Caio" userId="56a7264e-9c39-4238-9707-ce8f921f56b1" providerId="ADAL" clId="{39EF1533-FF8C-45BE-831F-342CE5239DAC}" dt="2024-08-02T23:12:50.917" v="50" actId="1076"/>
           <ac:picMkLst>
             <pc:docMk/>
             <pc:sldMk cId="4174650935" sldId="726"/>
-            <ac:picMk id="4" creationId="{88463834-5AE7-4332-AF2B-2B5B1599B8B8}"/>
+            <ac:picMk id="4" creationId="{936A7893-802D-1521-67FE-402F6F9C2308}"/>
           </ac:picMkLst>
         </pc:picChg>
         <pc:picChg chg="del">
-          <ac:chgData name="OLIVEIRA Caio" userId="56a7264e-9c39-4238-9707-ce8f921f56b1" providerId="ADAL" clId="{AFDDA80C-A534-4E36-919F-69419C73824D}" dt="2024-08-03T14:35:32.295" v="28" actId="478"/>
+          <ac:chgData name="OLIVEIRA Caio" userId="56a7264e-9c39-4238-9707-ce8f921f56b1" providerId="ADAL" clId="{39EF1533-FF8C-45BE-831F-342CE5239DAC}" dt="2024-08-02T23:12:48.226" v="49" actId="478"/>
           <ac:picMkLst>
             <pc:docMk/>
             <pc:sldMk cId="4174650935" sldId="726"/>
-            <ac:picMk id="9" creationId="{B6ECA4BD-7584-0457-F3B9-B5D2DE999237}"/>
+            <ac:picMk id="8" creationId="{A4898C6A-F81D-4D48-A0BF-CB0B2AE0CBCC}"/>
           </ac:picMkLst>
         </pc:picChg>
       </pc:sldChg>
       <pc:sldChg chg="addSp delSp modSp mod">
-        <pc:chgData name="OLIVEIRA Caio" userId="56a7264e-9c39-4238-9707-ce8f921f56b1" providerId="ADAL" clId="{AFDDA80C-A534-4E36-919F-69419C73824D}" dt="2024-08-03T14:35:51.344" v="33" actId="1076"/>
+        <pc:chgData name="OLIVEIRA Caio" userId="56a7264e-9c39-4238-9707-ce8f921f56b1" providerId="ADAL" clId="{39EF1533-FF8C-45BE-831F-342CE5239DAC}" dt="2024-08-02T23:14:41.848" v="64" actId="1076"/>
         <pc:sldMkLst>
           <pc:docMk/>
           <pc:sldMk cId="874457255" sldId="727"/>
         </pc:sldMkLst>
-        <pc:picChg chg="add mod">
-          <ac:chgData name="OLIVEIRA Caio" userId="56a7264e-9c39-4238-9707-ce8f921f56b1" providerId="ADAL" clId="{AFDDA80C-A534-4E36-919F-69419C73824D}" dt="2024-08-03T14:35:51.344" v="33" actId="1076"/>
+        <pc:picChg chg="add del mod">
+          <ac:chgData name="OLIVEIRA Caio" userId="56a7264e-9c39-4238-9707-ce8f921f56b1" providerId="ADAL" clId="{39EF1533-FF8C-45BE-831F-342CE5239DAC}" dt="2024-08-02T23:14:40.091" v="63" actId="478"/>
           <ac:picMkLst>
             <pc:docMk/>
             <pc:sldMk cId="874457255" sldId="727"/>
-            <ac:picMk id="3" creationId="{05EC3CA8-CB37-3DCA-6162-23B8B753D888}"/>
+            <ac:picMk id="3" creationId="{7D55DBF0-BD06-0E80-1A02-5E9E43D8F862}"/>
           </ac:picMkLst>
         </pc:picChg>
         <pc:picChg chg="del">
-          <ac:chgData name="OLIVEIRA Caio" userId="56a7264e-9c39-4238-9707-ce8f921f56b1" providerId="ADAL" clId="{AFDDA80C-A534-4E36-919F-69419C73824D}" dt="2024-08-03T14:35:48.022" v="31" actId="478"/>
+          <ac:chgData name="OLIVEIRA Caio" userId="56a7264e-9c39-4238-9707-ce8f921f56b1" providerId="ADAL" clId="{39EF1533-FF8C-45BE-831F-342CE5239DAC}" dt="2024-08-02T23:13:01.770" v="51" actId="478"/>
           <ac:picMkLst>
             <pc:docMk/>
             <pc:sldMk cId="874457255" sldId="727"/>
-            <ac:picMk id="8" creationId="{93B7D33F-01B7-16FE-8470-6B4D8DC4E58D}"/>
+            <ac:picMk id="8" creationId="{949E5473-72FE-0F40-C9EC-DBA5B42B75FD}"/>
+          </ac:picMkLst>
+        </pc:picChg>
+        <pc:picChg chg="add mod">
+          <ac:chgData name="OLIVEIRA Caio" userId="56a7264e-9c39-4238-9707-ce8f921f56b1" providerId="ADAL" clId="{39EF1533-FF8C-45BE-831F-342CE5239DAC}" dt="2024-08-02T23:14:41.848" v="64" actId="1076"/>
+          <ac:picMkLst>
+            <pc:docMk/>
+            <pc:sldMk cId="874457255" sldId="727"/>
+            <ac:picMk id="9" creationId="{20919F60-C581-8ECB-7F1D-717422A0E950}"/>
           </ac:picMkLst>
         </pc:picChg>
       </pc:sldChg>
       <pc:sldChg chg="addSp delSp modSp mod">
-        <pc:chgData name="OLIVEIRA Caio" userId="56a7264e-9c39-4238-9707-ce8f921f56b1" providerId="ADAL" clId="{AFDDA80C-A534-4E36-919F-69419C73824D}" dt="2024-08-03T14:36:11.157" v="36" actId="1076"/>
+        <pc:chgData name="OLIVEIRA Caio" userId="56a7264e-9c39-4238-9707-ce8f921f56b1" providerId="ADAL" clId="{39EF1533-FF8C-45BE-831F-342CE5239DAC}" dt="2024-08-02T23:14:27.615" v="61" actId="1076"/>
         <pc:sldMkLst>
           <pc:docMk/>
           <pc:sldMk cId="3078111408" sldId="728"/>
         </pc:sldMkLst>
-        <pc:picChg chg="add mod">
-          <ac:chgData name="OLIVEIRA Caio" userId="56a7264e-9c39-4238-9707-ce8f921f56b1" providerId="ADAL" clId="{AFDDA80C-A534-4E36-919F-69419C73824D}" dt="2024-08-03T14:36:11.157" v="36" actId="1076"/>
+        <pc:picChg chg="add del">
+          <ac:chgData name="OLIVEIRA Caio" userId="56a7264e-9c39-4238-9707-ce8f921f56b1" providerId="ADAL" clId="{39EF1533-FF8C-45BE-831F-342CE5239DAC}" dt="2024-08-02T23:13:27.463" v="56" actId="478"/>
           <ac:picMkLst>
             <pc:docMk/>
             <pc:sldMk cId="3078111408" sldId="728"/>
-            <ac:picMk id="4" creationId="{9846C87E-3C4A-2FE1-E97E-688503B403D0}"/>
+            <ac:picMk id="4" creationId="{505C75F4-111E-1885-A502-7B98EB203F65}"/>
           </ac:picMkLst>
         </pc:picChg>
         <pc:picChg chg="del">
-          <ac:chgData name="OLIVEIRA Caio" userId="56a7264e-9c39-4238-9707-ce8f921f56b1" providerId="ADAL" clId="{AFDDA80C-A534-4E36-919F-69419C73824D}" dt="2024-08-03T14:36:08.024" v="34" actId="478"/>
+          <ac:chgData name="OLIVEIRA Caio" userId="56a7264e-9c39-4238-9707-ce8f921f56b1" providerId="ADAL" clId="{39EF1533-FF8C-45BE-831F-342CE5239DAC}" dt="2024-08-02T23:13:20.130" v="54" actId="478"/>
           <ac:picMkLst>
             <pc:docMk/>
             <pc:sldMk cId="3078111408" sldId="728"/>
-            <ac:picMk id="8" creationId="{4777F19C-7B6E-04BA-8068-98C98E06FCFE}"/>
+            <ac:picMk id="8" creationId="{27C45D7A-B899-C9B5-DA7F-F8C4B9434844}"/>
+          </ac:picMkLst>
+        </pc:picChg>
+        <pc:picChg chg="add del mod">
+          <ac:chgData name="OLIVEIRA Caio" userId="56a7264e-9c39-4238-9707-ce8f921f56b1" providerId="ADAL" clId="{39EF1533-FF8C-45BE-831F-342CE5239DAC}" dt="2024-08-02T23:14:23.551" v="59" actId="478"/>
+          <ac:picMkLst>
+            <pc:docMk/>
+            <pc:sldMk cId="3078111408" sldId="728"/>
+            <ac:picMk id="9" creationId="{627A4DFF-187D-93DC-1252-5BFA57DA3E15}"/>
+          </ac:picMkLst>
+        </pc:picChg>
+        <pc:picChg chg="add mod">
+          <ac:chgData name="OLIVEIRA Caio" userId="56a7264e-9c39-4238-9707-ce8f921f56b1" providerId="ADAL" clId="{39EF1533-FF8C-45BE-831F-342CE5239DAC}" dt="2024-08-02T23:14:27.615" v="61" actId="1076"/>
+          <ac:picMkLst>
+            <pc:docMk/>
+            <pc:sldMk cId="3078111408" sldId="728"/>
+            <ac:picMk id="10" creationId="{7F030280-516C-FBF0-5878-F3B4EA69643C}"/>
           </ac:picMkLst>
         </pc:picChg>
       </pc:sldChg>
       <pc:sldChg chg="addSp delSp modSp mod">
-        <pc:chgData name="OLIVEIRA Caio" userId="56a7264e-9c39-4238-9707-ce8f921f56b1" providerId="ADAL" clId="{AFDDA80C-A534-4E36-919F-69419C73824D}" dt="2024-08-03T14:37:10.526" v="39" actId="1076"/>
+        <pc:chgData name="OLIVEIRA Caio" userId="56a7264e-9c39-4238-9707-ce8f921f56b1" providerId="ADAL" clId="{39EF1533-FF8C-45BE-831F-342CE5239DAC}" dt="2024-08-02T23:15:49.327" v="73" actId="1076"/>
         <pc:sldMkLst>
           <pc:docMk/>
           <pc:sldMk cId="2002950431" sldId="730"/>
         </pc:sldMkLst>
         <pc:picChg chg="add mod">
-          <ac:chgData name="OLIVEIRA Caio" userId="56a7264e-9c39-4238-9707-ce8f921f56b1" providerId="ADAL" clId="{AFDDA80C-A534-4E36-919F-69419C73824D}" dt="2024-08-03T14:37:10.526" v="39" actId="1076"/>
+          <ac:chgData name="OLIVEIRA Caio" userId="56a7264e-9c39-4238-9707-ce8f921f56b1" providerId="ADAL" clId="{39EF1533-FF8C-45BE-831F-342CE5239DAC}" dt="2024-08-02T23:15:49.327" v="73" actId="1076"/>
           <ac:picMkLst>
             <pc:docMk/>
             <pc:sldMk cId="2002950431" sldId="730"/>
-            <ac:picMk id="2" creationId="{6E7EE1C9-3622-F6FC-BAEB-948A44088EA2}"/>
+            <ac:picMk id="2" creationId="{C60DF78C-604E-669E-BE89-8911C6EEE976}"/>
           </ac:picMkLst>
         </pc:picChg>
         <pc:picChg chg="del">
-          <ac:chgData name="OLIVEIRA Caio" userId="56a7264e-9c39-4238-9707-ce8f921f56b1" providerId="ADAL" clId="{AFDDA80C-A534-4E36-919F-69419C73824D}" dt="2024-08-03T14:37:07.264" v="37" actId="478"/>
+          <ac:chgData name="OLIVEIRA Caio" userId="56a7264e-9c39-4238-9707-ce8f921f56b1" providerId="ADAL" clId="{39EF1533-FF8C-45BE-831F-342CE5239DAC}" dt="2024-08-02T23:15:46.573" v="72" actId="478"/>
           <ac:picMkLst>
             <pc:docMk/>
             <pc:sldMk cId="2002950431" sldId="730"/>
-            <ac:picMk id="6" creationId="{9242B5EF-76E2-9D7E-DF18-007DE348448D}"/>
+            <ac:picMk id="3" creationId="{4E2C1BC9-4963-9F55-912B-16B7CD62F2D3}"/>
           </ac:picMkLst>
         </pc:picChg>
       </pc:sldChg>
-      <pc:sldChg chg="addSp delSp modSp add del mod">
-        <pc:chgData name="OLIVEIRA Caio" userId="56a7264e-9c39-4238-9707-ce8f921f56b1" providerId="ADAL" clId="{AFDDA80C-A534-4E36-919F-69419C73824D}" dt="2024-08-03T14:37:25.923" v="44" actId="1076"/>
+      <pc:sldChg chg="addSp delSp modSp mod">
+        <pc:chgData name="OLIVEIRA Caio" userId="56a7264e-9c39-4238-9707-ce8f921f56b1" providerId="ADAL" clId="{39EF1533-FF8C-45BE-831F-342CE5239DAC}" dt="2024-08-02T23:16:11.123" v="76" actId="1076"/>
         <pc:sldMkLst>
           <pc:docMk/>
           <pc:sldMk cId="332661816" sldId="732"/>
         </pc:sldMkLst>
         <pc:picChg chg="add mod">
-          <ac:chgData name="OLIVEIRA Caio" userId="56a7264e-9c39-4238-9707-ce8f921f56b1" providerId="ADAL" clId="{AFDDA80C-A534-4E36-919F-69419C73824D}" dt="2024-08-03T14:37:25.923" v="44" actId="1076"/>
+          <ac:chgData name="OLIVEIRA Caio" userId="56a7264e-9c39-4238-9707-ce8f921f56b1" providerId="ADAL" clId="{39EF1533-FF8C-45BE-831F-342CE5239DAC}" dt="2024-08-02T23:16:11.123" v="76" actId="1076"/>
           <ac:picMkLst>
             <pc:docMk/>
             <pc:sldMk cId="332661816" sldId="732"/>
-            <ac:picMk id="2" creationId="{D46A3C4E-D8D4-B734-4191-65E06A2BA6A2}"/>
+            <ac:picMk id="2" creationId="{706B9896-F54C-6F7E-17AE-B495E1FFE6A8}"/>
           </ac:picMkLst>
         </pc:picChg>
         <pc:picChg chg="del">
-          <ac:chgData name="OLIVEIRA Caio" userId="56a7264e-9c39-4238-9707-ce8f921f56b1" providerId="ADAL" clId="{AFDDA80C-A534-4E36-919F-69419C73824D}" dt="2024-08-03T14:37:22.564" v="42" actId="478"/>
+          <ac:chgData name="OLIVEIRA Caio" userId="56a7264e-9c39-4238-9707-ce8f921f56b1" providerId="ADAL" clId="{39EF1533-FF8C-45BE-831F-342CE5239DAC}" dt="2024-08-02T23:16:07.831" v="75" actId="478"/>
           <ac:picMkLst>
             <pc:docMk/>
             <pc:sldMk cId="332661816" sldId="732"/>
-            <ac:picMk id="4" creationId="{7821BD56-E129-9D35-AA4C-B0B37AC4A2C1}"/>
+            <ac:picMk id="3" creationId="{7896158F-FE58-8A80-160F-BE5F174F21E8}"/>
+          </ac:picMkLst>
+        </pc:picChg>
+      </pc:sldChg>
+      <pc:sldChg chg="addSp delSp modSp mod">
+        <pc:chgData name="OLIVEIRA Caio" userId="56a7264e-9c39-4238-9707-ce8f921f56b1" providerId="ADAL" clId="{39EF1533-FF8C-45BE-831F-342CE5239DAC}" dt="2024-08-02T23:16:46.098" v="80" actId="1076"/>
+        <pc:sldMkLst>
+          <pc:docMk/>
+          <pc:sldMk cId="3049616452" sldId="733"/>
+        </pc:sldMkLst>
+        <pc:picChg chg="del">
+          <ac:chgData name="OLIVEIRA Caio" userId="56a7264e-9c39-4238-9707-ce8f921f56b1" providerId="ADAL" clId="{39EF1533-FF8C-45BE-831F-342CE5239DAC}" dt="2024-08-02T23:16:41.040" v="77" actId="478"/>
+          <ac:picMkLst>
+            <pc:docMk/>
+            <pc:sldMk cId="3049616452" sldId="733"/>
+            <ac:picMk id="3" creationId="{B8A11036-0111-AAC4-0CAD-DF5A1FE74BC3}"/>
+          </ac:picMkLst>
+        </pc:picChg>
+        <pc:picChg chg="add mod">
+          <ac:chgData name="OLIVEIRA Caio" userId="56a7264e-9c39-4238-9707-ce8f921f56b1" providerId="ADAL" clId="{39EF1533-FF8C-45BE-831F-342CE5239DAC}" dt="2024-08-02T23:16:46.098" v="80" actId="1076"/>
+          <ac:picMkLst>
+            <pc:docMk/>
+            <pc:sldMk cId="3049616452" sldId="733"/>
+            <ac:picMk id="4" creationId="{CBD6E218-B01D-909B-F4CB-CB54DF8A6D5E}"/>
           </ac:picMkLst>
         </pc:picChg>
       </pc:sldChg>
@@ -3791,7 +3791,7 @@
             <a:fld id="{D680E798-53FF-4C51-A981-953463752515}" type="datetimeFigureOut">
               <a:rPr lang="fr-FR" smtClean="0"/>
               <a:pPr/>
-              <a:t>09/10/2024</a:t>
+              <a:t>10/02/2025</a:t>
             </a:fld>
             <a:endParaRPr lang="fr-FR" dirty="0"/>
           </a:p>
@@ -47006,7 +47006,7 @@
           <a:p>
             <a:r>
               <a:rPr lang="en-GB" sz="2400" dirty="0"/>
-              <a:t>October 2024</a:t>
+              <a:t>February 2025</a:t>
             </a:r>
             <a:br>
               <a:rPr lang="en-GB" sz="2400" dirty="0"/>
@@ -47045,7 +47045,7 @@
           <a:p>
             <a:r>
               <a:rPr lang="en-GB" dirty="0"/>
-              <a:t>2024-10-09</a:t>
+              <a:t>2025-02-10</a:t>
             </a:r>
           </a:p>
           <a:p>
@@ -47176,17 +47176,17 @@
                 </a:solidFill>
                 <a:latin typeface="FuturaA Bk BT" panose="020B0502020204020303" pitchFamily="34" charset="0"/>
               </a:rPr>
-              <a:t>Total time of 10,612,776 hours</a:t>
+              <a:t>Total time of 11,690,712 hours</a:t>
             </a:r>
           </a:p>
         </p:txBody>
       </p:sp>
       <p:pic>
         <p:nvPicPr>
-          <p:cNvPr id="8" name="Imagem 7">
+          <p:cNvPr id="5" name="Imagem 4">
             <a:extLst>
               <a:ext uri="{FF2B5EF4-FFF2-40B4-BE49-F238E27FC236}">
-                <a16:creationId xmlns:a16="http://schemas.microsoft.com/office/drawing/2014/main" id="{8710374E-2879-439D-447E-1CD6B5343B22}"/>
+                <a16:creationId xmlns:a16="http://schemas.microsoft.com/office/drawing/2014/main" id="{A814FCAB-2C6C-342A-D53C-DEEB972FB268}"/>
               </a:ext>
             </a:extLst>
           </p:cNvPr>
@@ -47203,8 +47203,8 @@
         </p:blipFill>
         <p:spPr>
           <a:xfrm>
-            <a:off x="983431" y="1988840"/>
-            <a:ext cx="10481557" cy="3456384"/>
+            <a:off x="1066580" y="2060848"/>
+            <a:ext cx="10056440" cy="3316199"/>
           </a:xfrm>
           <a:prstGeom prst="rect">
             <a:avLst/>
@@ -51214,6 +51214,46 @@
 </file>
 
 <file path=customXml/item1.xml><?xml version="1.0" encoding="utf-8"?>
+<p:properties xmlns:p="http://schemas.microsoft.com/office/2006/metadata/properties" xmlns:xsi="http://www.w3.org/2001/XMLSchema-instance" xmlns:pc="http://schemas.microsoft.com/office/infopath/2007/PartnerControls">
+  <documentManagement/>
+</p:properties>
+</file>
+
+<file path=customXml/item2.xml><?xml version="1.0" encoding="utf-8"?>
+<Application xmlns="http://www.sap.com/cof/powerpoint/application">
+  <Version>2</Version>
+  <Revision>2.4.3.69599</Revision>
+</Application>
+</file>
+
+<file path=customXml/item3.xml><?xml version="1.0" encoding="utf-8"?>
+<Application xmlns="http://www.sap.com/cof/ao/powerpoint/application">
+  <com.sap.ip.bi.pioneer>
+    <Version>4</Version>
+    <AAO_Revision>2.4.3.69599</AAO_Revision>
+    <RefreshOnOpen>False</RefreshOnOpen>
+    <PlanningModeSetToChangeMode>True</PlanningModeSetToChangeMode>
+    <Cleaned>False</Cleaned>
+    <ForcePromptOnInitialRefresh>False</ForcePromptOnInitialRefresh>
+    <StorePromptsInDocument>True</StorePromptsInDocument>
+    <MergeVariables>False</MergeVariables>
+    <WorkingMode>Local</WorkingMode>
+    <RefreshPlanningObjectsOnRefreshAll>True</RefreshPlanningObjectsOnRefreshAll>
+    <Items/>
+  </com.sap.ip.bi.pioneer>
+</Application>
+</file>
+
+<file path=customXml/item4.xml><?xml version="1.0" encoding="utf-8"?>
+<?mso-contentType ?>
+<FormTemplates xmlns="http://schemas.microsoft.com/sharepoint/v3/contenttype/forms">
+  <Display>DocumentLibraryForm</Display>
+  <Edit>DocumentLibraryForm</Edit>
+  <New>DocumentLibraryForm</New>
+</FormTemplates>
+</file>
+
+<file path=customXml/item5.xml><?xml version="1.0" encoding="utf-8"?>
 <ct:contentTypeSchema xmlns:ct="http://schemas.microsoft.com/office/2006/metadata/contentType" xmlns:ma="http://schemas.microsoft.com/office/2006/metadata/properties/metaAttributes" ct:_="" ma:_="" ma:contentTypeName="Document" ma:contentTypeID="0x010100947762736561014999968B3E1282631A" ma:contentTypeVersion="13" ma:contentTypeDescription="Create a new document." ma:contentTypeScope="" ma:versionID="a1f79c55706b12bc3b1ffd4e0093d46f">
   <xsd:schema xmlns:xsd="http://www.w3.org/2001/XMLSchema" xmlns:xs="http://www.w3.org/2001/XMLSchema" xmlns:p="http://schemas.microsoft.com/office/2006/metadata/properties" xmlns:ns3="3da058dc-63fd-44bb-932e-06c0b699d570" xmlns:ns4="363cf499-8901-4b96-a690-6f3b3b8f7d64" targetNamespace="http://schemas.microsoft.com/office/2006/metadata/properties" ma:root="true" ma:fieldsID="d10c0aa308b814c84f1159f99ad06fcb" ns3:_="" ns4:_="">
     <xsd:import namespace="3da058dc-63fd-44bb-932e-06c0b699d570"/>
@@ -51436,47 +51476,48 @@
 </ct:contentTypeSchema>
 </file>
 
-<file path=customXml/item2.xml><?xml version="1.0" encoding="utf-8"?>
-<?mso-contentType ?>
-<FormTemplates xmlns="http://schemas.microsoft.com/sharepoint/v3/contenttype/forms">
-  <Display>DocumentLibraryForm</Display>
-  <Edit>DocumentLibraryForm</Edit>
-  <New>DocumentLibraryForm</New>
-</FormTemplates>
+<file path=customXml/itemProps1.xml><?xml version="1.0" encoding="utf-8"?>
+<ds:datastoreItem xmlns:ds="http://schemas.openxmlformats.org/officeDocument/2006/customXml" ds:itemID="{C918D01A-ABBE-47B6-9BF0-A4C432BBF50B}">
+  <ds:schemaRefs>
+    <ds:schemaRef ds:uri="3da058dc-63fd-44bb-932e-06c0b699d570"/>
+    <ds:schemaRef ds:uri="http://schemas.microsoft.com/office/2006/documentManagement/types"/>
+    <ds:schemaRef ds:uri="http://schemas.microsoft.com/office/infopath/2007/PartnerControls"/>
+    <ds:schemaRef ds:uri="http://purl.org/dc/elements/1.1/"/>
+    <ds:schemaRef ds:uri="http://schemas.microsoft.com/office/2006/metadata/properties"/>
+    <ds:schemaRef ds:uri="http://purl.org/dc/terms/"/>
+    <ds:schemaRef ds:uri="http://schemas.openxmlformats.org/package/2006/metadata/core-properties"/>
+    <ds:schemaRef ds:uri="363cf499-8901-4b96-a690-6f3b3b8f7d64"/>
+    <ds:schemaRef ds:uri="http://www.w3.org/XML/1998/namespace"/>
+    <ds:schemaRef ds:uri="http://purl.org/dc/dcmitype/"/>
+  </ds:schemaRefs>
+</ds:datastoreItem>
 </file>
 
-<file path=customXml/item3.xml><?xml version="1.0" encoding="utf-8"?>
-<Application xmlns="http://www.sap.com/cof/ao/powerpoint/application">
-  <com.sap.ip.bi.pioneer>
-    <Version>4</Version>
-    <AAO_Revision>2.4.3.69599</AAO_Revision>
-    <RefreshOnOpen>False</RefreshOnOpen>
-    <PlanningModeSetToChangeMode>True</PlanningModeSetToChangeMode>
-    <Cleaned>False</Cleaned>
-    <ForcePromptOnInitialRefresh>False</ForcePromptOnInitialRefresh>
-    <StorePromptsInDocument>True</StorePromptsInDocument>
-    <MergeVariables>False</MergeVariables>
-    <WorkingMode>Local</WorkingMode>
-    <RefreshPlanningObjectsOnRefreshAll>True</RefreshPlanningObjectsOnRefreshAll>
-    <Items/>
-  </com.sap.ip.bi.pioneer>
-</Application>
+<file path=customXml/itemProps2.xml><?xml version="1.0" encoding="utf-8"?>
+<ds:datastoreItem xmlns:ds="http://schemas.openxmlformats.org/officeDocument/2006/customXml" ds:itemID="{67118599-3F05-4AFF-94F1-AE602174FEC2}">
+  <ds:schemaRefs>
+    <ds:schemaRef ds:uri="http://www.sap.com/cof/powerpoint/application"/>
+  </ds:schemaRefs>
+</ds:datastoreItem>
 </file>
 
-<file path=customXml/item4.xml><?xml version="1.0" encoding="utf-8"?>
-<Application xmlns="http://www.sap.com/cof/powerpoint/application">
-  <Version>2</Version>
-  <Revision>2.4.3.69599</Revision>
-</Application>
+<file path=customXml/itemProps3.xml><?xml version="1.0" encoding="utf-8"?>
+<ds:datastoreItem xmlns:ds="http://schemas.openxmlformats.org/officeDocument/2006/customXml" ds:itemID="{A50BFC74-332C-4803-BADC-BE424AAE51A3}">
+  <ds:schemaRefs>
+    <ds:schemaRef ds:uri="http://www.sap.com/cof/ao/powerpoint/application"/>
+  </ds:schemaRefs>
+</ds:datastoreItem>
 </file>
 
-<file path=customXml/item5.xml><?xml version="1.0" encoding="utf-8"?>
-<p:properties xmlns:p="http://schemas.microsoft.com/office/2006/metadata/properties" xmlns:xsi="http://www.w3.org/2001/XMLSchema-instance" xmlns:pc="http://schemas.microsoft.com/office/infopath/2007/PartnerControls">
-  <documentManagement/>
-</p:properties>
+<file path=customXml/itemProps4.xml><?xml version="1.0" encoding="utf-8"?>
+<ds:datastoreItem xmlns:ds="http://schemas.openxmlformats.org/officeDocument/2006/customXml" ds:itemID="{6425939F-93DE-4D25-A04E-95681085E2E5}">
+  <ds:schemaRefs>
+    <ds:schemaRef ds:uri="http://schemas.microsoft.com/sharepoint/v3/contenttype/forms"/>
+  </ds:schemaRefs>
+</ds:datastoreItem>
 </file>
 
-<file path=customXml/itemProps1.xml><?xml version="1.0" encoding="utf-8"?>
+<file path=customXml/itemProps5.xml><?xml version="1.0" encoding="utf-8"?>
 <ds:datastoreItem xmlns:ds="http://schemas.openxmlformats.org/officeDocument/2006/customXml" ds:itemID="{7F721AC1-B507-437D-A6FC-750DF16D76A5}">
   <ds:schemaRefs>
     <ds:schemaRef ds:uri="http://schemas.microsoft.com/office/2006/metadata/contentType"/>
@@ -51495,47 +51536,6 @@
 </ds:datastoreItem>
 </file>
 
-<file path=customXml/itemProps2.xml><?xml version="1.0" encoding="utf-8"?>
-<ds:datastoreItem xmlns:ds="http://schemas.openxmlformats.org/officeDocument/2006/customXml" ds:itemID="{6425939F-93DE-4D25-A04E-95681085E2E5}">
-  <ds:schemaRefs>
-    <ds:schemaRef ds:uri="http://schemas.microsoft.com/sharepoint/v3/contenttype/forms"/>
-  </ds:schemaRefs>
-</ds:datastoreItem>
-</file>
-
-<file path=customXml/itemProps3.xml><?xml version="1.0" encoding="utf-8"?>
-<ds:datastoreItem xmlns:ds="http://schemas.openxmlformats.org/officeDocument/2006/customXml" ds:itemID="{A50BFC74-332C-4803-BADC-BE424AAE51A3}">
-  <ds:schemaRefs>
-    <ds:schemaRef ds:uri="http://www.sap.com/cof/ao/powerpoint/application"/>
-  </ds:schemaRefs>
-</ds:datastoreItem>
-</file>
-
-<file path=customXml/itemProps4.xml><?xml version="1.0" encoding="utf-8"?>
-<ds:datastoreItem xmlns:ds="http://schemas.openxmlformats.org/officeDocument/2006/customXml" ds:itemID="{67118599-3F05-4AFF-94F1-AE602174FEC2}">
-  <ds:schemaRefs>
-    <ds:schemaRef ds:uri="http://www.sap.com/cof/powerpoint/application"/>
-  </ds:schemaRefs>
-</ds:datastoreItem>
-</file>
-
-<file path=customXml/itemProps5.xml><?xml version="1.0" encoding="utf-8"?>
-<ds:datastoreItem xmlns:ds="http://schemas.openxmlformats.org/officeDocument/2006/customXml" ds:itemID="{C918D01A-ABBE-47B6-9BF0-A4C432BBF50B}">
-  <ds:schemaRefs>
-    <ds:schemaRef ds:uri="3da058dc-63fd-44bb-932e-06c0b699d570"/>
-    <ds:schemaRef ds:uri="http://schemas.microsoft.com/office/2006/documentManagement/types"/>
-    <ds:schemaRef ds:uri="http://schemas.microsoft.com/office/infopath/2007/PartnerControls"/>
-    <ds:schemaRef ds:uri="http://purl.org/dc/elements/1.1/"/>
-    <ds:schemaRef ds:uri="http://schemas.microsoft.com/office/2006/metadata/properties"/>
-    <ds:schemaRef ds:uri="http://purl.org/dc/terms/"/>
-    <ds:schemaRef ds:uri="http://schemas.openxmlformats.org/package/2006/metadata/core-properties"/>
-    <ds:schemaRef ds:uri="363cf499-8901-4b96-a690-6f3b3b8f7d64"/>
-    <ds:schemaRef ds:uri="http://www.w3.org/XML/1998/namespace"/>
-    <ds:schemaRef ds:uri="http://purl.org/dc/dcmitype/"/>
-  </ds:schemaRefs>
-</ds:datastoreItem>
-</file>
-
 <file path=docMetadata/LabelInfo.xml><?xml version="1.0" encoding="utf-8"?>
 <clbl:labelList xmlns:clbl="http://schemas.microsoft.com/office/2020/mipLabelMetadata">
   <clbl:label id="{202412c0-1e7d-4ccc-99a7-7c8f0a21f86d}" enabled="1" method="Standard" siteId="{0d993ad3-fa73-421a-b129-1fe5590103f3}" removed="0"/>

</xml_diff>